<commit_message>
Add functionality for enable/disable of remove captions ribbon button based on selected slides. Extended functionality of PowerPointPresentation and PowerPointSlide to Support new features
</commit_message>
<xml_diff>
--- a/PowerPointLabs/PowerPointLabs/PowerPointLabs Quick Tutorial.pptx
+++ b/PowerPointLabs/PowerPointLabs/PowerPointLabs Quick Tutorial.pptx
@@ -198,7 +198,7 @@
       </p14:sectionLst>
     </p:ext>
     <p:ext uri="{EFAFB233-063F-42B5-8137-9DF3F51BA10A}">
-      <p15:sldGuideLst xmlns="" xmlns:p15="http://schemas.microsoft.com/office/powerpoint/2012/main">
+      <p15:sldGuideLst xmlns:p15="http://schemas.microsoft.com/office/powerpoint/2012/main">
         <p15:guide id="1" orient="horz" pos="2160">
           <p15:clr>
             <a:srgbClr val="A4A3A4"/>
@@ -422,7 +422,7 @@
           <a:p>
             <a:fld id="{3E86CC0F-BBF3-4E07-94E0-0549B7D560A9}" type="datetimeFigureOut">
               <a:rPr lang="en-SG" smtClean="0"/>
-              <a:t>2/4/2014</a:t>
+              <a:t>3/6/2014</a:t>
             </a:fld>
             <a:endParaRPr lang="en-SG"/>
           </a:p>
@@ -1288,7 +1288,7 @@
             <a:fld id="{1D8BD707-D9CF-40AE-B4C6-C98DA3205C09}" type="datetimeFigureOut">
               <a:rPr lang="en-US" smtClean="0"/>
               <a:pPr/>
-              <a:t>4/2/2014</a:t>
+              <a:t>6/3/2014</a:t>
             </a:fld>
             <a:endParaRPr lang="en-US"/>
           </a:p>
@@ -1455,7 +1455,7 @@
             <a:fld id="{1D8BD707-D9CF-40AE-B4C6-C98DA3205C09}" type="datetimeFigureOut">
               <a:rPr lang="en-US" smtClean="0"/>
               <a:pPr/>
-              <a:t>4/2/2014</a:t>
+              <a:t>6/3/2014</a:t>
             </a:fld>
             <a:endParaRPr lang="en-US"/>
           </a:p>
@@ -1632,7 +1632,7 @@
             <a:fld id="{1D8BD707-D9CF-40AE-B4C6-C98DA3205C09}" type="datetimeFigureOut">
               <a:rPr lang="en-US" smtClean="0"/>
               <a:pPr/>
-              <a:t>4/2/2014</a:t>
+              <a:t>6/3/2014</a:t>
             </a:fld>
             <a:endParaRPr lang="en-US"/>
           </a:p>
@@ -1799,7 +1799,7 @@
             <a:fld id="{1D8BD707-D9CF-40AE-B4C6-C98DA3205C09}" type="datetimeFigureOut">
               <a:rPr lang="en-US" smtClean="0"/>
               <a:pPr/>
-              <a:t>4/2/2014</a:t>
+              <a:t>6/3/2014</a:t>
             </a:fld>
             <a:endParaRPr lang="en-US"/>
           </a:p>
@@ -2042,7 +2042,7 @@
             <a:fld id="{1D8BD707-D9CF-40AE-B4C6-C98DA3205C09}" type="datetimeFigureOut">
               <a:rPr lang="en-US" smtClean="0"/>
               <a:pPr/>
-              <a:t>4/2/2014</a:t>
+              <a:t>6/3/2014</a:t>
             </a:fld>
             <a:endParaRPr lang="en-US"/>
           </a:p>
@@ -2327,7 +2327,7 @@
             <a:fld id="{1D8BD707-D9CF-40AE-B4C6-C98DA3205C09}" type="datetimeFigureOut">
               <a:rPr lang="en-US" smtClean="0"/>
               <a:pPr/>
-              <a:t>4/2/2014</a:t>
+              <a:t>6/3/2014</a:t>
             </a:fld>
             <a:endParaRPr lang="en-US"/>
           </a:p>
@@ -2746,7 +2746,7 @@
             <a:fld id="{1D8BD707-D9CF-40AE-B4C6-C98DA3205C09}" type="datetimeFigureOut">
               <a:rPr lang="en-US" smtClean="0"/>
               <a:pPr/>
-              <a:t>4/2/2014</a:t>
+              <a:t>6/3/2014</a:t>
             </a:fld>
             <a:endParaRPr lang="en-US"/>
           </a:p>
@@ -2861,7 +2861,7 @@
             <a:fld id="{1D8BD707-D9CF-40AE-B4C6-C98DA3205C09}" type="datetimeFigureOut">
               <a:rPr lang="en-US" smtClean="0"/>
               <a:pPr/>
-              <a:t>4/2/2014</a:t>
+              <a:t>6/3/2014</a:t>
             </a:fld>
             <a:endParaRPr lang="en-US"/>
           </a:p>
@@ -2953,7 +2953,7 @@
             <a:fld id="{1D8BD707-D9CF-40AE-B4C6-C98DA3205C09}" type="datetimeFigureOut">
               <a:rPr lang="en-US" smtClean="0"/>
               <a:pPr/>
-              <a:t>4/2/2014</a:t>
+              <a:t>6/3/2014</a:t>
             </a:fld>
             <a:endParaRPr lang="en-US"/>
           </a:p>
@@ -3227,7 +3227,7 @@
             <a:fld id="{1D8BD707-D9CF-40AE-B4C6-C98DA3205C09}" type="datetimeFigureOut">
               <a:rPr lang="en-US" smtClean="0"/>
               <a:pPr/>
-              <a:t>4/2/2014</a:t>
+              <a:t>6/3/2014</a:t>
             </a:fld>
             <a:endParaRPr lang="en-US"/>
           </a:p>
@@ -3477,7 +3477,7 @@
             <a:fld id="{1D8BD707-D9CF-40AE-B4C6-C98DA3205C09}" type="datetimeFigureOut">
               <a:rPr lang="en-US" smtClean="0"/>
               <a:pPr/>
-              <a:t>4/2/2014</a:t>
+              <a:t>6/3/2014</a:t>
             </a:fld>
             <a:endParaRPr lang="en-US"/>
           </a:p>
@@ -3687,7 +3687,7 @@
             <a:fld id="{1D8BD707-D9CF-40AE-B4C6-C98DA3205C09}" type="datetimeFigureOut">
               <a:rPr lang="en-US" smtClean="0"/>
               <a:pPr/>
-              <a:t>4/2/2014</a:t>
+              <a:t>6/3/2014</a:t>
             </a:fld>
             <a:endParaRPr lang="en-US"/>
           </a:p>
@@ -7019,47 +7019,27 @@
                   </a:schemeClr>
                 </a:solidFill>
               </a:rPr>
-              <a:t> Select the four blue circles in any </a:t>
-            </a:r>
-            <a:r>
-              <a:rPr lang="en-US" dirty="0" smtClean="0">
+              <a:t> Select the four blue circles in any order (</a:t>
+            </a:r>
+            <a:r>
+              <a:rPr lang="en-US" dirty="0" err="1" smtClean="0">
                 <a:solidFill>
                   <a:schemeClr val="accent6">
                     <a:lumMod val="75000"/>
                   </a:schemeClr>
                 </a:solidFill>
               </a:rPr>
-              <a:t>order (</a:t>
-            </a:r>
-            <a:r>
-              <a:rPr lang="en-US" dirty="0" err="1" smtClean="0">
+              <a:t>Ctrl+click</a:t>
+            </a:r>
+            <a:r>
+              <a:rPr lang="en-US" dirty="0" smtClean="0">
                 <a:solidFill>
                   <a:schemeClr val="accent6">
                     <a:lumMod val="75000"/>
                   </a:schemeClr>
                 </a:solidFill>
               </a:rPr>
-              <a:t>Ctrl+click</a:t>
-            </a:r>
-            <a:r>
-              <a:rPr lang="en-US" dirty="0" smtClean="0">
-                <a:solidFill>
-                  <a:schemeClr val="accent6">
-                    <a:lumMod val="75000"/>
-                  </a:schemeClr>
-                </a:solidFill>
-              </a:rPr>
-              <a:t>) </a:t>
-            </a:r>
-            <a:r>
-              <a:rPr lang="en-US" dirty="0" smtClean="0">
-                <a:solidFill>
-                  <a:schemeClr val="accent6">
-                    <a:lumMod val="75000"/>
-                  </a:schemeClr>
-                </a:solidFill>
-              </a:rPr>
-              <a:t>and click  the            button.</a:t>
+              <a:t>) and click  the            button.</a:t>
             </a:r>
             <a:endParaRPr lang="en-SG" dirty="0">
               <a:solidFill>
@@ -12387,17 +12367,7 @@
                   </a:schemeClr>
                 </a:solidFill>
               </a:rPr>
-              <a:t>effect generated. This effect can be used to indicate that you are stepping back to take a look at where the details you have been discussing fit into the </a:t>
-            </a:r>
-            <a:r>
-              <a:rPr lang="en-US" dirty="0" smtClean="0">
-                <a:solidFill>
-                  <a:schemeClr val="accent6">
-                    <a:lumMod val="75000"/>
-                  </a:schemeClr>
-                </a:solidFill>
-              </a:rPr>
-              <a:t>‘big picture’.</a:t>
+              <a:t>effect generated. This effect can be used to indicate that you are stepping back to take a look at where the details you have been discussing fit into the ‘big picture’.</a:t>
             </a:r>
             <a:endParaRPr lang="en-SG" dirty="0">
               <a:solidFill>
@@ -15418,47 +15388,27 @@
                   </a:schemeClr>
                 </a:solidFill>
               </a:rPr>
-              <a:t>First up, let’s </a:t>
-            </a:r>
-            <a:r>
-              <a:rPr lang="en-US" dirty="0" smtClean="0">
+              <a:t>First up, let’s try the </a:t>
+            </a:r>
+            <a:r>
+              <a:rPr lang="en-US" b="1" dirty="0" smtClean="0">
                 <a:solidFill>
                   <a:schemeClr val="accent6">
                     <a:lumMod val="75000"/>
                   </a:schemeClr>
                 </a:solidFill>
               </a:rPr>
-              <a:t>try the </a:t>
-            </a:r>
-            <a:r>
-              <a:rPr lang="en-US" b="1" dirty="0" smtClean="0">
+              <a:t>Highlight bullet points</a:t>
+            </a:r>
+            <a:r>
+              <a:rPr lang="en-US" dirty="0" smtClean="0">
                 <a:solidFill>
                   <a:schemeClr val="accent6">
                     <a:lumMod val="75000"/>
                   </a:schemeClr>
                 </a:solidFill>
               </a:rPr>
-              <a:t>Highlight bullet points</a:t>
-            </a:r>
-            <a:r>
-              <a:rPr lang="en-US" dirty="0" smtClean="0">
-                <a:solidFill>
-                  <a:schemeClr val="accent6">
-                    <a:lumMod val="75000"/>
-                  </a:schemeClr>
-                </a:solidFill>
-              </a:rPr>
-              <a:t> </a:t>
-            </a:r>
-            <a:r>
-              <a:rPr lang="en-US" dirty="0" smtClean="0">
-                <a:solidFill>
-                  <a:schemeClr val="accent6">
-                    <a:lumMod val="75000"/>
-                  </a:schemeClr>
-                </a:solidFill>
-              </a:rPr>
-              <a:t>feature</a:t>
+              <a:t> feature</a:t>
             </a:r>
             <a:endParaRPr lang="en-SG" dirty="0">
               <a:solidFill>
@@ -16530,77 +16480,7 @@
                   </a:schemeClr>
                 </a:solidFill>
               </a:rPr>
-              <a:t> </a:t>
-            </a:r>
-            <a:r>
-              <a:rPr lang="en-US" dirty="0" smtClean="0">
-                <a:solidFill>
-                  <a:schemeClr val="accent6">
-                    <a:lumMod val="75000"/>
-                  </a:schemeClr>
-                </a:solidFill>
-              </a:rPr>
-              <a:t>While </a:t>
-            </a:r>
-            <a:r>
-              <a:rPr lang="en-US" dirty="0" smtClean="0">
-                <a:solidFill>
-                  <a:schemeClr val="accent6">
-                    <a:lumMod val="75000"/>
-                  </a:schemeClr>
-                </a:solidFill>
-              </a:rPr>
-              <a:t>this slide is </a:t>
-            </a:r>
-            <a:r>
-              <a:rPr lang="en-US" dirty="0" smtClean="0">
-                <a:solidFill>
-                  <a:schemeClr val="accent6">
-                    <a:lumMod val="75000"/>
-                  </a:schemeClr>
-                </a:solidFill>
-              </a:rPr>
-              <a:t>selected, </a:t>
-            </a:r>
-            <a:r>
-              <a:rPr lang="en-US" dirty="0" smtClean="0">
-                <a:solidFill>
-                  <a:schemeClr val="accent6">
-                    <a:lumMod val="75000"/>
-                  </a:schemeClr>
-                </a:solidFill>
-              </a:rPr>
-              <a:t>click </a:t>
-            </a:r>
-            <a:r>
-              <a:rPr lang="en-US" dirty="0" smtClean="0">
-                <a:solidFill>
-                  <a:schemeClr val="accent6">
-                    <a:lumMod val="75000"/>
-                  </a:schemeClr>
-                </a:solidFill>
-              </a:rPr>
-              <a:t>the              </a:t>
-            </a:r>
-            <a:r>
-              <a:rPr lang="en-US" dirty="0" smtClean="0">
-                <a:solidFill>
-                  <a:schemeClr val="accent6">
-                    <a:lumMod val="75000"/>
-                  </a:schemeClr>
-                </a:solidFill>
-              </a:rPr>
-              <a:t> button </a:t>
-            </a:r>
-            <a:r>
-              <a:rPr lang="en-US" dirty="0" smtClean="0">
-                <a:solidFill>
-                  <a:schemeClr val="accent6">
-                    <a:lumMod val="75000"/>
-                  </a:schemeClr>
-                </a:solidFill>
-              </a:rPr>
-              <a:t>in the                        ribbon</a:t>
+              <a:t> While this slide is selected, click the               button in the                        ribbon</a:t>
             </a:r>
             <a:endParaRPr lang="en-SG" dirty="0">
               <a:solidFill>
@@ -16711,16 +16591,6 @@
                   <a:schemeClr val="accent1"/>
                 </a:solidFill>
               </a14:hiddenFill>
-            </a:ext>
-            <a:ext uri="{91240B29-F687-4F45-9708-019B960494DF}">
-              <a14:hiddenLine xmlns:a14="http://schemas.microsoft.com/office/drawing/2010/main" w="9525">
-                <a:solidFill>
-                  <a:schemeClr val="tx1"/>
-                </a:solidFill>
-                <a:miter lim="800000"/>
-                <a:headEnd/>
-                <a:tailEnd/>
-              </a14:hiddenLine>
             </a:ext>
           </a:extLst>
         </p:spPr>
@@ -17069,67 +16939,7 @@
                   </a:schemeClr>
                 </a:solidFill>
               </a:rPr>
-              <a:t> </a:t>
-            </a:r>
-            <a:r>
-              <a:rPr lang="en-US" dirty="0" smtClean="0">
-                <a:solidFill>
-                  <a:schemeClr val="accent6">
-                    <a:lumMod val="75000"/>
-                  </a:schemeClr>
-                </a:solidFill>
-              </a:rPr>
-              <a:t>While </a:t>
-            </a:r>
-            <a:r>
-              <a:rPr lang="en-US" dirty="0" smtClean="0">
-                <a:solidFill>
-                  <a:schemeClr val="accent6">
-                    <a:lumMod val="75000"/>
-                  </a:schemeClr>
-                </a:solidFill>
-              </a:rPr>
-              <a:t>this slide is </a:t>
-            </a:r>
-            <a:r>
-              <a:rPr lang="en-US" dirty="0" smtClean="0">
-                <a:solidFill>
-                  <a:schemeClr val="accent6">
-                    <a:lumMod val="75000"/>
-                  </a:schemeClr>
-                </a:solidFill>
-              </a:rPr>
-              <a:t>selected, </a:t>
-            </a:r>
-            <a:r>
-              <a:rPr lang="en-US" dirty="0" smtClean="0">
-                <a:solidFill>
-                  <a:schemeClr val="accent6">
-                    <a:lumMod val="75000"/>
-                  </a:schemeClr>
-                </a:solidFill>
-              </a:rPr>
-              <a:t>click </a:t>
-            </a:r>
-            <a:r>
-              <a:rPr lang="en-US" dirty="0" smtClean="0">
-                <a:solidFill>
-                  <a:schemeClr val="accent6">
-                    <a:lumMod val="75000"/>
-                  </a:schemeClr>
-                </a:solidFill>
-              </a:rPr>
-              <a:t>the              </a:t>
-            </a:r>
-            <a:r>
-              <a:rPr lang="en-US" dirty="0" smtClean="0">
-                <a:solidFill>
-                  <a:schemeClr val="accent6">
-                    <a:lumMod val="75000"/>
-                  </a:schemeClr>
-                </a:solidFill>
-              </a:rPr>
-              <a:t>   button instead.</a:t>
+              <a:t> While this slide is selected, click the                 button instead.</a:t>
             </a:r>
             <a:endParaRPr lang="en-SG" dirty="0">
               <a:solidFill>
@@ -17186,16 +16996,6 @@
                   <a:schemeClr val="accent1"/>
                 </a:solidFill>
               </a14:hiddenFill>
-            </a:ext>
-            <a:ext uri="{91240B29-F687-4F45-9708-019B960494DF}">
-              <a14:hiddenLine xmlns:a14="http://schemas.microsoft.com/office/drawing/2010/main" w="9525">
-                <a:solidFill>
-                  <a:schemeClr val="tx1"/>
-                </a:solidFill>
-                <a:miter lim="800000"/>
-                <a:headEnd/>
-                <a:tailEnd/>
-              </a14:hiddenLine>
             </a:ext>
           </a:extLst>
         </p:spPr>
@@ -17489,17 +17289,7 @@
                   </a:schemeClr>
                 </a:solidFill>
               </a:rPr>
-              <a:t>Next, let’s </a:t>
-            </a:r>
-            <a:r>
-              <a:rPr lang="en-US" dirty="0" smtClean="0">
-                <a:solidFill>
-                  <a:schemeClr val="accent6">
-                    <a:lumMod val="75000"/>
-                  </a:schemeClr>
-                </a:solidFill>
-              </a:rPr>
-              <a:t>try the </a:t>
+              <a:t>Next, let’s try the </a:t>
             </a:r>
             <a:r>
               <a:rPr lang="en-US" b="1" dirty="0" smtClean="0">

</xml_diff>

<commit_message>
Update tutorial file and version info.
</commit_message>
<xml_diff>
--- a/PowerPointLabs/PowerPointLabs/PowerPointLabs Quick Tutorial.pptx
+++ b/PowerPointLabs/PowerPointLabs/PowerPointLabs Quick Tutorial.pptx
@@ -5,7 +5,7 @@
     <p:sldMasterId id="2147483648" r:id="rId1"/>
   </p:sldMasterIdLst>
   <p:notesMasterIdLst>
-    <p:notesMasterId r:id="rId29"/>
+    <p:notesMasterId r:id="rId30"/>
   </p:notesMasterIdLst>
   <p:sldIdLst>
     <p:sldId id="296" r:id="rId2"/>
@@ -33,8 +33,9 @@
     <p:sldId id="327" r:id="rId24"/>
     <p:sldId id="310" r:id="rId25"/>
     <p:sldId id="326" r:id="rId26"/>
-    <p:sldId id="305" r:id="rId27"/>
-    <p:sldId id="299" r:id="rId28"/>
+    <p:sldId id="331" r:id="rId27"/>
+    <p:sldId id="305" r:id="rId28"/>
+    <p:sldId id="299" r:id="rId29"/>
   </p:sldIdLst>
   <p:sldSz cx="9144000" cy="6858000" type="screen4x3"/>
   <p:notesSz cx="6858000" cy="9144000"/>
@@ -187,6 +188,7 @@
           <p14:sldIdLst>
             <p14:sldId id="310"/>
             <p14:sldId id="326"/>
+            <p14:sldId id="331"/>
           </p14:sldIdLst>
         </p14:section>
         <p14:section name="Wrap up" id="{5BBA1A93-B239-4917-BAC7-9CBE7A60C0BF}">
@@ -422,7 +424,7 @@
           <a:p>
             <a:fld id="{3E86CC0F-BBF3-4E07-94E0-0549B7D560A9}" type="datetimeFigureOut">
               <a:rPr lang="en-SG" smtClean="0"/>
-              <a:t>3/6/2014</a:t>
+              <a:t>16/6/2014</a:t>
             </a:fld>
             <a:endParaRPr lang="en-SG"/>
           </a:p>
@@ -1106,6 +1108,111 @@
 </p:notes>
 </file>
 
+<file path=ppt/notesSlides/notesSlide5.xml><?xml version="1.0" encoding="utf-8"?>
+<p:notes xmlns:a="http://schemas.openxmlformats.org/drawingml/2006/main" xmlns:r="http://schemas.openxmlformats.org/officeDocument/2006/relationships" xmlns:p="http://schemas.openxmlformats.org/presentationml/2006/main">
+  <p:cSld>
+    <p:spTree>
+      <p:nvGrpSpPr>
+        <p:cNvPr id="1" name=""/>
+        <p:cNvGrpSpPr/>
+        <p:nvPr/>
+      </p:nvGrpSpPr>
+      <p:grpSpPr>
+        <a:xfrm>
+          <a:off x="0" y="0"/>
+          <a:ext cx="0" cy="0"/>
+          <a:chOff x="0" y="0"/>
+          <a:chExt cx="0" cy="0"/>
+        </a:xfrm>
+      </p:grpSpPr>
+      <p:sp>
+        <p:nvSpPr>
+          <p:cNvPr id="2" name="Slide Image Placeholder 1"/>
+          <p:cNvSpPr>
+            <a:spLocks noGrp="1" noRot="1" noChangeAspect="1"/>
+          </p:cNvSpPr>
+          <p:nvPr>
+            <p:ph type="sldImg"/>
+          </p:nvPr>
+        </p:nvSpPr>
+        <p:spPr/>
+      </p:sp>
+      <p:sp>
+        <p:nvSpPr>
+          <p:cNvPr id="3" name="Notes Placeholder 2"/>
+          <p:cNvSpPr>
+            <a:spLocks noGrp="1"/>
+          </p:cNvSpPr>
+          <p:nvPr>
+            <p:ph type="body" idx="1"/>
+          </p:nvPr>
+        </p:nvSpPr>
+        <p:spPr/>
+        <p:txBody>
+          <a:bodyPr/>
+          <a:lstStyle/>
+          <a:p>
+            <a:r>
+              <a:rPr lang="en-US" altLang="zh-CN" dirty="0" smtClean="0"/>
+              <a:t>This will</a:t>
+            </a:r>
+            <a:r>
+              <a:rPr lang="en-US" altLang="zh-CN" baseline="0" dirty="0" smtClean="0"/>
+              <a:t> play at the beginning.</a:t>
+            </a:r>
+          </a:p>
+          <a:p>
+            <a:r>
+              <a:rPr lang="en-US" altLang="zh-CN" baseline="0" dirty="0" smtClean="0"/>
+              <a:t>[</a:t>
+            </a:r>
+            <a:r>
+              <a:rPr lang="en-US" altLang="zh-CN" baseline="0" dirty="0" err="1" smtClean="0"/>
+              <a:t>afterClick</a:t>
+            </a:r>
+            <a:r>
+              <a:rPr lang="en-US" altLang="zh-CN" baseline="0" dirty="0" smtClean="0"/>
+              <a:t>] This will play after you click.</a:t>
+            </a:r>
+          </a:p>
+        </p:txBody>
+      </p:sp>
+      <p:sp>
+        <p:nvSpPr>
+          <p:cNvPr id="4" name="Slide Number Placeholder 3"/>
+          <p:cNvSpPr>
+            <a:spLocks noGrp="1"/>
+          </p:cNvSpPr>
+          <p:nvPr>
+            <p:ph type="sldNum" sz="quarter" idx="10"/>
+          </p:nvPr>
+        </p:nvSpPr>
+        <p:spPr/>
+        <p:txBody>
+          <a:bodyPr/>
+          <a:lstStyle/>
+          <a:p>
+            <a:fld id="{0015B511-83B7-463E-ACD1-0C1C081EBBC4}" type="slidenum">
+              <a:rPr lang="en-SG" smtClean="0"/>
+              <a:t>26</a:t>
+            </a:fld>
+            <a:endParaRPr lang="en-SG"/>
+          </a:p>
+        </p:txBody>
+      </p:sp>
+    </p:spTree>
+    <p:extLst>
+      <p:ext uri="{BB962C8B-B14F-4D97-AF65-F5344CB8AC3E}">
+        <p14:creationId xmlns:p14="http://schemas.microsoft.com/office/powerpoint/2010/main" val="2911926025"/>
+      </p:ext>
+    </p:extLst>
+  </p:cSld>
+  <p:clrMapOvr>
+    <a:masterClrMapping/>
+  </p:clrMapOvr>
+</p:notes>
+</file>
+
 <file path=ppt/slideLayouts/slideLayout1.xml><?xml version="1.0" encoding="utf-8"?>
 <p:sldLayout xmlns:a="http://schemas.openxmlformats.org/drawingml/2006/main" xmlns:r="http://schemas.openxmlformats.org/officeDocument/2006/relationships" xmlns:p="http://schemas.openxmlformats.org/presentationml/2006/main" type="title" preserve="1">
   <p:cSld name="Title Slide">
@@ -1288,7 +1395,7 @@
             <a:fld id="{1D8BD707-D9CF-40AE-B4C6-C98DA3205C09}" type="datetimeFigureOut">
               <a:rPr lang="en-US" smtClean="0"/>
               <a:pPr/>
-              <a:t>6/3/2014</a:t>
+              <a:t>6/16/2014</a:t>
             </a:fld>
             <a:endParaRPr lang="en-US"/>
           </a:p>
@@ -1455,7 +1562,7 @@
             <a:fld id="{1D8BD707-D9CF-40AE-B4C6-C98DA3205C09}" type="datetimeFigureOut">
               <a:rPr lang="en-US" smtClean="0"/>
               <a:pPr/>
-              <a:t>6/3/2014</a:t>
+              <a:t>6/16/2014</a:t>
             </a:fld>
             <a:endParaRPr lang="en-US"/>
           </a:p>
@@ -1632,7 +1739,7 @@
             <a:fld id="{1D8BD707-D9CF-40AE-B4C6-C98DA3205C09}" type="datetimeFigureOut">
               <a:rPr lang="en-US" smtClean="0"/>
               <a:pPr/>
-              <a:t>6/3/2014</a:t>
+              <a:t>6/16/2014</a:t>
             </a:fld>
             <a:endParaRPr lang="en-US"/>
           </a:p>
@@ -1799,7 +1906,7 @@
             <a:fld id="{1D8BD707-D9CF-40AE-B4C6-C98DA3205C09}" type="datetimeFigureOut">
               <a:rPr lang="en-US" smtClean="0"/>
               <a:pPr/>
-              <a:t>6/3/2014</a:t>
+              <a:t>6/16/2014</a:t>
             </a:fld>
             <a:endParaRPr lang="en-US"/>
           </a:p>
@@ -2042,7 +2149,7 @@
             <a:fld id="{1D8BD707-D9CF-40AE-B4C6-C98DA3205C09}" type="datetimeFigureOut">
               <a:rPr lang="en-US" smtClean="0"/>
               <a:pPr/>
-              <a:t>6/3/2014</a:t>
+              <a:t>6/16/2014</a:t>
             </a:fld>
             <a:endParaRPr lang="en-US"/>
           </a:p>
@@ -2327,7 +2434,7 @@
             <a:fld id="{1D8BD707-D9CF-40AE-B4C6-C98DA3205C09}" type="datetimeFigureOut">
               <a:rPr lang="en-US" smtClean="0"/>
               <a:pPr/>
-              <a:t>6/3/2014</a:t>
+              <a:t>6/16/2014</a:t>
             </a:fld>
             <a:endParaRPr lang="en-US"/>
           </a:p>
@@ -2746,7 +2853,7 @@
             <a:fld id="{1D8BD707-D9CF-40AE-B4C6-C98DA3205C09}" type="datetimeFigureOut">
               <a:rPr lang="en-US" smtClean="0"/>
               <a:pPr/>
-              <a:t>6/3/2014</a:t>
+              <a:t>6/16/2014</a:t>
             </a:fld>
             <a:endParaRPr lang="en-US"/>
           </a:p>
@@ -2861,7 +2968,7 @@
             <a:fld id="{1D8BD707-D9CF-40AE-B4C6-C98DA3205C09}" type="datetimeFigureOut">
               <a:rPr lang="en-US" smtClean="0"/>
               <a:pPr/>
-              <a:t>6/3/2014</a:t>
+              <a:t>6/16/2014</a:t>
             </a:fld>
             <a:endParaRPr lang="en-US"/>
           </a:p>
@@ -2953,7 +3060,7 @@
             <a:fld id="{1D8BD707-D9CF-40AE-B4C6-C98DA3205C09}" type="datetimeFigureOut">
               <a:rPr lang="en-US" smtClean="0"/>
               <a:pPr/>
-              <a:t>6/3/2014</a:t>
+              <a:t>6/16/2014</a:t>
             </a:fld>
             <a:endParaRPr lang="en-US"/>
           </a:p>
@@ -3227,7 +3334,7 @@
             <a:fld id="{1D8BD707-D9CF-40AE-B4C6-C98DA3205C09}" type="datetimeFigureOut">
               <a:rPr lang="en-US" smtClean="0"/>
               <a:pPr/>
-              <a:t>6/3/2014</a:t>
+              <a:t>6/16/2014</a:t>
             </a:fld>
             <a:endParaRPr lang="en-US"/>
           </a:p>
@@ -3477,7 +3584,7 @@
             <a:fld id="{1D8BD707-D9CF-40AE-B4C6-C98DA3205C09}" type="datetimeFigureOut">
               <a:rPr lang="en-US" smtClean="0"/>
               <a:pPr/>
-              <a:t>6/3/2014</a:t>
+              <a:t>6/16/2014</a:t>
             </a:fld>
             <a:endParaRPr lang="en-US"/>
           </a:p>
@@ -3687,7 +3794,7 @@
             <a:fld id="{1D8BD707-D9CF-40AE-B4C6-C98DA3205C09}" type="datetimeFigureOut">
               <a:rPr lang="en-US" smtClean="0"/>
               <a:pPr/>
-              <a:t>6/3/2014</a:t>
+              <a:t>6/16/2014</a:t>
             </a:fld>
             <a:endParaRPr lang="en-US"/>
           </a:p>
@@ -14349,7 +14456,7 @@
       </p:grpSpPr>
       <p:sp>
         <p:nvSpPr>
-          <p:cNvPr id="7" name="TextBox 6"/>
+          <p:cNvPr id="7" name="[TextBox 6]"/>
           <p:cNvSpPr txBox="1"/>
           <p:nvPr/>
         </p:nvSpPr>
@@ -14458,7 +14565,7 @@
       </p:sp>
       <p:pic>
         <p:nvPicPr>
-          <p:cNvPr id="2050" name="Picture 2"/>
+          <p:cNvPr id="2050" name="[Picture 2]"/>
           <p:cNvPicPr>
             <a:picLocks noChangeAspect="1" noChangeArrowheads="1"/>
           </p:cNvPicPr>
@@ -14509,7 +14616,7 @@
       </p:pic>
       <p:pic>
         <p:nvPicPr>
-          <p:cNvPr id="2051" name="Picture 3"/>
+          <p:cNvPr id="2051" name="[Picture 3]"/>
           <p:cNvPicPr>
             <a:picLocks noChangeAspect="1" noChangeArrowheads="1"/>
           </p:cNvPicPr>
@@ -14563,7 +14670,7 @@
       </p:pic>
       <p:sp>
         <p:nvSpPr>
-          <p:cNvPr id="14" name="TextBox 13"/>
+          <p:cNvPr id="14" name="[TextBox 13]"/>
           <p:cNvSpPr txBox="1"/>
           <p:nvPr/>
         </p:nvSpPr>
@@ -14672,7 +14779,7 @@
       </p:sp>
       <p:pic>
         <p:nvPicPr>
-          <p:cNvPr id="2052" name="Picture 4"/>
+          <p:cNvPr id="2052" name="[Picture 4]"/>
           <p:cNvPicPr>
             <a:picLocks noChangeAspect="1" noChangeArrowheads="1"/>
           </p:cNvPicPr>
@@ -14760,6 +14867,766 @@
       </p:grpSpPr>
       <p:sp>
         <p:nvSpPr>
+          <p:cNvPr id="4" name="[TextBox 6]"/>
+          <p:cNvSpPr txBox="1"/>
+          <p:nvPr/>
+        </p:nvSpPr>
+        <p:spPr>
+          <a:xfrm>
+            <a:off x="685800" y="1044410"/>
+            <a:ext cx="5105400" cy="2462213"/>
+          </a:xfrm>
+          <a:prstGeom prst="rect">
+            <a:avLst/>
+          </a:prstGeom>
+          <a:noFill/>
+        </p:spPr>
+        <p:txBody>
+          <a:bodyPr wrap="square" rtlCol="0">
+            <a:spAutoFit/>
+          </a:bodyPr>
+          <a:lstStyle/>
+          <a:p>
+            <a:r>
+              <a:rPr lang="en-US" sz="2800" b="1" dirty="0" smtClean="0">
+                <a:solidFill>
+                  <a:schemeClr val="accent6">
+                    <a:lumMod val="75000"/>
+                  </a:schemeClr>
+                </a:solidFill>
+              </a:rPr>
+              <a:t>3.</a:t>
+            </a:r>
+            <a:r>
+              <a:rPr lang="en-US" dirty="0" smtClean="0">
+                <a:solidFill>
+                  <a:schemeClr val="accent6">
+                    <a:lumMod val="75000"/>
+                  </a:schemeClr>
+                </a:solidFill>
+              </a:rPr>
+              <a:t> To record an audio, click the drop down menu </a:t>
+            </a:r>
+          </a:p>
+          <a:p>
+            <a:endParaRPr lang="en-US" dirty="0">
+              <a:solidFill>
+                <a:schemeClr val="accent6">
+                  <a:lumMod val="75000"/>
+                </a:schemeClr>
+              </a:solidFill>
+            </a:endParaRPr>
+          </a:p>
+          <a:p>
+            <a:r>
+              <a:rPr lang="en-US" dirty="0" smtClean="0">
+                <a:solidFill>
+                  <a:schemeClr val="accent6">
+                    <a:lumMod val="75000"/>
+                  </a:schemeClr>
+                </a:solidFill>
+              </a:rPr>
+              <a:t>of                 </a:t>
+            </a:r>
+            <a:r>
+              <a:rPr lang="en-US" dirty="0" smtClean="0">
+                <a:solidFill>
+                  <a:schemeClr val="accent6">
+                    <a:lumMod val="75000"/>
+                  </a:schemeClr>
+                </a:solidFill>
+              </a:rPr>
+              <a:t>button. </a:t>
+            </a:r>
+            <a:endParaRPr lang="en-US" dirty="0" smtClean="0">
+              <a:solidFill>
+                <a:schemeClr val="accent6">
+                  <a:lumMod val="75000"/>
+                </a:schemeClr>
+              </a:solidFill>
+            </a:endParaRPr>
+          </a:p>
+          <a:p>
+            <a:r>
+              <a:rPr lang="en-US" dirty="0" smtClean="0">
+                <a:solidFill>
+                  <a:schemeClr val="accent6">
+                    <a:lumMod val="75000"/>
+                  </a:schemeClr>
+                </a:solidFill>
+              </a:rPr>
+              <a:t/>
+            </a:r>
+            <a:br>
+              <a:rPr lang="en-US" dirty="0" smtClean="0">
+                <a:solidFill>
+                  <a:schemeClr val="accent6">
+                    <a:lumMod val="75000"/>
+                  </a:schemeClr>
+                </a:solidFill>
+              </a:rPr>
+            </a:br>
+            <a:r>
+              <a:rPr lang="en-US" dirty="0" smtClean="0">
+                <a:solidFill>
+                  <a:schemeClr val="accent6">
+                    <a:lumMod val="75000"/>
+                  </a:schemeClr>
+                </a:solidFill>
+              </a:rPr>
+              <a:t/>
+            </a:r>
+            <a:br>
+              <a:rPr lang="en-US" dirty="0" smtClean="0">
+                <a:solidFill>
+                  <a:schemeClr val="accent6">
+                    <a:lumMod val="75000"/>
+                  </a:schemeClr>
+                </a:solidFill>
+              </a:rPr>
+            </a:br>
+            <a:r>
+              <a:rPr lang="en-US" dirty="0" smtClean="0">
+                <a:solidFill>
+                  <a:schemeClr val="accent6">
+                    <a:lumMod val="75000"/>
+                  </a:schemeClr>
+                </a:solidFill>
+              </a:rPr>
+              <a:t>It </a:t>
+            </a:r>
+            <a:r>
+              <a:rPr lang="en-US" dirty="0" smtClean="0">
+                <a:solidFill>
+                  <a:schemeClr val="accent6">
+                    <a:lumMod val="75000"/>
+                  </a:schemeClr>
+                </a:solidFill>
+              </a:rPr>
+              <a:t>will show Recorder Script Panel at right side of your screen, showing the recording status of the scripts of current slide.</a:t>
+            </a:r>
+            <a:endParaRPr lang="en-SG" dirty="0">
+              <a:solidFill>
+                <a:schemeClr val="accent6">
+                  <a:lumMod val="75000"/>
+                </a:schemeClr>
+              </a:solidFill>
+            </a:endParaRPr>
+          </a:p>
+        </p:txBody>
+      </p:sp>
+      <p:sp>
+        <p:nvSpPr>
+          <p:cNvPr id="7" name="[Picture 3]"/>
+          <p:cNvSpPr txBox="1"/>
+          <p:nvPr/>
+        </p:nvSpPr>
+        <p:spPr>
+          <a:xfrm>
+            <a:off x="685800" y="4038600"/>
+            <a:ext cx="4800600" cy="2462213"/>
+          </a:xfrm>
+          <a:prstGeom prst="rect">
+            <a:avLst/>
+          </a:prstGeom>
+          <a:noFill/>
+        </p:spPr>
+        <p:txBody>
+          <a:bodyPr wrap="square" rtlCol="0">
+            <a:spAutoFit/>
+          </a:bodyPr>
+          <a:lstStyle/>
+          <a:p>
+            <a:r>
+              <a:rPr lang="en-US" sz="2800" b="1" dirty="0" smtClean="0">
+                <a:solidFill>
+                  <a:schemeClr val="accent6">
+                    <a:lumMod val="75000"/>
+                  </a:schemeClr>
+                </a:solidFill>
+              </a:rPr>
+              <a:t>4.</a:t>
+            </a:r>
+            <a:r>
+              <a:rPr lang="en-US" dirty="0" smtClean="0">
+                <a:solidFill>
+                  <a:schemeClr val="accent6">
+                    <a:lumMod val="75000"/>
+                  </a:schemeClr>
+                </a:solidFill>
+              </a:rPr>
+              <a:t> </a:t>
+            </a:r>
+            <a:r>
+              <a:rPr lang="en-US" dirty="0" smtClean="0">
+                <a:solidFill>
+                  <a:schemeClr val="accent6">
+                    <a:lumMod val="75000"/>
+                  </a:schemeClr>
+                </a:solidFill>
+              </a:rPr>
+              <a:t>Click </a:t>
+            </a:r>
+            <a:r>
+              <a:rPr lang="en-US" dirty="0" smtClean="0">
+                <a:solidFill>
+                  <a:schemeClr val="accent6">
+                    <a:lumMod val="75000"/>
+                  </a:schemeClr>
+                </a:solidFill>
+              </a:rPr>
+              <a:t>on the script you want to record and </a:t>
+            </a:r>
+          </a:p>
+          <a:p>
+            <a:endParaRPr lang="en-US" dirty="0">
+              <a:solidFill>
+                <a:schemeClr val="accent6">
+                  <a:lumMod val="75000"/>
+                </a:schemeClr>
+              </a:solidFill>
+            </a:endParaRPr>
+          </a:p>
+          <a:p>
+            <a:r>
+              <a:rPr lang="en-US" dirty="0" smtClean="0">
+                <a:solidFill>
+                  <a:schemeClr val="accent6">
+                    <a:lumMod val="75000"/>
+                  </a:schemeClr>
+                </a:solidFill>
+              </a:rPr>
+              <a:t>click           button to start recording. When you </a:t>
+            </a:r>
+          </a:p>
+          <a:p>
+            <a:endParaRPr lang="en-US" dirty="0">
+              <a:solidFill>
+                <a:schemeClr val="accent6">
+                  <a:lumMod val="75000"/>
+                </a:schemeClr>
+              </a:solidFill>
+            </a:endParaRPr>
+          </a:p>
+          <a:p>
+            <a:r>
+              <a:rPr lang="en-US" dirty="0" smtClean="0">
+                <a:solidFill>
+                  <a:schemeClr val="accent6">
+                    <a:lumMod val="75000"/>
+                  </a:schemeClr>
+                </a:solidFill>
+              </a:rPr>
+              <a:t>click          button, the record will be auto-</a:t>
+            </a:r>
+          </a:p>
+          <a:p>
+            <a:endParaRPr lang="en-US" dirty="0">
+              <a:solidFill>
+                <a:schemeClr val="accent6">
+                  <a:lumMod val="75000"/>
+                </a:schemeClr>
+              </a:solidFill>
+            </a:endParaRPr>
+          </a:p>
+          <a:p>
+            <a:r>
+              <a:rPr lang="en-US" dirty="0" smtClean="0">
+                <a:solidFill>
+                  <a:schemeClr val="accent6">
+                    <a:lumMod val="75000"/>
+                  </a:schemeClr>
+                </a:solidFill>
+              </a:rPr>
+              <a:t>embedded on the slide, and you can check it in the panel.</a:t>
+            </a:r>
+            <a:endParaRPr lang="en-SG" dirty="0">
+              <a:solidFill>
+                <a:schemeClr val="accent6">
+                  <a:lumMod val="75000"/>
+                </a:schemeClr>
+              </a:solidFill>
+            </a:endParaRPr>
+          </a:p>
+        </p:txBody>
+      </p:sp>
+      <p:pic>
+        <p:nvPicPr>
+          <p:cNvPr id="9" name="Picture 8"/>
+          <p:cNvPicPr>
+            <a:picLocks noChangeAspect="1"/>
+          </p:cNvPicPr>
+          <p:nvPr/>
+        </p:nvPicPr>
+        <p:blipFill rotWithShape="1">
+          <a:blip r:embed="rId3"/>
+          <a:srcRect l="11111" t="7310"/>
+          <a:stretch/>
+        </p:blipFill>
+        <p:spPr>
+          <a:xfrm>
+            <a:off x="1143000" y="1447800"/>
+            <a:ext cx="609600" cy="966216"/>
+          </a:xfrm>
+          <a:prstGeom prst="rect">
+            <a:avLst/>
+          </a:prstGeom>
+        </p:spPr>
+      </p:pic>
+      <p:pic>
+        <p:nvPicPr>
+          <p:cNvPr id="14" name="Picture 13"/>
+          <p:cNvPicPr>
+            <a:picLocks noChangeAspect="1"/>
+          </p:cNvPicPr>
+          <p:nvPr/>
+        </p:nvPicPr>
+        <p:blipFill rotWithShape="1">
+          <a:blip r:embed="rId4"/>
+          <a:srcRect b="1229"/>
+          <a:stretch/>
+        </p:blipFill>
+        <p:spPr>
+          <a:xfrm>
+            <a:off x="5730854" y="252984"/>
+            <a:ext cx="3184546" cy="6376416"/>
+          </a:xfrm>
+          <a:prstGeom prst="rect">
+            <a:avLst/>
+          </a:prstGeom>
+        </p:spPr>
+      </p:pic>
+      <p:pic>
+        <p:nvPicPr>
+          <p:cNvPr id="16" name="Picture 15"/>
+          <p:cNvPicPr>
+            <a:picLocks noChangeAspect="1"/>
+          </p:cNvPicPr>
+          <p:nvPr/>
+        </p:nvPicPr>
+        <p:blipFill>
+          <a:blip r:embed="rId5">
+            <a:extLst>
+              <a:ext uri="{28A0092B-C50C-407E-A947-70E740481C1C}">
+                <a14:useLocalDpi xmlns:a14="http://schemas.microsoft.com/office/drawing/2010/main" val="0"/>
+              </a:ext>
+            </a:extLst>
+          </a:blip>
+          <a:stretch>
+            <a:fillRect/>
+          </a:stretch>
+        </p:blipFill>
+        <p:spPr>
+          <a:xfrm>
+            <a:off x="1244625" y="4724400"/>
+            <a:ext cx="406349" cy="406349"/>
+          </a:xfrm>
+          <a:prstGeom prst="rect">
+            <a:avLst/>
+          </a:prstGeom>
+        </p:spPr>
+      </p:pic>
+      <p:pic>
+        <p:nvPicPr>
+          <p:cNvPr id="17" name="Picture 16"/>
+          <p:cNvPicPr>
+            <a:picLocks noChangeAspect="1"/>
+          </p:cNvPicPr>
+          <p:nvPr/>
+        </p:nvPicPr>
+        <p:blipFill>
+          <a:blip r:embed="rId6">
+            <a:extLst>
+              <a:ext uri="{28A0092B-C50C-407E-A947-70E740481C1C}">
+                <a14:useLocalDpi xmlns:a14="http://schemas.microsoft.com/office/drawing/2010/main" val="0"/>
+              </a:ext>
+            </a:extLst>
+          </a:blip>
+          <a:stretch>
+            <a:fillRect/>
+          </a:stretch>
+        </p:blipFill>
+        <p:spPr>
+          <a:xfrm>
+            <a:off x="1244624" y="5289106"/>
+            <a:ext cx="406349" cy="406349"/>
+          </a:xfrm>
+          <a:prstGeom prst="rect">
+            <a:avLst/>
+          </a:prstGeom>
+        </p:spPr>
+      </p:pic>
+      <p:pic>
+        <p:nvPicPr>
+          <p:cNvPr id="20" name="Picture 19"/>
+          <p:cNvPicPr>
+            <a:picLocks noChangeAspect="1"/>
+          </p:cNvPicPr>
+          <p:nvPr/>
+        </p:nvPicPr>
+        <p:blipFill>
+          <a:blip r:embed="rId7"/>
+          <a:stretch>
+            <a:fillRect/>
+          </a:stretch>
+        </p:blipFill>
+        <p:spPr>
+          <a:xfrm>
+            <a:off x="5730854" y="252984"/>
+            <a:ext cx="3184546" cy="6445173"/>
+          </a:xfrm>
+          <a:prstGeom prst="rect">
+            <a:avLst/>
+          </a:prstGeom>
+        </p:spPr>
+      </p:pic>
+    </p:spTree>
+    <p:extLst>
+      <p:ext uri="{BB962C8B-B14F-4D97-AF65-F5344CB8AC3E}">
+        <p14:creationId xmlns:p14="http://schemas.microsoft.com/office/powerpoint/2010/main" val="1999255668"/>
+      </p:ext>
+    </p:extLst>
+  </p:cSld>
+  <p:clrMapOvr>
+    <a:masterClrMapping/>
+  </p:clrMapOvr>
+  <p:timing>
+    <p:tnLst>
+      <p:par>
+        <p:cTn id="1" dur="indefinite" restart="never" nodeType="tmRoot">
+          <p:childTnLst>
+            <p:seq concurrent="1" nextAc="seek">
+              <p:cTn id="2" dur="indefinite" nodeType="mainSeq">
+                <p:childTnLst>
+                  <p:par>
+                    <p:cTn id="3" fill="hold">
+                      <p:stCondLst>
+                        <p:cond delay="indefinite"/>
+                      </p:stCondLst>
+                      <p:childTnLst>
+                        <p:par>
+                          <p:cTn id="4" fill="hold">
+                            <p:stCondLst>
+                              <p:cond delay="0"/>
+                            </p:stCondLst>
+                            <p:childTnLst>
+                              <p:par>
+                                <p:cTn id="5" presetID="10" presetClass="entr" presetSubtype="0" fill="hold" nodeType="clickEffect">
+                                  <p:stCondLst>
+                                    <p:cond delay="0"/>
+                                  </p:stCondLst>
+                                  <p:childTnLst>
+                                    <p:set>
+                                      <p:cBhvr>
+                                        <p:cTn id="6" dur="1" fill="hold">
+                                          <p:stCondLst>
+                                            <p:cond delay="0"/>
+                                          </p:stCondLst>
+                                        </p:cTn>
+                                        <p:tgtEl>
+                                          <p:spTgt spid="9"/>
+                                        </p:tgtEl>
+                                        <p:attrNameLst>
+                                          <p:attrName>style.visibility</p:attrName>
+                                        </p:attrNameLst>
+                                      </p:cBhvr>
+                                      <p:to>
+                                        <p:strVal val="visible"/>
+                                      </p:to>
+                                    </p:set>
+                                    <p:animEffect transition="in" filter="fade">
+                                      <p:cBhvr>
+                                        <p:cTn id="7" dur="500"/>
+                                        <p:tgtEl>
+                                          <p:spTgt spid="9"/>
+                                        </p:tgtEl>
+                                      </p:cBhvr>
+                                    </p:animEffect>
+                                  </p:childTnLst>
+                                </p:cTn>
+                              </p:par>
+                              <p:par>
+                                <p:cTn id="8" presetID="10" presetClass="entr" presetSubtype="0" fill="hold" grpId="0" nodeType="withEffect">
+                                  <p:stCondLst>
+                                    <p:cond delay="0"/>
+                                  </p:stCondLst>
+                                  <p:childTnLst>
+                                    <p:set>
+                                      <p:cBhvr>
+                                        <p:cTn id="9" dur="1" fill="hold">
+                                          <p:stCondLst>
+                                            <p:cond delay="0"/>
+                                          </p:stCondLst>
+                                        </p:cTn>
+                                        <p:tgtEl>
+                                          <p:spTgt spid="4"/>
+                                        </p:tgtEl>
+                                        <p:attrNameLst>
+                                          <p:attrName>style.visibility</p:attrName>
+                                        </p:attrNameLst>
+                                      </p:cBhvr>
+                                      <p:to>
+                                        <p:strVal val="visible"/>
+                                      </p:to>
+                                    </p:set>
+                                    <p:animEffect transition="in" filter="fade">
+                                      <p:cBhvr>
+                                        <p:cTn id="10" dur="500"/>
+                                        <p:tgtEl>
+                                          <p:spTgt spid="4"/>
+                                        </p:tgtEl>
+                                      </p:cBhvr>
+                                    </p:animEffect>
+                                  </p:childTnLst>
+                                </p:cTn>
+                              </p:par>
+                              <p:par>
+                                <p:cTn id="11" presetID="10" presetClass="entr" presetSubtype="0" fill="hold" nodeType="withEffect">
+                                  <p:stCondLst>
+                                    <p:cond delay="0"/>
+                                  </p:stCondLst>
+                                  <p:childTnLst>
+                                    <p:set>
+                                      <p:cBhvr>
+                                        <p:cTn id="12" dur="1" fill="hold">
+                                          <p:stCondLst>
+                                            <p:cond delay="0"/>
+                                          </p:stCondLst>
+                                        </p:cTn>
+                                        <p:tgtEl>
+                                          <p:spTgt spid="14"/>
+                                        </p:tgtEl>
+                                        <p:attrNameLst>
+                                          <p:attrName>style.visibility</p:attrName>
+                                        </p:attrNameLst>
+                                      </p:cBhvr>
+                                      <p:to>
+                                        <p:strVal val="visible"/>
+                                      </p:to>
+                                    </p:set>
+                                    <p:animEffect transition="in" filter="fade">
+                                      <p:cBhvr>
+                                        <p:cTn id="13" dur="500"/>
+                                        <p:tgtEl>
+                                          <p:spTgt spid="14"/>
+                                        </p:tgtEl>
+                                      </p:cBhvr>
+                                    </p:animEffect>
+                                  </p:childTnLst>
+                                </p:cTn>
+                              </p:par>
+                            </p:childTnLst>
+                          </p:cTn>
+                        </p:par>
+                      </p:childTnLst>
+                    </p:cTn>
+                  </p:par>
+                  <p:par>
+                    <p:cTn id="14" fill="hold">
+                      <p:stCondLst>
+                        <p:cond delay="indefinite"/>
+                      </p:stCondLst>
+                      <p:childTnLst>
+                        <p:par>
+                          <p:cTn id="15" fill="hold">
+                            <p:stCondLst>
+                              <p:cond delay="0"/>
+                            </p:stCondLst>
+                            <p:childTnLst>
+                              <p:par>
+                                <p:cTn id="16" presetID="10" presetClass="entr" presetSubtype="0" fill="hold" grpId="0" nodeType="clickEffect">
+                                  <p:stCondLst>
+                                    <p:cond delay="0"/>
+                                  </p:stCondLst>
+                                  <p:childTnLst>
+                                    <p:set>
+                                      <p:cBhvr>
+                                        <p:cTn id="17" dur="1" fill="hold">
+                                          <p:stCondLst>
+                                            <p:cond delay="0"/>
+                                          </p:stCondLst>
+                                        </p:cTn>
+                                        <p:tgtEl>
+                                          <p:spTgt spid="7"/>
+                                        </p:tgtEl>
+                                        <p:attrNameLst>
+                                          <p:attrName>style.visibility</p:attrName>
+                                        </p:attrNameLst>
+                                      </p:cBhvr>
+                                      <p:to>
+                                        <p:strVal val="visible"/>
+                                      </p:to>
+                                    </p:set>
+                                    <p:animEffect transition="in" filter="fade">
+                                      <p:cBhvr>
+                                        <p:cTn id="18" dur="500"/>
+                                        <p:tgtEl>
+                                          <p:spTgt spid="7"/>
+                                        </p:tgtEl>
+                                      </p:cBhvr>
+                                    </p:animEffect>
+                                  </p:childTnLst>
+                                </p:cTn>
+                              </p:par>
+                              <p:par>
+                                <p:cTn id="19" presetID="10" presetClass="entr" presetSubtype="0" fill="hold" nodeType="withEffect">
+                                  <p:stCondLst>
+                                    <p:cond delay="0"/>
+                                  </p:stCondLst>
+                                  <p:childTnLst>
+                                    <p:set>
+                                      <p:cBhvr>
+                                        <p:cTn id="20" dur="1" fill="hold">
+                                          <p:stCondLst>
+                                            <p:cond delay="0"/>
+                                          </p:stCondLst>
+                                        </p:cTn>
+                                        <p:tgtEl>
+                                          <p:spTgt spid="16"/>
+                                        </p:tgtEl>
+                                        <p:attrNameLst>
+                                          <p:attrName>style.visibility</p:attrName>
+                                        </p:attrNameLst>
+                                      </p:cBhvr>
+                                      <p:to>
+                                        <p:strVal val="visible"/>
+                                      </p:to>
+                                    </p:set>
+                                    <p:animEffect transition="in" filter="fade">
+                                      <p:cBhvr>
+                                        <p:cTn id="21" dur="500"/>
+                                        <p:tgtEl>
+                                          <p:spTgt spid="16"/>
+                                        </p:tgtEl>
+                                      </p:cBhvr>
+                                    </p:animEffect>
+                                  </p:childTnLst>
+                                </p:cTn>
+                              </p:par>
+                              <p:par>
+                                <p:cTn id="22" presetID="10" presetClass="entr" presetSubtype="0" fill="hold" nodeType="withEffect">
+                                  <p:stCondLst>
+                                    <p:cond delay="0"/>
+                                  </p:stCondLst>
+                                  <p:childTnLst>
+                                    <p:set>
+                                      <p:cBhvr>
+                                        <p:cTn id="23" dur="1" fill="hold">
+                                          <p:stCondLst>
+                                            <p:cond delay="0"/>
+                                          </p:stCondLst>
+                                        </p:cTn>
+                                        <p:tgtEl>
+                                          <p:spTgt spid="17"/>
+                                        </p:tgtEl>
+                                        <p:attrNameLst>
+                                          <p:attrName>style.visibility</p:attrName>
+                                        </p:attrNameLst>
+                                      </p:cBhvr>
+                                      <p:to>
+                                        <p:strVal val="visible"/>
+                                      </p:to>
+                                    </p:set>
+                                    <p:animEffect transition="in" filter="fade">
+                                      <p:cBhvr>
+                                        <p:cTn id="24" dur="500"/>
+                                        <p:tgtEl>
+                                          <p:spTgt spid="17"/>
+                                        </p:tgtEl>
+                                      </p:cBhvr>
+                                    </p:animEffect>
+                                  </p:childTnLst>
+                                </p:cTn>
+                              </p:par>
+                              <p:par>
+                                <p:cTn id="25" presetID="10" presetClass="entr" presetSubtype="0" fill="hold" nodeType="withEffect">
+                                  <p:stCondLst>
+                                    <p:cond delay="0"/>
+                                  </p:stCondLst>
+                                  <p:childTnLst>
+                                    <p:set>
+                                      <p:cBhvr>
+                                        <p:cTn id="26" dur="1" fill="hold">
+                                          <p:stCondLst>
+                                            <p:cond delay="0"/>
+                                          </p:stCondLst>
+                                        </p:cTn>
+                                        <p:tgtEl>
+                                          <p:spTgt spid="20"/>
+                                        </p:tgtEl>
+                                        <p:attrNameLst>
+                                          <p:attrName>style.visibility</p:attrName>
+                                        </p:attrNameLst>
+                                      </p:cBhvr>
+                                      <p:to>
+                                        <p:strVal val="visible"/>
+                                      </p:to>
+                                    </p:set>
+                                    <p:animEffect transition="in" filter="fade">
+                                      <p:cBhvr>
+                                        <p:cTn id="27" dur="500"/>
+                                        <p:tgtEl>
+                                          <p:spTgt spid="20"/>
+                                        </p:tgtEl>
+                                      </p:cBhvr>
+                                    </p:animEffect>
+                                  </p:childTnLst>
+                                </p:cTn>
+                              </p:par>
+                            </p:childTnLst>
+                          </p:cTn>
+                        </p:par>
+                      </p:childTnLst>
+                    </p:cTn>
+                  </p:par>
+                </p:childTnLst>
+              </p:cTn>
+              <p:prevCondLst>
+                <p:cond evt="onPrev" delay="0">
+                  <p:tgtEl>
+                    <p:sldTgt/>
+                  </p:tgtEl>
+                </p:cond>
+              </p:prevCondLst>
+              <p:nextCondLst>
+                <p:cond evt="onNext" delay="0">
+                  <p:tgtEl>
+                    <p:sldTgt/>
+                  </p:tgtEl>
+                </p:cond>
+              </p:nextCondLst>
+            </p:seq>
+          </p:childTnLst>
+        </p:cTn>
+      </p:par>
+    </p:tnLst>
+    <p:bldLst>
+      <p:bldP spid="4" grpId="0"/>
+      <p:bldP spid="7" grpId="0"/>
+    </p:bldLst>
+  </p:timing>
+</p:sld>
+</file>
+
+<file path=ppt/slides/slide27.xml><?xml version="1.0" encoding="utf-8"?>
+<p:sld xmlns:a="http://schemas.openxmlformats.org/drawingml/2006/main" xmlns:r="http://schemas.openxmlformats.org/officeDocument/2006/relationships" xmlns:p="http://schemas.openxmlformats.org/presentationml/2006/main">
+  <p:cSld>
+    <p:spTree>
+      <p:nvGrpSpPr>
+        <p:cNvPr id="1" name=""/>
+        <p:cNvGrpSpPr/>
+        <p:nvPr/>
+      </p:nvGrpSpPr>
+      <p:grpSpPr>
+        <a:xfrm>
+          <a:off x="0" y="0"/>
+          <a:ext cx="0" cy="0"/>
+          <a:chOff x="0" y="0"/>
+          <a:chExt cx="0" cy="0"/>
+        </a:xfrm>
+      </p:grpSpPr>
+      <p:sp>
+        <p:nvSpPr>
           <p:cNvPr id="16" name="TextBox 15"/>
           <p:cNvSpPr txBox="1"/>
           <p:nvPr/>
@@ -15035,7 +15902,7 @@
 </p:sld>
 </file>
 
-<file path=ppt/slides/slide27.xml><?xml version="1.0" encoding="utf-8"?>
+<file path=ppt/slides/slide28.xml><?xml version="1.0" encoding="utf-8"?>
 <p:sld xmlns:a="http://schemas.openxmlformats.org/drawingml/2006/main" xmlns:r="http://schemas.openxmlformats.org/officeDocument/2006/relationships" xmlns:p="http://schemas.openxmlformats.org/presentationml/2006/main" show="0">
   <p:cSld name="PPAck201401021130490549">
     <p:spTree>

</xml_diff>

<commit_message>
fixes #407, function works but need more general function
</commit_message>
<xml_diff>
--- a/PowerPointLabs/PowerPointLabs/PowerPointLabs Quick Tutorial.pptx
+++ b/PowerPointLabs/PowerPointLabs/PowerPointLabs Quick Tutorial.pptx
@@ -5,7 +5,7 @@
     <p:sldMasterId id="2147483648" r:id="rId1"/>
   </p:sldMasterIdLst>
   <p:notesMasterIdLst>
-    <p:notesMasterId r:id="rId29"/>
+    <p:notesMasterId r:id="rId30"/>
   </p:notesMasterIdLst>
   <p:sldIdLst>
     <p:sldId id="296" r:id="rId2"/>
@@ -33,8 +33,9 @@
     <p:sldId id="327" r:id="rId24"/>
     <p:sldId id="310" r:id="rId25"/>
     <p:sldId id="326" r:id="rId26"/>
-    <p:sldId id="305" r:id="rId27"/>
-    <p:sldId id="299" r:id="rId28"/>
+    <p:sldId id="331" r:id="rId27"/>
+    <p:sldId id="305" r:id="rId28"/>
+    <p:sldId id="299" r:id="rId29"/>
   </p:sldIdLst>
   <p:sldSz cx="9144000" cy="6858000" type="screen4x3"/>
   <p:notesSz cx="6858000" cy="9144000"/>
@@ -187,6 +188,7 @@
           <p14:sldIdLst>
             <p14:sldId id="310"/>
             <p14:sldId id="326"/>
+            <p14:sldId id="331"/>
           </p14:sldIdLst>
         </p14:section>
         <p14:section name="Wrap up" id="{5BBA1A93-B239-4917-BAC7-9CBE7A60C0BF}">
@@ -422,7 +424,7 @@
           <a:p>
             <a:fld id="{3E86CC0F-BBF3-4E07-94E0-0549B7D560A9}" type="datetimeFigureOut">
               <a:rPr lang="en-SG" smtClean="0"/>
-              <a:t>3/6/2014</a:t>
+              <a:t>16/6/2014</a:t>
             </a:fld>
             <a:endParaRPr lang="en-SG"/>
           </a:p>
@@ -1106,6 +1108,111 @@
 </p:notes>
 </file>
 
+<file path=ppt/notesSlides/notesSlide5.xml><?xml version="1.0" encoding="utf-8"?>
+<p:notes xmlns:a="http://schemas.openxmlformats.org/drawingml/2006/main" xmlns:r="http://schemas.openxmlformats.org/officeDocument/2006/relationships" xmlns:p="http://schemas.openxmlformats.org/presentationml/2006/main">
+  <p:cSld>
+    <p:spTree>
+      <p:nvGrpSpPr>
+        <p:cNvPr id="1" name=""/>
+        <p:cNvGrpSpPr/>
+        <p:nvPr/>
+      </p:nvGrpSpPr>
+      <p:grpSpPr>
+        <a:xfrm>
+          <a:off x="0" y="0"/>
+          <a:ext cx="0" cy="0"/>
+          <a:chOff x="0" y="0"/>
+          <a:chExt cx="0" cy="0"/>
+        </a:xfrm>
+      </p:grpSpPr>
+      <p:sp>
+        <p:nvSpPr>
+          <p:cNvPr id="2" name="Slide Image Placeholder 1"/>
+          <p:cNvSpPr>
+            <a:spLocks noGrp="1" noRot="1" noChangeAspect="1"/>
+          </p:cNvSpPr>
+          <p:nvPr>
+            <p:ph type="sldImg"/>
+          </p:nvPr>
+        </p:nvSpPr>
+        <p:spPr/>
+      </p:sp>
+      <p:sp>
+        <p:nvSpPr>
+          <p:cNvPr id="3" name="Notes Placeholder 2"/>
+          <p:cNvSpPr>
+            <a:spLocks noGrp="1"/>
+          </p:cNvSpPr>
+          <p:nvPr>
+            <p:ph type="body" idx="1"/>
+          </p:nvPr>
+        </p:nvSpPr>
+        <p:spPr/>
+        <p:txBody>
+          <a:bodyPr/>
+          <a:lstStyle/>
+          <a:p>
+            <a:r>
+              <a:rPr lang="en-US" altLang="zh-CN" dirty="0" smtClean="0"/>
+              <a:t>This will</a:t>
+            </a:r>
+            <a:r>
+              <a:rPr lang="en-US" altLang="zh-CN" baseline="0" dirty="0" smtClean="0"/>
+              <a:t> play at the beginning.</a:t>
+            </a:r>
+          </a:p>
+          <a:p>
+            <a:r>
+              <a:rPr lang="en-US" altLang="zh-CN" baseline="0" dirty="0" smtClean="0"/>
+              <a:t>[</a:t>
+            </a:r>
+            <a:r>
+              <a:rPr lang="en-US" altLang="zh-CN" baseline="0" dirty="0" err="1" smtClean="0"/>
+              <a:t>afterClick</a:t>
+            </a:r>
+            <a:r>
+              <a:rPr lang="en-US" altLang="zh-CN" baseline="0" dirty="0" smtClean="0"/>
+              <a:t>] This will play after you click.</a:t>
+            </a:r>
+          </a:p>
+        </p:txBody>
+      </p:sp>
+      <p:sp>
+        <p:nvSpPr>
+          <p:cNvPr id="4" name="Slide Number Placeholder 3"/>
+          <p:cNvSpPr>
+            <a:spLocks noGrp="1"/>
+          </p:cNvSpPr>
+          <p:nvPr>
+            <p:ph type="sldNum" sz="quarter" idx="10"/>
+          </p:nvPr>
+        </p:nvSpPr>
+        <p:spPr/>
+        <p:txBody>
+          <a:bodyPr/>
+          <a:lstStyle/>
+          <a:p>
+            <a:fld id="{0015B511-83B7-463E-ACD1-0C1C081EBBC4}" type="slidenum">
+              <a:rPr lang="en-SG" smtClean="0"/>
+              <a:t>26</a:t>
+            </a:fld>
+            <a:endParaRPr lang="en-SG"/>
+          </a:p>
+        </p:txBody>
+      </p:sp>
+    </p:spTree>
+    <p:extLst>
+      <p:ext uri="{BB962C8B-B14F-4D97-AF65-F5344CB8AC3E}">
+        <p14:creationId xmlns:p14="http://schemas.microsoft.com/office/powerpoint/2010/main" val="2911926025"/>
+      </p:ext>
+    </p:extLst>
+  </p:cSld>
+  <p:clrMapOvr>
+    <a:masterClrMapping/>
+  </p:clrMapOvr>
+</p:notes>
+</file>
+
 <file path=ppt/slideLayouts/slideLayout1.xml><?xml version="1.0" encoding="utf-8"?>
 <p:sldLayout xmlns:a="http://schemas.openxmlformats.org/drawingml/2006/main" xmlns:r="http://schemas.openxmlformats.org/officeDocument/2006/relationships" xmlns:p="http://schemas.openxmlformats.org/presentationml/2006/main" type="title" preserve="1">
   <p:cSld name="Title Slide">
@@ -1288,7 +1395,7 @@
             <a:fld id="{1D8BD707-D9CF-40AE-B4C6-C98DA3205C09}" type="datetimeFigureOut">
               <a:rPr lang="en-US" smtClean="0"/>
               <a:pPr/>
-              <a:t>6/3/2014</a:t>
+              <a:t>6/16/2014</a:t>
             </a:fld>
             <a:endParaRPr lang="en-US"/>
           </a:p>
@@ -1455,7 +1562,7 @@
             <a:fld id="{1D8BD707-D9CF-40AE-B4C6-C98DA3205C09}" type="datetimeFigureOut">
               <a:rPr lang="en-US" smtClean="0"/>
               <a:pPr/>
-              <a:t>6/3/2014</a:t>
+              <a:t>6/16/2014</a:t>
             </a:fld>
             <a:endParaRPr lang="en-US"/>
           </a:p>
@@ -1632,7 +1739,7 @@
             <a:fld id="{1D8BD707-D9CF-40AE-B4C6-C98DA3205C09}" type="datetimeFigureOut">
               <a:rPr lang="en-US" smtClean="0"/>
               <a:pPr/>
-              <a:t>6/3/2014</a:t>
+              <a:t>6/16/2014</a:t>
             </a:fld>
             <a:endParaRPr lang="en-US"/>
           </a:p>
@@ -1799,7 +1906,7 @@
             <a:fld id="{1D8BD707-D9CF-40AE-B4C6-C98DA3205C09}" type="datetimeFigureOut">
               <a:rPr lang="en-US" smtClean="0"/>
               <a:pPr/>
-              <a:t>6/3/2014</a:t>
+              <a:t>6/16/2014</a:t>
             </a:fld>
             <a:endParaRPr lang="en-US"/>
           </a:p>
@@ -2042,7 +2149,7 @@
             <a:fld id="{1D8BD707-D9CF-40AE-B4C6-C98DA3205C09}" type="datetimeFigureOut">
               <a:rPr lang="en-US" smtClean="0"/>
               <a:pPr/>
-              <a:t>6/3/2014</a:t>
+              <a:t>6/16/2014</a:t>
             </a:fld>
             <a:endParaRPr lang="en-US"/>
           </a:p>
@@ -2327,7 +2434,7 @@
             <a:fld id="{1D8BD707-D9CF-40AE-B4C6-C98DA3205C09}" type="datetimeFigureOut">
               <a:rPr lang="en-US" smtClean="0"/>
               <a:pPr/>
-              <a:t>6/3/2014</a:t>
+              <a:t>6/16/2014</a:t>
             </a:fld>
             <a:endParaRPr lang="en-US"/>
           </a:p>
@@ -2746,7 +2853,7 @@
             <a:fld id="{1D8BD707-D9CF-40AE-B4C6-C98DA3205C09}" type="datetimeFigureOut">
               <a:rPr lang="en-US" smtClean="0"/>
               <a:pPr/>
-              <a:t>6/3/2014</a:t>
+              <a:t>6/16/2014</a:t>
             </a:fld>
             <a:endParaRPr lang="en-US"/>
           </a:p>
@@ -2861,7 +2968,7 @@
             <a:fld id="{1D8BD707-D9CF-40AE-B4C6-C98DA3205C09}" type="datetimeFigureOut">
               <a:rPr lang="en-US" smtClean="0"/>
               <a:pPr/>
-              <a:t>6/3/2014</a:t>
+              <a:t>6/16/2014</a:t>
             </a:fld>
             <a:endParaRPr lang="en-US"/>
           </a:p>
@@ -2953,7 +3060,7 @@
             <a:fld id="{1D8BD707-D9CF-40AE-B4C6-C98DA3205C09}" type="datetimeFigureOut">
               <a:rPr lang="en-US" smtClean="0"/>
               <a:pPr/>
-              <a:t>6/3/2014</a:t>
+              <a:t>6/16/2014</a:t>
             </a:fld>
             <a:endParaRPr lang="en-US"/>
           </a:p>
@@ -3227,7 +3334,7 @@
             <a:fld id="{1D8BD707-D9CF-40AE-B4C6-C98DA3205C09}" type="datetimeFigureOut">
               <a:rPr lang="en-US" smtClean="0"/>
               <a:pPr/>
-              <a:t>6/3/2014</a:t>
+              <a:t>6/16/2014</a:t>
             </a:fld>
             <a:endParaRPr lang="en-US"/>
           </a:p>
@@ -3477,7 +3584,7 @@
             <a:fld id="{1D8BD707-D9CF-40AE-B4C6-C98DA3205C09}" type="datetimeFigureOut">
               <a:rPr lang="en-US" smtClean="0"/>
               <a:pPr/>
-              <a:t>6/3/2014</a:t>
+              <a:t>6/16/2014</a:t>
             </a:fld>
             <a:endParaRPr lang="en-US"/>
           </a:p>
@@ -3687,7 +3794,7 @@
             <a:fld id="{1D8BD707-D9CF-40AE-B4C6-C98DA3205C09}" type="datetimeFigureOut">
               <a:rPr lang="en-US" smtClean="0"/>
               <a:pPr/>
-              <a:t>6/3/2014</a:t>
+              <a:t>6/16/2014</a:t>
             </a:fld>
             <a:endParaRPr lang="en-US"/>
           </a:p>
@@ -14349,7 +14456,7 @@
       </p:grpSpPr>
       <p:sp>
         <p:nvSpPr>
-          <p:cNvPr id="7" name="TextBox 6"/>
+          <p:cNvPr id="7" name="[TextBox 6]"/>
           <p:cNvSpPr txBox="1"/>
           <p:nvPr/>
         </p:nvSpPr>
@@ -14458,7 +14565,7 @@
       </p:sp>
       <p:pic>
         <p:nvPicPr>
-          <p:cNvPr id="2050" name="Picture 2"/>
+          <p:cNvPr id="2050" name="[Picture 2]"/>
           <p:cNvPicPr>
             <a:picLocks noChangeAspect="1" noChangeArrowheads="1"/>
           </p:cNvPicPr>
@@ -14509,7 +14616,7 @@
       </p:pic>
       <p:pic>
         <p:nvPicPr>
-          <p:cNvPr id="2051" name="Picture 3"/>
+          <p:cNvPr id="2051" name="[Picture 3]"/>
           <p:cNvPicPr>
             <a:picLocks noChangeAspect="1" noChangeArrowheads="1"/>
           </p:cNvPicPr>
@@ -14563,7 +14670,7 @@
       </p:pic>
       <p:sp>
         <p:nvSpPr>
-          <p:cNvPr id="14" name="TextBox 13"/>
+          <p:cNvPr id="14" name="[TextBox 13]"/>
           <p:cNvSpPr txBox="1"/>
           <p:nvPr/>
         </p:nvSpPr>
@@ -14672,7 +14779,7 @@
       </p:sp>
       <p:pic>
         <p:nvPicPr>
-          <p:cNvPr id="2052" name="Picture 4"/>
+          <p:cNvPr id="2052" name="[Picture 4]"/>
           <p:cNvPicPr>
             <a:picLocks noChangeAspect="1" noChangeArrowheads="1"/>
           </p:cNvPicPr>
@@ -14760,6 +14867,766 @@
       </p:grpSpPr>
       <p:sp>
         <p:nvSpPr>
+          <p:cNvPr id="4" name="[TextBox 6]"/>
+          <p:cNvSpPr txBox="1"/>
+          <p:nvPr/>
+        </p:nvSpPr>
+        <p:spPr>
+          <a:xfrm>
+            <a:off x="685800" y="1044410"/>
+            <a:ext cx="5105400" cy="2462213"/>
+          </a:xfrm>
+          <a:prstGeom prst="rect">
+            <a:avLst/>
+          </a:prstGeom>
+          <a:noFill/>
+        </p:spPr>
+        <p:txBody>
+          <a:bodyPr wrap="square" rtlCol="0">
+            <a:spAutoFit/>
+          </a:bodyPr>
+          <a:lstStyle/>
+          <a:p>
+            <a:r>
+              <a:rPr lang="en-US" sz="2800" b="1" dirty="0" smtClean="0">
+                <a:solidFill>
+                  <a:schemeClr val="accent6">
+                    <a:lumMod val="75000"/>
+                  </a:schemeClr>
+                </a:solidFill>
+              </a:rPr>
+              <a:t>3.</a:t>
+            </a:r>
+            <a:r>
+              <a:rPr lang="en-US" dirty="0" smtClean="0">
+                <a:solidFill>
+                  <a:schemeClr val="accent6">
+                    <a:lumMod val="75000"/>
+                  </a:schemeClr>
+                </a:solidFill>
+              </a:rPr>
+              <a:t> To record an audio, click the drop down menu </a:t>
+            </a:r>
+          </a:p>
+          <a:p>
+            <a:endParaRPr lang="en-US" dirty="0">
+              <a:solidFill>
+                <a:schemeClr val="accent6">
+                  <a:lumMod val="75000"/>
+                </a:schemeClr>
+              </a:solidFill>
+            </a:endParaRPr>
+          </a:p>
+          <a:p>
+            <a:r>
+              <a:rPr lang="en-US" dirty="0" smtClean="0">
+                <a:solidFill>
+                  <a:schemeClr val="accent6">
+                    <a:lumMod val="75000"/>
+                  </a:schemeClr>
+                </a:solidFill>
+              </a:rPr>
+              <a:t>of                 </a:t>
+            </a:r>
+            <a:r>
+              <a:rPr lang="en-US" dirty="0" smtClean="0">
+                <a:solidFill>
+                  <a:schemeClr val="accent6">
+                    <a:lumMod val="75000"/>
+                  </a:schemeClr>
+                </a:solidFill>
+              </a:rPr>
+              <a:t>button. </a:t>
+            </a:r>
+            <a:endParaRPr lang="en-US" dirty="0" smtClean="0">
+              <a:solidFill>
+                <a:schemeClr val="accent6">
+                  <a:lumMod val="75000"/>
+                </a:schemeClr>
+              </a:solidFill>
+            </a:endParaRPr>
+          </a:p>
+          <a:p>
+            <a:r>
+              <a:rPr lang="en-US" dirty="0" smtClean="0">
+                <a:solidFill>
+                  <a:schemeClr val="accent6">
+                    <a:lumMod val="75000"/>
+                  </a:schemeClr>
+                </a:solidFill>
+              </a:rPr>
+              <a:t/>
+            </a:r>
+            <a:br>
+              <a:rPr lang="en-US" dirty="0" smtClean="0">
+                <a:solidFill>
+                  <a:schemeClr val="accent6">
+                    <a:lumMod val="75000"/>
+                  </a:schemeClr>
+                </a:solidFill>
+              </a:rPr>
+            </a:br>
+            <a:r>
+              <a:rPr lang="en-US" dirty="0" smtClean="0">
+                <a:solidFill>
+                  <a:schemeClr val="accent6">
+                    <a:lumMod val="75000"/>
+                  </a:schemeClr>
+                </a:solidFill>
+              </a:rPr>
+              <a:t/>
+            </a:r>
+            <a:br>
+              <a:rPr lang="en-US" dirty="0" smtClean="0">
+                <a:solidFill>
+                  <a:schemeClr val="accent6">
+                    <a:lumMod val="75000"/>
+                  </a:schemeClr>
+                </a:solidFill>
+              </a:rPr>
+            </a:br>
+            <a:r>
+              <a:rPr lang="en-US" dirty="0" smtClean="0">
+                <a:solidFill>
+                  <a:schemeClr val="accent6">
+                    <a:lumMod val="75000"/>
+                  </a:schemeClr>
+                </a:solidFill>
+              </a:rPr>
+              <a:t>It </a:t>
+            </a:r>
+            <a:r>
+              <a:rPr lang="en-US" dirty="0" smtClean="0">
+                <a:solidFill>
+                  <a:schemeClr val="accent6">
+                    <a:lumMod val="75000"/>
+                  </a:schemeClr>
+                </a:solidFill>
+              </a:rPr>
+              <a:t>will show Recorder Script Panel at right side of your screen, showing the recording status of the scripts of current slide.</a:t>
+            </a:r>
+            <a:endParaRPr lang="en-SG" dirty="0">
+              <a:solidFill>
+                <a:schemeClr val="accent6">
+                  <a:lumMod val="75000"/>
+                </a:schemeClr>
+              </a:solidFill>
+            </a:endParaRPr>
+          </a:p>
+        </p:txBody>
+      </p:sp>
+      <p:sp>
+        <p:nvSpPr>
+          <p:cNvPr id="7" name="[Picture 3]"/>
+          <p:cNvSpPr txBox="1"/>
+          <p:nvPr/>
+        </p:nvSpPr>
+        <p:spPr>
+          <a:xfrm>
+            <a:off x="685800" y="4038600"/>
+            <a:ext cx="4800600" cy="2462213"/>
+          </a:xfrm>
+          <a:prstGeom prst="rect">
+            <a:avLst/>
+          </a:prstGeom>
+          <a:noFill/>
+        </p:spPr>
+        <p:txBody>
+          <a:bodyPr wrap="square" rtlCol="0">
+            <a:spAutoFit/>
+          </a:bodyPr>
+          <a:lstStyle/>
+          <a:p>
+            <a:r>
+              <a:rPr lang="en-US" sz="2800" b="1" dirty="0" smtClean="0">
+                <a:solidFill>
+                  <a:schemeClr val="accent6">
+                    <a:lumMod val="75000"/>
+                  </a:schemeClr>
+                </a:solidFill>
+              </a:rPr>
+              <a:t>4.</a:t>
+            </a:r>
+            <a:r>
+              <a:rPr lang="en-US" dirty="0" smtClean="0">
+                <a:solidFill>
+                  <a:schemeClr val="accent6">
+                    <a:lumMod val="75000"/>
+                  </a:schemeClr>
+                </a:solidFill>
+              </a:rPr>
+              <a:t> </a:t>
+            </a:r>
+            <a:r>
+              <a:rPr lang="en-US" dirty="0" smtClean="0">
+                <a:solidFill>
+                  <a:schemeClr val="accent6">
+                    <a:lumMod val="75000"/>
+                  </a:schemeClr>
+                </a:solidFill>
+              </a:rPr>
+              <a:t>Click </a:t>
+            </a:r>
+            <a:r>
+              <a:rPr lang="en-US" dirty="0" smtClean="0">
+                <a:solidFill>
+                  <a:schemeClr val="accent6">
+                    <a:lumMod val="75000"/>
+                  </a:schemeClr>
+                </a:solidFill>
+              </a:rPr>
+              <a:t>on the script you want to record and </a:t>
+            </a:r>
+          </a:p>
+          <a:p>
+            <a:endParaRPr lang="en-US" dirty="0">
+              <a:solidFill>
+                <a:schemeClr val="accent6">
+                  <a:lumMod val="75000"/>
+                </a:schemeClr>
+              </a:solidFill>
+            </a:endParaRPr>
+          </a:p>
+          <a:p>
+            <a:r>
+              <a:rPr lang="en-US" dirty="0" smtClean="0">
+                <a:solidFill>
+                  <a:schemeClr val="accent6">
+                    <a:lumMod val="75000"/>
+                  </a:schemeClr>
+                </a:solidFill>
+              </a:rPr>
+              <a:t>click           button to start recording. When you </a:t>
+            </a:r>
+          </a:p>
+          <a:p>
+            <a:endParaRPr lang="en-US" dirty="0">
+              <a:solidFill>
+                <a:schemeClr val="accent6">
+                  <a:lumMod val="75000"/>
+                </a:schemeClr>
+              </a:solidFill>
+            </a:endParaRPr>
+          </a:p>
+          <a:p>
+            <a:r>
+              <a:rPr lang="en-US" dirty="0" smtClean="0">
+                <a:solidFill>
+                  <a:schemeClr val="accent6">
+                    <a:lumMod val="75000"/>
+                  </a:schemeClr>
+                </a:solidFill>
+              </a:rPr>
+              <a:t>click          button, the record will be auto-</a:t>
+            </a:r>
+          </a:p>
+          <a:p>
+            <a:endParaRPr lang="en-US" dirty="0">
+              <a:solidFill>
+                <a:schemeClr val="accent6">
+                  <a:lumMod val="75000"/>
+                </a:schemeClr>
+              </a:solidFill>
+            </a:endParaRPr>
+          </a:p>
+          <a:p>
+            <a:r>
+              <a:rPr lang="en-US" dirty="0" smtClean="0">
+                <a:solidFill>
+                  <a:schemeClr val="accent6">
+                    <a:lumMod val="75000"/>
+                  </a:schemeClr>
+                </a:solidFill>
+              </a:rPr>
+              <a:t>embedded on the slide, and you can check it in the panel.</a:t>
+            </a:r>
+            <a:endParaRPr lang="en-SG" dirty="0">
+              <a:solidFill>
+                <a:schemeClr val="accent6">
+                  <a:lumMod val="75000"/>
+                </a:schemeClr>
+              </a:solidFill>
+            </a:endParaRPr>
+          </a:p>
+        </p:txBody>
+      </p:sp>
+      <p:pic>
+        <p:nvPicPr>
+          <p:cNvPr id="9" name="Picture 8"/>
+          <p:cNvPicPr>
+            <a:picLocks noChangeAspect="1"/>
+          </p:cNvPicPr>
+          <p:nvPr/>
+        </p:nvPicPr>
+        <p:blipFill rotWithShape="1">
+          <a:blip r:embed="rId3"/>
+          <a:srcRect l="11111" t="7310"/>
+          <a:stretch/>
+        </p:blipFill>
+        <p:spPr>
+          <a:xfrm>
+            <a:off x="1143000" y="1447800"/>
+            <a:ext cx="609600" cy="966216"/>
+          </a:xfrm>
+          <a:prstGeom prst="rect">
+            <a:avLst/>
+          </a:prstGeom>
+        </p:spPr>
+      </p:pic>
+      <p:pic>
+        <p:nvPicPr>
+          <p:cNvPr id="14" name="Picture 13"/>
+          <p:cNvPicPr>
+            <a:picLocks noChangeAspect="1"/>
+          </p:cNvPicPr>
+          <p:nvPr/>
+        </p:nvPicPr>
+        <p:blipFill rotWithShape="1">
+          <a:blip r:embed="rId4"/>
+          <a:srcRect b="1229"/>
+          <a:stretch/>
+        </p:blipFill>
+        <p:spPr>
+          <a:xfrm>
+            <a:off x="5730854" y="252984"/>
+            <a:ext cx="3184546" cy="6376416"/>
+          </a:xfrm>
+          <a:prstGeom prst="rect">
+            <a:avLst/>
+          </a:prstGeom>
+        </p:spPr>
+      </p:pic>
+      <p:pic>
+        <p:nvPicPr>
+          <p:cNvPr id="16" name="Picture 15"/>
+          <p:cNvPicPr>
+            <a:picLocks noChangeAspect="1"/>
+          </p:cNvPicPr>
+          <p:nvPr/>
+        </p:nvPicPr>
+        <p:blipFill>
+          <a:blip r:embed="rId5">
+            <a:extLst>
+              <a:ext uri="{28A0092B-C50C-407E-A947-70E740481C1C}">
+                <a14:useLocalDpi xmlns:a14="http://schemas.microsoft.com/office/drawing/2010/main" val="0"/>
+              </a:ext>
+            </a:extLst>
+          </a:blip>
+          <a:stretch>
+            <a:fillRect/>
+          </a:stretch>
+        </p:blipFill>
+        <p:spPr>
+          <a:xfrm>
+            <a:off x="1244625" y="4724400"/>
+            <a:ext cx="406349" cy="406349"/>
+          </a:xfrm>
+          <a:prstGeom prst="rect">
+            <a:avLst/>
+          </a:prstGeom>
+        </p:spPr>
+      </p:pic>
+      <p:pic>
+        <p:nvPicPr>
+          <p:cNvPr id="17" name="Picture 16"/>
+          <p:cNvPicPr>
+            <a:picLocks noChangeAspect="1"/>
+          </p:cNvPicPr>
+          <p:nvPr/>
+        </p:nvPicPr>
+        <p:blipFill>
+          <a:blip r:embed="rId6">
+            <a:extLst>
+              <a:ext uri="{28A0092B-C50C-407E-A947-70E740481C1C}">
+                <a14:useLocalDpi xmlns:a14="http://schemas.microsoft.com/office/drawing/2010/main" val="0"/>
+              </a:ext>
+            </a:extLst>
+          </a:blip>
+          <a:stretch>
+            <a:fillRect/>
+          </a:stretch>
+        </p:blipFill>
+        <p:spPr>
+          <a:xfrm>
+            <a:off x="1244624" y="5289106"/>
+            <a:ext cx="406349" cy="406349"/>
+          </a:xfrm>
+          <a:prstGeom prst="rect">
+            <a:avLst/>
+          </a:prstGeom>
+        </p:spPr>
+      </p:pic>
+      <p:pic>
+        <p:nvPicPr>
+          <p:cNvPr id="20" name="Picture 19"/>
+          <p:cNvPicPr>
+            <a:picLocks noChangeAspect="1"/>
+          </p:cNvPicPr>
+          <p:nvPr/>
+        </p:nvPicPr>
+        <p:blipFill>
+          <a:blip r:embed="rId7"/>
+          <a:stretch>
+            <a:fillRect/>
+          </a:stretch>
+        </p:blipFill>
+        <p:spPr>
+          <a:xfrm>
+            <a:off x="5730854" y="252984"/>
+            <a:ext cx="3184546" cy="6445173"/>
+          </a:xfrm>
+          <a:prstGeom prst="rect">
+            <a:avLst/>
+          </a:prstGeom>
+        </p:spPr>
+      </p:pic>
+    </p:spTree>
+    <p:extLst>
+      <p:ext uri="{BB962C8B-B14F-4D97-AF65-F5344CB8AC3E}">
+        <p14:creationId xmlns:p14="http://schemas.microsoft.com/office/powerpoint/2010/main" val="1999255668"/>
+      </p:ext>
+    </p:extLst>
+  </p:cSld>
+  <p:clrMapOvr>
+    <a:masterClrMapping/>
+  </p:clrMapOvr>
+  <p:timing>
+    <p:tnLst>
+      <p:par>
+        <p:cTn id="1" dur="indefinite" restart="never" nodeType="tmRoot">
+          <p:childTnLst>
+            <p:seq concurrent="1" nextAc="seek">
+              <p:cTn id="2" dur="indefinite" nodeType="mainSeq">
+                <p:childTnLst>
+                  <p:par>
+                    <p:cTn id="3" fill="hold">
+                      <p:stCondLst>
+                        <p:cond delay="indefinite"/>
+                      </p:stCondLst>
+                      <p:childTnLst>
+                        <p:par>
+                          <p:cTn id="4" fill="hold">
+                            <p:stCondLst>
+                              <p:cond delay="0"/>
+                            </p:stCondLst>
+                            <p:childTnLst>
+                              <p:par>
+                                <p:cTn id="5" presetID="10" presetClass="entr" presetSubtype="0" fill="hold" nodeType="clickEffect">
+                                  <p:stCondLst>
+                                    <p:cond delay="0"/>
+                                  </p:stCondLst>
+                                  <p:childTnLst>
+                                    <p:set>
+                                      <p:cBhvr>
+                                        <p:cTn id="6" dur="1" fill="hold">
+                                          <p:stCondLst>
+                                            <p:cond delay="0"/>
+                                          </p:stCondLst>
+                                        </p:cTn>
+                                        <p:tgtEl>
+                                          <p:spTgt spid="9"/>
+                                        </p:tgtEl>
+                                        <p:attrNameLst>
+                                          <p:attrName>style.visibility</p:attrName>
+                                        </p:attrNameLst>
+                                      </p:cBhvr>
+                                      <p:to>
+                                        <p:strVal val="visible"/>
+                                      </p:to>
+                                    </p:set>
+                                    <p:animEffect transition="in" filter="fade">
+                                      <p:cBhvr>
+                                        <p:cTn id="7" dur="500"/>
+                                        <p:tgtEl>
+                                          <p:spTgt spid="9"/>
+                                        </p:tgtEl>
+                                      </p:cBhvr>
+                                    </p:animEffect>
+                                  </p:childTnLst>
+                                </p:cTn>
+                              </p:par>
+                              <p:par>
+                                <p:cTn id="8" presetID="10" presetClass="entr" presetSubtype="0" fill="hold" grpId="0" nodeType="withEffect">
+                                  <p:stCondLst>
+                                    <p:cond delay="0"/>
+                                  </p:stCondLst>
+                                  <p:childTnLst>
+                                    <p:set>
+                                      <p:cBhvr>
+                                        <p:cTn id="9" dur="1" fill="hold">
+                                          <p:stCondLst>
+                                            <p:cond delay="0"/>
+                                          </p:stCondLst>
+                                        </p:cTn>
+                                        <p:tgtEl>
+                                          <p:spTgt spid="4"/>
+                                        </p:tgtEl>
+                                        <p:attrNameLst>
+                                          <p:attrName>style.visibility</p:attrName>
+                                        </p:attrNameLst>
+                                      </p:cBhvr>
+                                      <p:to>
+                                        <p:strVal val="visible"/>
+                                      </p:to>
+                                    </p:set>
+                                    <p:animEffect transition="in" filter="fade">
+                                      <p:cBhvr>
+                                        <p:cTn id="10" dur="500"/>
+                                        <p:tgtEl>
+                                          <p:spTgt spid="4"/>
+                                        </p:tgtEl>
+                                      </p:cBhvr>
+                                    </p:animEffect>
+                                  </p:childTnLst>
+                                </p:cTn>
+                              </p:par>
+                              <p:par>
+                                <p:cTn id="11" presetID="10" presetClass="entr" presetSubtype="0" fill="hold" nodeType="withEffect">
+                                  <p:stCondLst>
+                                    <p:cond delay="0"/>
+                                  </p:stCondLst>
+                                  <p:childTnLst>
+                                    <p:set>
+                                      <p:cBhvr>
+                                        <p:cTn id="12" dur="1" fill="hold">
+                                          <p:stCondLst>
+                                            <p:cond delay="0"/>
+                                          </p:stCondLst>
+                                        </p:cTn>
+                                        <p:tgtEl>
+                                          <p:spTgt spid="14"/>
+                                        </p:tgtEl>
+                                        <p:attrNameLst>
+                                          <p:attrName>style.visibility</p:attrName>
+                                        </p:attrNameLst>
+                                      </p:cBhvr>
+                                      <p:to>
+                                        <p:strVal val="visible"/>
+                                      </p:to>
+                                    </p:set>
+                                    <p:animEffect transition="in" filter="fade">
+                                      <p:cBhvr>
+                                        <p:cTn id="13" dur="500"/>
+                                        <p:tgtEl>
+                                          <p:spTgt spid="14"/>
+                                        </p:tgtEl>
+                                      </p:cBhvr>
+                                    </p:animEffect>
+                                  </p:childTnLst>
+                                </p:cTn>
+                              </p:par>
+                            </p:childTnLst>
+                          </p:cTn>
+                        </p:par>
+                      </p:childTnLst>
+                    </p:cTn>
+                  </p:par>
+                  <p:par>
+                    <p:cTn id="14" fill="hold">
+                      <p:stCondLst>
+                        <p:cond delay="indefinite"/>
+                      </p:stCondLst>
+                      <p:childTnLst>
+                        <p:par>
+                          <p:cTn id="15" fill="hold">
+                            <p:stCondLst>
+                              <p:cond delay="0"/>
+                            </p:stCondLst>
+                            <p:childTnLst>
+                              <p:par>
+                                <p:cTn id="16" presetID="10" presetClass="entr" presetSubtype="0" fill="hold" grpId="0" nodeType="clickEffect">
+                                  <p:stCondLst>
+                                    <p:cond delay="0"/>
+                                  </p:stCondLst>
+                                  <p:childTnLst>
+                                    <p:set>
+                                      <p:cBhvr>
+                                        <p:cTn id="17" dur="1" fill="hold">
+                                          <p:stCondLst>
+                                            <p:cond delay="0"/>
+                                          </p:stCondLst>
+                                        </p:cTn>
+                                        <p:tgtEl>
+                                          <p:spTgt spid="7"/>
+                                        </p:tgtEl>
+                                        <p:attrNameLst>
+                                          <p:attrName>style.visibility</p:attrName>
+                                        </p:attrNameLst>
+                                      </p:cBhvr>
+                                      <p:to>
+                                        <p:strVal val="visible"/>
+                                      </p:to>
+                                    </p:set>
+                                    <p:animEffect transition="in" filter="fade">
+                                      <p:cBhvr>
+                                        <p:cTn id="18" dur="500"/>
+                                        <p:tgtEl>
+                                          <p:spTgt spid="7"/>
+                                        </p:tgtEl>
+                                      </p:cBhvr>
+                                    </p:animEffect>
+                                  </p:childTnLst>
+                                </p:cTn>
+                              </p:par>
+                              <p:par>
+                                <p:cTn id="19" presetID="10" presetClass="entr" presetSubtype="0" fill="hold" nodeType="withEffect">
+                                  <p:stCondLst>
+                                    <p:cond delay="0"/>
+                                  </p:stCondLst>
+                                  <p:childTnLst>
+                                    <p:set>
+                                      <p:cBhvr>
+                                        <p:cTn id="20" dur="1" fill="hold">
+                                          <p:stCondLst>
+                                            <p:cond delay="0"/>
+                                          </p:stCondLst>
+                                        </p:cTn>
+                                        <p:tgtEl>
+                                          <p:spTgt spid="16"/>
+                                        </p:tgtEl>
+                                        <p:attrNameLst>
+                                          <p:attrName>style.visibility</p:attrName>
+                                        </p:attrNameLst>
+                                      </p:cBhvr>
+                                      <p:to>
+                                        <p:strVal val="visible"/>
+                                      </p:to>
+                                    </p:set>
+                                    <p:animEffect transition="in" filter="fade">
+                                      <p:cBhvr>
+                                        <p:cTn id="21" dur="500"/>
+                                        <p:tgtEl>
+                                          <p:spTgt spid="16"/>
+                                        </p:tgtEl>
+                                      </p:cBhvr>
+                                    </p:animEffect>
+                                  </p:childTnLst>
+                                </p:cTn>
+                              </p:par>
+                              <p:par>
+                                <p:cTn id="22" presetID="10" presetClass="entr" presetSubtype="0" fill="hold" nodeType="withEffect">
+                                  <p:stCondLst>
+                                    <p:cond delay="0"/>
+                                  </p:stCondLst>
+                                  <p:childTnLst>
+                                    <p:set>
+                                      <p:cBhvr>
+                                        <p:cTn id="23" dur="1" fill="hold">
+                                          <p:stCondLst>
+                                            <p:cond delay="0"/>
+                                          </p:stCondLst>
+                                        </p:cTn>
+                                        <p:tgtEl>
+                                          <p:spTgt spid="17"/>
+                                        </p:tgtEl>
+                                        <p:attrNameLst>
+                                          <p:attrName>style.visibility</p:attrName>
+                                        </p:attrNameLst>
+                                      </p:cBhvr>
+                                      <p:to>
+                                        <p:strVal val="visible"/>
+                                      </p:to>
+                                    </p:set>
+                                    <p:animEffect transition="in" filter="fade">
+                                      <p:cBhvr>
+                                        <p:cTn id="24" dur="500"/>
+                                        <p:tgtEl>
+                                          <p:spTgt spid="17"/>
+                                        </p:tgtEl>
+                                      </p:cBhvr>
+                                    </p:animEffect>
+                                  </p:childTnLst>
+                                </p:cTn>
+                              </p:par>
+                              <p:par>
+                                <p:cTn id="25" presetID="10" presetClass="entr" presetSubtype="0" fill="hold" nodeType="withEffect">
+                                  <p:stCondLst>
+                                    <p:cond delay="0"/>
+                                  </p:stCondLst>
+                                  <p:childTnLst>
+                                    <p:set>
+                                      <p:cBhvr>
+                                        <p:cTn id="26" dur="1" fill="hold">
+                                          <p:stCondLst>
+                                            <p:cond delay="0"/>
+                                          </p:stCondLst>
+                                        </p:cTn>
+                                        <p:tgtEl>
+                                          <p:spTgt spid="20"/>
+                                        </p:tgtEl>
+                                        <p:attrNameLst>
+                                          <p:attrName>style.visibility</p:attrName>
+                                        </p:attrNameLst>
+                                      </p:cBhvr>
+                                      <p:to>
+                                        <p:strVal val="visible"/>
+                                      </p:to>
+                                    </p:set>
+                                    <p:animEffect transition="in" filter="fade">
+                                      <p:cBhvr>
+                                        <p:cTn id="27" dur="500"/>
+                                        <p:tgtEl>
+                                          <p:spTgt spid="20"/>
+                                        </p:tgtEl>
+                                      </p:cBhvr>
+                                    </p:animEffect>
+                                  </p:childTnLst>
+                                </p:cTn>
+                              </p:par>
+                            </p:childTnLst>
+                          </p:cTn>
+                        </p:par>
+                      </p:childTnLst>
+                    </p:cTn>
+                  </p:par>
+                </p:childTnLst>
+              </p:cTn>
+              <p:prevCondLst>
+                <p:cond evt="onPrev" delay="0">
+                  <p:tgtEl>
+                    <p:sldTgt/>
+                  </p:tgtEl>
+                </p:cond>
+              </p:prevCondLst>
+              <p:nextCondLst>
+                <p:cond evt="onNext" delay="0">
+                  <p:tgtEl>
+                    <p:sldTgt/>
+                  </p:tgtEl>
+                </p:cond>
+              </p:nextCondLst>
+            </p:seq>
+          </p:childTnLst>
+        </p:cTn>
+      </p:par>
+    </p:tnLst>
+    <p:bldLst>
+      <p:bldP spid="4" grpId="0"/>
+      <p:bldP spid="7" grpId="0"/>
+    </p:bldLst>
+  </p:timing>
+</p:sld>
+</file>
+
+<file path=ppt/slides/slide27.xml><?xml version="1.0" encoding="utf-8"?>
+<p:sld xmlns:a="http://schemas.openxmlformats.org/drawingml/2006/main" xmlns:r="http://schemas.openxmlformats.org/officeDocument/2006/relationships" xmlns:p="http://schemas.openxmlformats.org/presentationml/2006/main">
+  <p:cSld>
+    <p:spTree>
+      <p:nvGrpSpPr>
+        <p:cNvPr id="1" name=""/>
+        <p:cNvGrpSpPr/>
+        <p:nvPr/>
+      </p:nvGrpSpPr>
+      <p:grpSpPr>
+        <a:xfrm>
+          <a:off x="0" y="0"/>
+          <a:ext cx="0" cy="0"/>
+          <a:chOff x="0" y="0"/>
+          <a:chExt cx="0" cy="0"/>
+        </a:xfrm>
+      </p:grpSpPr>
+      <p:sp>
+        <p:nvSpPr>
           <p:cNvPr id="16" name="TextBox 15"/>
           <p:cNvSpPr txBox="1"/>
           <p:nvPr/>
@@ -15035,7 +15902,7 @@
 </p:sld>
 </file>
 
-<file path=ppt/slides/slide27.xml><?xml version="1.0" encoding="utf-8"?>
+<file path=ppt/slides/slide28.xml><?xml version="1.0" encoding="utf-8"?>
 <p:sld xmlns:a="http://schemas.openxmlformats.org/drawingml/2006/main" xmlns:r="http://schemas.openxmlformats.org/officeDocument/2006/relationships" xmlns:p="http://schemas.openxmlformats.org/presentationml/2006/main" show="0">
   <p:cSld name="PPAck201401021130490549">
     <p:spTree>

</xml_diff>

<commit_message>
using mockup message box to capture user's closing option
</commit_message>
<xml_diff>
--- a/PowerPointLabs/PowerPointLabs/PowerPointLabs Quick Tutorial.pptx
+++ b/PowerPointLabs/PowerPointLabs/PowerPointLabs Quick Tutorial.pptx
@@ -5,7 +5,7 @@
     <p:sldMasterId id="2147483648" r:id="rId1"/>
   </p:sldMasterIdLst>
   <p:notesMasterIdLst>
-    <p:notesMasterId r:id="rId30"/>
+    <p:notesMasterId r:id="rId33"/>
   </p:notesMasterIdLst>
   <p:sldIdLst>
     <p:sldId id="296" r:id="rId2"/>
@@ -34,8 +34,11 @@
     <p:sldId id="310" r:id="rId25"/>
     <p:sldId id="326" r:id="rId26"/>
     <p:sldId id="331" r:id="rId27"/>
-    <p:sldId id="305" r:id="rId28"/>
-    <p:sldId id="299" r:id="rId29"/>
+    <p:sldId id="332" r:id="rId28"/>
+    <p:sldId id="333" r:id="rId29"/>
+    <p:sldId id="334" r:id="rId30"/>
+    <p:sldId id="305" r:id="rId31"/>
+    <p:sldId id="299" r:id="rId32"/>
   </p:sldIdLst>
   <p:sldSz cx="9144000" cy="6858000" type="screen4x3"/>
   <p:notesSz cx="6858000" cy="9144000"/>
@@ -189,6 +192,13 @@
             <p14:sldId id="310"/>
             <p14:sldId id="326"/>
             <p14:sldId id="331"/>
+          </p14:sldIdLst>
+        </p14:section>
+        <p14:section name="Shapes Lab" id="{5FA21AB1-D2E0-43AB-9D6E-D4B133EACC31}">
+          <p14:sldIdLst>
+            <p14:sldId id="332"/>
+            <p14:sldId id="333"/>
+            <p14:sldId id="334"/>
           </p14:sldIdLst>
         </p14:section>
         <p14:section name="Wrap up" id="{5BBA1A93-B239-4917-BAC7-9CBE7A60C0BF}">
@@ -424,7 +434,7 @@
           <a:p>
             <a:fld id="{3E86CC0F-BBF3-4E07-94E0-0549B7D560A9}" type="datetimeFigureOut">
               <a:rPr lang="en-SG" smtClean="0"/>
-              <a:t>16/6/2014</a:t>
+              <a:t>17/7/2014</a:t>
             </a:fld>
             <a:endParaRPr lang="en-SG"/>
           </a:p>
@@ -1213,6 +1223,174 @@
 </p:notes>
 </file>
 
+<file path=ppt/notesSlides/notesSlide6.xml><?xml version="1.0" encoding="utf-8"?>
+<p:notes xmlns:a="http://schemas.openxmlformats.org/drawingml/2006/main" xmlns:r="http://schemas.openxmlformats.org/officeDocument/2006/relationships" xmlns:p="http://schemas.openxmlformats.org/presentationml/2006/main">
+  <p:cSld>
+    <p:spTree>
+      <p:nvGrpSpPr>
+        <p:cNvPr id="1" name=""/>
+        <p:cNvGrpSpPr/>
+        <p:nvPr/>
+      </p:nvGrpSpPr>
+      <p:grpSpPr>
+        <a:xfrm>
+          <a:off x="0" y="0"/>
+          <a:ext cx="0" cy="0"/>
+          <a:chOff x="0" y="0"/>
+          <a:chExt cx="0" cy="0"/>
+        </a:xfrm>
+      </p:grpSpPr>
+      <p:sp>
+        <p:nvSpPr>
+          <p:cNvPr id="2" name="Slide Image Placeholder 1"/>
+          <p:cNvSpPr>
+            <a:spLocks noGrp="1" noRot="1" noChangeAspect="1"/>
+          </p:cNvSpPr>
+          <p:nvPr>
+            <p:ph type="sldImg"/>
+          </p:nvPr>
+        </p:nvSpPr>
+        <p:spPr/>
+      </p:sp>
+      <p:sp>
+        <p:nvSpPr>
+          <p:cNvPr id="3" name="Notes Placeholder 2"/>
+          <p:cNvSpPr>
+            <a:spLocks noGrp="1"/>
+          </p:cNvSpPr>
+          <p:nvPr>
+            <p:ph type="body" idx="1"/>
+          </p:nvPr>
+        </p:nvSpPr>
+        <p:spPr/>
+        <p:txBody>
+          <a:bodyPr/>
+          <a:lstStyle/>
+          <a:p>
+            <a:endParaRPr lang="en-SG" dirty="0"/>
+          </a:p>
+        </p:txBody>
+      </p:sp>
+      <p:sp>
+        <p:nvSpPr>
+          <p:cNvPr id="4" name="Slide Number Placeholder 3"/>
+          <p:cNvSpPr>
+            <a:spLocks noGrp="1"/>
+          </p:cNvSpPr>
+          <p:nvPr>
+            <p:ph type="sldNum" sz="quarter" idx="10"/>
+          </p:nvPr>
+        </p:nvSpPr>
+        <p:spPr/>
+        <p:txBody>
+          <a:bodyPr/>
+          <a:lstStyle/>
+          <a:p>
+            <a:fld id="{0015B511-83B7-463E-ACD1-0C1C081EBBC4}" type="slidenum">
+              <a:rPr lang="en-SG" smtClean="0"/>
+              <a:t>28</a:t>
+            </a:fld>
+            <a:endParaRPr lang="en-SG"/>
+          </a:p>
+        </p:txBody>
+      </p:sp>
+    </p:spTree>
+    <p:extLst>
+      <p:ext uri="{BB962C8B-B14F-4D97-AF65-F5344CB8AC3E}">
+        <p14:creationId xmlns:p14="http://schemas.microsoft.com/office/powerpoint/2010/main" val="2803535550"/>
+      </p:ext>
+    </p:extLst>
+  </p:cSld>
+  <p:clrMapOvr>
+    <a:masterClrMapping/>
+  </p:clrMapOvr>
+</p:notes>
+</file>
+
+<file path=ppt/notesSlides/notesSlide7.xml><?xml version="1.0" encoding="utf-8"?>
+<p:notes xmlns:a="http://schemas.openxmlformats.org/drawingml/2006/main" xmlns:r="http://schemas.openxmlformats.org/officeDocument/2006/relationships" xmlns:p="http://schemas.openxmlformats.org/presentationml/2006/main">
+  <p:cSld>
+    <p:spTree>
+      <p:nvGrpSpPr>
+        <p:cNvPr id="1" name=""/>
+        <p:cNvGrpSpPr/>
+        <p:nvPr/>
+      </p:nvGrpSpPr>
+      <p:grpSpPr>
+        <a:xfrm>
+          <a:off x="0" y="0"/>
+          <a:ext cx="0" cy="0"/>
+          <a:chOff x="0" y="0"/>
+          <a:chExt cx="0" cy="0"/>
+        </a:xfrm>
+      </p:grpSpPr>
+      <p:sp>
+        <p:nvSpPr>
+          <p:cNvPr id="2" name="Slide Image Placeholder 1"/>
+          <p:cNvSpPr>
+            <a:spLocks noGrp="1" noRot="1" noChangeAspect="1"/>
+          </p:cNvSpPr>
+          <p:nvPr>
+            <p:ph type="sldImg"/>
+          </p:nvPr>
+        </p:nvSpPr>
+        <p:spPr/>
+      </p:sp>
+      <p:sp>
+        <p:nvSpPr>
+          <p:cNvPr id="3" name="Notes Placeholder 2"/>
+          <p:cNvSpPr>
+            <a:spLocks noGrp="1"/>
+          </p:cNvSpPr>
+          <p:nvPr>
+            <p:ph type="body" idx="1"/>
+          </p:nvPr>
+        </p:nvSpPr>
+        <p:spPr/>
+        <p:txBody>
+          <a:bodyPr/>
+          <a:lstStyle/>
+          <a:p>
+            <a:endParaRPr lang="en-SG" dirty="0"/>
+          </a:p>
+        </p:txBody>
+      </p:sp>
+      <p:sp>
+        <p:nvSpPr>
+          <p:cNvPr id="4" name="Slide Number Placeholder 3"/>
+          <p:cNvSpPr>
+            <a:spLocks noGrp="1"/>
+          </p:cNvSpPr>
+          <p:nvPr>
+            <p:ph type="sldNum" sz="quarter" idx="10"/>
+          </p:nvPr>
+        </p:nvSpPr>
+        <p:spPr/>
+        <p:txBody>
+          <a:bodyPr/>
+          <a:lstStyle/>
+          <a:p>
+            <a:fld id="{0015B511-83B7-463E-ACD1-0C1C081EBBC4}" type="slidenum">
+              <a:rPr lang="en-SG" smtClean="0"/>
+              <a:t>29</a:t>
+            </a:fld>
+            <a:endParaRPr lang="en-SG"/>
+          </a:p>
+        </p:txBody>
+      </p:sp>
+    </p:spTree>
+    <p:extLst>
+      <p:ext uri="{BB962C8B-B14F-4D97-AF65-F5344CB8AC3E}">
+        <p14:creationId xmlns:p14="http://schemas.microsoft.com/office/powerpoint/2010/main" val="1473495396"/>
+      </p:ext>
+    </p:extLst>
+  </p:cSld>
+  <p:clrMapOvr>
+    <a:masterClrMapping/>
+  </p:clrMapOvr>
+</p:notes>
+</file>
+
 <file path=ppt/slideLayouts/slideLayout1.xml><?xml version="1.0" encoding="utf-8"?>
 <p:sldLayout xmlns:a="http://schemas.openxmlformats.org/drawingml/2006/main" xmlns:r="http://schemas.openxmlformats.org/officeDocument/2006/relationships" xmlns:p="http://schemas.openxmlformats.org/presentationml/2006/main" type="title" preserve="1">
   <p:cSld name="Title Slide">
@@ -1395,7 +1573,7 @@
             <a:fld id="{1D8BD707-D9CF-40AE-B4C6-C98DA3205C09}" type="datetimeFigureOut">
               <a:rPr lang="en-US" smtClean="0"/>
               <a:pPr/>
-              <a:t>6/16/2014</a:t>
+              <a:t>7/17/2014</a:t>
             </a:fld>
             <a:endParaRPr lang="en-US"/>
           </a:p>
@@ -1562,7 +1740,7 @@
             <a:fld id="{1D8BD707-D9CF-40AE-B4C6-C98DA3205C09}" type="datetimeFigureOut">
               <a:rPr lang="en-US" smtClean="0"/>
               <a:pPr/>
-              <a:t>6/16/2014</a:t>
+              <a:t>7/17/2014</a:t>
             </a:fld>
             <a:endParaRPr lang="en-US"/>
           </a:p>
@@ -1739,7 +1917,7 @@
             <a:fld id="{1D8BD707-D9CF-40AE-B4C6-C98DA3205C09}" type="datetimeFigureOut">
               <a:rPr lang="en-US" smtClean="0"/>
               <a:pPr/>
-              <a:t>6/16/2014</a:t>
+              <a:t>7/17/2014</a:t>
             </a:fld>
             <a:endParaRPr lang="en-US"/>
           </a:p>
@@ -1906,7 +2084,7 @@
             <a:fld id="{1D8BD707-D9CF-40AE-B4C6-C98DA3205C09}" type="datetimeFigureOut">
               <a:rPr lang="en-US" smtClean="0"/>
               <a:pPr/>
-              <a:t>6/16/2014</a:t>
+              <a:t>7/17/2014</a:t>
             </a:fld>
             <a:endParaRPr lang="en-US"/>
           </a:p>
@@ -2149,7 +2327,7 @@
             <a:fld id="{1D8BD707-D9CF-40AE-B4C6-C98DA3205C09}" type="datetimeFigureOut">
               <a:rPr lang="en-US" smtClean="0"/>
               <a:pPr/>
-              <a:t>6/16/2014</a:t>
+              <a:t>7/17/2014</a:t>
             </a:fld>
             <a:endParaRPr lang="en-US"/>
           </a:p>
@@ -2434,7 +2612,7 @@
             <a:fld id="{1D8BD707-D9CF-40AE-B4C6-C98DA3205C09}" type="datetimeFigureOut">
               <a:rPr lang="en-US" smtClean="0"/>
               <a:pPr/>
-              <a:t>6/16/2014</a:t>
+              <a:t>7/17/2014</a:t>
             </a:fld>
             <a:endParaRPr lang="en-US"/>
           </a:p>
@@ -2853,7 +3031,7 @@
             <a:fld id="{1D8BD707-D9CF-40AE-B4C6-C98DA3205C09}" type="datetimeFigureOut">
               <a:rPr lang="en-US" smtClean="0"/>
               <a:pPr/>
-              <a:t>6/16/2014</a:t>
+              <a:t>7/17/2014</a:t>
             </a:fld>
             <a:endParaRPr lang="en-US"/>
           </a:p>
@@ -2968,7 +3146,7 @@
             <a:fld id="{1D8BD707-D9CF-40AE-B4C6-C98DA3205C09}" type="datetimeFigureOut">
               <a:rPr lang="en-US" smtClean="0"/>
               <a:pPr/>
-              <a:t>6/16/2014</a:t>
+              <a:t>7/17/2014</a:t>
             </a:fld>
             <a:endParaRPr lang="en-US"/>
           </a:p>
@@ -3060,7 +3238,7 @@
             <a:fld id="{1D8BD707-D9CF-40AE-B4C6-C98DA3205C09}" type="datetimeFigureOut">
               <a:rPr lang="en-US" smtClean="0"/>
               <a:pPr/>
-              <a:t>6/16/2014</a:t>
+              <a:t>7/17/2014</a:t>
             </a:fld>
             <a:endParaRPr lang="en-US"/>
           </a:p>
@@ -3334,7 +3512,7 @@
             <a:fld id="{1D8BD707-D9CF-40AE-B4C6-C98DA3205C09}" type="datetimeFigureOut">
               <a:rPr lang="en-US" smtClean="0"/>
               <a:pPr/>
-              <a:t>6/16/2014</a:t>
+              <a:t>7/17/2014</a:t>
             </a:fld>
             <a:endParaRPr lang="en-US"/>
           </a:p>
@@ -3584,7 +3762,7 @@
             <a:fld id="{1D8BD707-D9CF-40AE-B4C6-C98DA3205C09}" type="datetimeFigureOut">
               <a:rPr lang="en-US" smtClean="0"/>
               <a:pPr/>
-              <a:t>6/16/2014</a:t>
+              <a:t>7/17/2014</a:t>
             </a:fld>
             <a:endParaRPr lang="en-US"/>
           </a:p>
@@ -3794,7 +3972,7 @@
             <a:fld id="{1D8BD707-D9CF-40AE-B4C6-C98DA3205C09}" type="datetimeFigureOut">
               <a:rPr lang="en-US" smtClean="0"/>
               <a:pPr/>
-              <a:t>6/16/2014</a:t>
+              <a:t>7/17/2014</a:t>
             </a:fld>
             <a:endParaRPr lang="en-US"/>
           </a:p>
@@ -14926,8 +15104,10 @@
                   </a:schemeClr>
                 </a:solidFill>
               </a:rPr>
-              <a:t>of                 </a:t>
-            </a:r>
+              <a:t>of                 button. </a:t>
+            </a:r>
+          </a:p>
+          <a:p>
             <a:r>
               <a:rPr lang="en-US" dirty="0" smtClean="0">
                 <a:solidFill>
@@ -14936,18 +15116,9 @@
                   </a:schemeClr>
                 </a:solidFill>
               </a:rPr>
-              <a:t>button. </a:t>
-            </a:r>
-            <a:endParaRPr lang="en-US" dirty="0" smtClean="0">
-              <a:solidFill>
-                <a:schemeClr val="accent6">
-                  <a:lumMod val="75000"/>
-                </a:schemeClr>
-              </a:solidFill>
-            </a:endParaRPr>
-          </a:p>
-          <a:p>
-            <a:r>
+              <a:t/>
+            </a:r>
+            <a:br>
               <a:rPr lang="en-US" dirty="0" smtClean="0">
                 <a:solidFill>
                   <a:schemeClr val="accent6">
@@ -14955,6 +15126,15 @@
                   </a:schemeClr>
                 </a:solidFill>
               </a:rPr>
+            </a:br>
+            <a:r>
+              <a:rPr lang="en-US" dirty="0" smtClean="0">
+                <a:solidFill>
+                  <a:schemeClr val="accent6">
+                    <a:lumMod val="75000"/>
+                  </a:schemeClr>
+                </a:solidFill>
+              </a:rPr>
               <a:t/>
             </a:r>
             <a:br>
@@ -14974,36 +15154,7 @@
                   </a:schemeClr>
                 </a:solidFill>
               </a:rPr>
-              <a:t/>
-            </a:r>
-            <a:br>
-              <a:rPr lang="en-US" dirty="0" smtClean="0">
-                <a:solidFill>
-                  <a:schemeClr val="accent6">
-                    <a:lumMod val="75000"/>
-                  </a:schemeClr>
-                </a:solidFill>
-              </a:rPr>
-            </a:br>
-            <a:r>
-              <a:rPr lang="en-US" dirty="0" smtClean="0">
-                <a:solidFill>
-                  <a:schemeClr val="accent6">
-                    <a:lumMod val="75000"/>
-                  </a:schemeClr>
-                </a:solidFill>
-              </a:rPr>
-              <a:t>It </a:t>
-            </a:r>
-            <a:r>
-              <a:rPr lang="en-US" dirty="0" smtClean="0">
-                <a:solidFill>
-                  <a:schemeClr val="accent6">
-                    <a:lumMod val="75000"/>
-                  </a:schemeClr>
-                </a:solidFill>
-              </a:rPr>
-              <a:t>will show Recorder Script Panel at right side of your screen, showing the recording status of the scripts of current slide.</a:t>
+              <a:t>It will show Recorder Script Panel at right side of your screen, showing the recording status of the scripts of current slide.</a:t>
             </a:r>
             <a:endParaRPr lang="en-SG" dirty="0">
               <a:solidFill>
@@ -15055,27 +15206,7 @@
                   </a:schemeClr>
                 </a:solidFill>
               </a:rPr>
-              <a:t> </a:t>
-            </a:r>
-            <a:r>
-              <a:rPr lang="en-US" dirty="0" smtClean="0">
-                <a:solidFill>
-                  <a:schemeClr val="accent6">
-                    <a:lumMod val="75000"/>
-                  </a:schemeClr>
-                </a:solidFill>
-              </a:rPr>
-              <a:t>Click </a:t>
-            </a:r>
-            <a:r>
-              <a:rPr lang="en-US" dirty="0" smtClean="0">
-                <a:solidFill>
-                  <a:schemeClr val="accent6">
-                    <a:lumMod val="75000"/>
-                  </a:schemeClr>
-                </a:solidFill>
-              </a:rPr>
-              <a:t>on the script you want to record and </a:t>
+              <a:t> Click on the script you want to record and </a:t>
             </a:r>
           </a:p>
           <a:p>
@@ -15627,6 +15758,1060 @@
       </p:grpSpPr>
       <p:sp>
         <p:nvSpPr>
+          <p:cNvPr id="4" name="TextBox 3"/>
+          <p:cNvSpPr txBox="1"/>
+          <p:nvPr/>
+        </p:nvSpPr>
+        <p:spPr>
+          <a:xfrm>
+            <a:off x="3429000" y="3130034"/>
+            <a:ext cx="3657600" cy="369332"/>
+          </a:xfrm>
+          <a:prstGeom prst="rect">
+            <a:avLst/>
+          </a:prstGeom>
+          <a:noFill/>
+        </p:spPr>
+        <p:txBody>
+          <a:bodyPr wrap="square" rtlCol="0">
+            <a:spAutoFit/>
+          </a:bodyPr>
+          <a:lstStyle/>
+          <a:p>
+            <a:r>
+              <a:rPr lang="en-US" dirty="0" smtClean="0">
+                <a:solidFill>
+                  <a:schemeClr val="accent6">
+                    <a:lumMod val="75000"/>
+                  </a:schemeClr>
+                </a:solidFill>
+              </a:rPr>
+              <a:t>Next, let’s try the </a:t>
+            </a:r>
+            <a:r>
+              <a:rPr lang="en-US" b="1" dirty="0" smtClean="0">
+                <a:solidFill>
+                  <a:schemeClr val="accent6">
+                    <a:lumMod val="75000"/>
+                  </a:schemeClr>
+                </a:solidFill>
+              </a:rPr>
+              <a:t>Shapes Lab </a:t>
+            </a:r>
+            <a:r>
+              <a:rPr lang="en-US" dirty="0" smtClean="0">
+                <a:solidFill>
+                  <a:schemeClr val="accent6">
+                    <a:lumMod val="75000"/>
+                  </a:schemeClr>
+                </a:solidFill>
+              </a:rPr>
+              <a:t>feature</a:t>
+            </a:r>
+            <a:endParaRPr lang="en-SG" dirty="0">
+              <a:solidFill>
+                <a:schemeClr val="accent6">
+                  <a:lumMod val="75000"/>
+                </a:schemeClr>
+              </a:solidFill>
+            </a:endParaRPr>
+          </a:p>
+        </p:txBody>
+      </p:sp>
+      <p:grpSp>
+        <p:nvGrpSpPr>
+          <p:cNvPr id="9" name="[Group 8]"/>
+          <p:cNvGrpSpPr/>
+          <p:nvPr/>
+        </p:nvGrpSpPr>
+        <p:grpSpPr>
+          <a:xfrm>
+            <a:off x="2438400" y="2895600"/>
+            <a:ext cx="838200" cy="838200"/>
+            <a:chOff x="375266" y="5397326"/>
+            <a:chExt cx="838200" cy="838200"/>
+          </a:xfrm>
+        </p:grpSpPr>
+        <p:sp>
+          <p:nvSpPr>
+            <p:cNvPr id="10" name="Rectangle 9"/>
+            <p:cNvSpPr/>
+            <p:nvPr/>
+          </p:nvSpPr>
+          <p:spPr>
+            <a:xfrm>
+              <a:off x="375266" y="5397326"/>
+              <a:ext cx="838200" cy="838200"/>
+            </a:xfrm>
+            <a:prstGeom prst="rect">
+              <a:avLst/>
+            </a:prstGeom>
+            <a:noFill/>
+            <a:ln>
+              <a:noFill/>
+            </a:ln>
+          </p:spPr>
+          <p:style>
+            <a:lnRef idx="2">
+              <a:schemeClr val="accent1">
+                <a:shade val="50000"/>
+              </a:schemeClr>
+            </a:lnRef>
+            <a:fillRef idx="1">
+              <a:schemeClr val="accent1"/>
+            </a:fillRef>
+            <a:effectRef idx="0">
+              <a:schemeClr val="accent1"/>
+            </a:effectRef>
+            <a:fontRef idx="minor">
+              <a:schemeClr val="lt1"/>
+            </a:fontRef>
+          </p:style>
+          <p:txBody>
+            <a:bodyPr rtlCol="0" anchor="ctr"/>
+            <a:lstStyle/>
+            <a:p>
+              <a:pPr algn="ctr"/>
+              <a:endParaRPr lang="en-SG"/>
+            </a:p>
+          </p:txBody>
+        </p:sp>
+        <p:sp>
+          <p:nvSpPr>
+            <p:cNvPr id="11" name="Rectangle 4"/>
+            <p:cNvSpPr/>
+            <p:nvPr/>
+          </p:nvSpPr>
+          <p:spPr>
+            <a:xfrm rot="16200000">
+              <a:off x="444221" y="5470529"/>
+              <a:ext cx="700291" cy="690781"/>
+            </a:xfrm>
+            <a:custGeom>
+              <a:avLst/>
+              <a:gdLst/>
+              <a:ahLst/>
+              <a:cxnLst/>
+              <a:rect l="l" t="t" r="r" b="b"/>
+              <a:pathLst>
+                <a:path w="1752603" h="1752600">
+                  <a:moveTo>
+                    <a:pt x="533400" y="0"/>
+                  </a:moveTo>
+                  <a:lnTo>
+                    <a:pt x="533403" y="0"/>
+                  </a:lnTo>
+                  <a:lnTo>
+                    <a:pt x="1066800" y="0"/>
+                  </a:lnTo>
+                  <a:lnTo>
+                    <a:pt x="1752603" y="0"/>
+                  </a:lnTo>
+                  <a:lnTo>
+                    <a:pt x="1752603" y="1752600"/>
+                  </a:lnTo>
+                  <a:lnTo>
+                    <a:pt x="1219203" y="1752600"/>
+                  </a:lnTo>
+                  <a:lnTo>
+                    <a:pt x="533403" y="1752600"/>
+                  </a:lnTo>
+                  <a:lnTo>
+                    <a:pt x="3" y="1752600"/>
+                  </a:lnTo>
+                  <a:lnTo>
+                    <a:pt x="3" y="533430"/>
+                  </a:lnTo>
+                  <a:cubicBezTo>
+                    <a:pt x="0" y="533420"/>
+                    <a:pt x="0" y="533410"/>
+                    <a:pt x="0" y="533400"/>
+                  </a:cubicBezTo>
+                  <a:cubicBezTo>
+                    <a:pt x="0" y="238811"/>
+                    <a:pt x="238811" y="0"/>
+                    <a:pt x="533400" y="0"/>
+                  </a:cubicBezTo>
+                  <a:close/>
+                </a:path>
+              </a:pathLst>
+            </a:custGeom>
+            <a:noFill/>
+            <a:ln w="76200" cmpd="sng">
+              <a:solidFill>
+                <a:srgbClr val="0070C0"/>
+              </a:solidFill>
+              <a:miter lim="800000"/>
+            </a:ln>
+          </p:spPr>
+          <p:style>
+            <a:lnRef idx="2">
+              <a:schemeClr val="accent1">
+                <a:shade val="50000"/>
+              </a:schemeClr>
+            </a:lnRef>
+            <a:fillRef idx="1">
+              <a:schemeClr val="accent1"/>
+            </a:fillRef>
+            <a:effectRef idx="0">
+              <a:schemeClr val="accent1"/>
+            </a:effectRef>
+            <a:fontRef idx="minor">
+              <a:schemeClr val="lt1"/>
+            </a:fontRef>
+          </p:style>
+          <p:txBody>
+            <a:bodyPr rtlCol="0" anchor="ctr"/>
+            <a:lstStyle/>
+            <a:p>
+              <a:pPr algn="ctr"/>
+              <a:endParaRPr lang="en-US"/>
+            </a:p>
+          </p:txBody>
+        </p:sp>
+        <p:sp>
+          <p:nvSpPr>
+            <p:cNvPr id="12" name="Teardrop 11"/>
+            <p:cNvSpPr/>
+            <p:nvPr/>
+          </p:nvSpPr>
+          <p:spPr>
+            <a:xfrm>
+              <a:off x="747877" y="5557049"/>
+              <a:ext cx="309672" cy="307175"/>
+            </a:xfrm>
+            <a:prstGeom prst="teardrop">
+              <a:avLst/>
+            </a:prstGeom>
+            <a:solidFill>
+              <a:srgbClr val="0070C0"/>
+            </a:solidFill>
+            <a:ln w="19050">
+              <a:solidFill>
+                <a:schemeClr val="bg1"/>
+              </a:solidFill>
+            </a:ln>
+            <a:effectLst/>
+          </p:spPr>
+          <p:style>
+            <a:lnRef idx="2">
+              <a:schemeClr val="accent1">
+                <a:shade val="50000"/>
+              </a:schemeClr>
+            </a:lnRef>
+            <a:fillRef idx="1">
+              <a:schemeClr val="accent1"/>
+            </a:fillRef>
+            <a:effectRef idx="0">
+              <a:schemeClr val="accent1"/>
+            </a:effectRef>
+            <a:fontRef idx="minor">
+              <a:schemeClr val="lt1"/>
+            </a:fontRef>
+          </p:style>
+          <p:txBody>
+            <a:bodyPr rtlCol="0" anchor="ctr"/>
+            <a:lstStyle/>
+            <a:p>
+              <a:pPr algn="ctr"/>
+              <a:endParaRPr lang="en-SG"/>
+            </a:p>
+          </p:txBody>
+        </p:sp>
+        <p:sp>
+          <p:nvSpPr>
+            <p:cNvPr id="13" name="Flowchart: Process 12"/>
+            <p:cNvSpPr/>
+            <p:nvPr/>
+          </p:nvSpPr>
+          <p:spPr>
+            <a:xfrm>
+              <a:off x="544174" y="5670551"/>
+              <a:ext cx="299506" cy="256598"/>
+            </a:xfrm>
+            <a:prstGeom prst="flowChartProcess">
+              <a:avLst/>
+            </a:prstGeom>
+            <a:solidFill>
+              <a:schemeClr val="accent6"/>
+            </a:solidFill>
+            <a:ln w="19050">
+              <a:solidFill>
+                <a:schemeClr val="bg1"/>
+              </a:solidFill>
+            </a:ln>
+            <a:effectLst/>
+          </p:spPr>
+          <p:style>
+            <a:lnRef idx="2">
+              <a:schemeClr val="accent1">
+                <a:shade val="50000"/>
+              </a:schemeClr>
+            </a:lnRef>
+            <a:fillRef idx="1">
+              <a:schemeClr val="accent1"/>
+            </a:fillRef>
+            <a:effectRef idx="0">
+              <a:schemeClr val="accent1"/>
+            </a:effectRef>
+            <a:fontRef idx="minor">
+              <a:schemeClr val="lt1"/>
+            </a:fontRef>
+          </p:style>
+          <p:txBody>
+            <a:bodyPr rtlCol="0" anchor="ctr"/>
+            <a:lstStyle/>
+            <a:p>
+              <a:pPr algn="ctr"/>
+              <a:endParaRPr lang="en-SG"/>
+            </a:p>
+          </p:txBody>
+        </p:sp>
+        <p:sp>
+          <p:nvSpPr>
+            <p:cNvPr id="14" name="Flowchart: Magnetic Disk 13"/>
+            <p:cNvSpPr/>
+            <p:nvPr/>
+          </p:nvSpPr>
+          <p:spPr>
+            <a:xfrm>
+              <a:off x="721676" y="5747165"/>
+              <a:ext cx="258469" cy="315518"/>
+            </a:xfrm>
+            <a:prstGeom prst="flowChartMagneticDisk">
+              <a:avLst/>
+            </a:prstGeom>
+            <a:solidFill>
+              <a:schemeClr val="accent6"/>
+            </a:solidFill>
+            <a:ln w="19050">
+              <a:solidFill>
+                <a:schemeClr val="bg1"/>
+              </a:solidFill>
+            </a:ln>
+            <a:effectLst/>
+          </p:spPr>
+          <p:style>
+            <a:lnRef idx="2">
+              <a:schemeClr val="accent1">
+                <a:shade val="50000"/>
+              </a:schemeClr>
+            </a:lnRef>
+            <a:fillRef idx="1">
+              <a:schemeClr val="accent1"/>
+            </a:fillRef>
+            <a:effectRef idx="0">
+              <a:schemeClr val="accent1"/>
+            </a:effectRef>
+            <a:fontRef idx="minor">
+              <a:schemeClr val="lt1"/>
+            </a:fontRef>
+          </p:style>
+          <p:txBody>
+            <a:bodyPr rtlCol="0" anchor="ctr"/>
+            <a:lstStyle/>
+            <a:p>
+              <a:pPr algn="ctr"/>
+              <a:endParaRPr lang="en-SG"/>
+            </a:p>
+          </p:txBody>
+        </p:sp>
+      </p:grpSp>
+    </p:spTree>
+    <p:extLst>
+      <p:ext uri="{BB962C8B-B14F-4D97-AF65-F5344CB8AC3E}">
+        <p14:creationId xmlns:p14="http://schemas.microsoft.com/office/powerpoint/2010/main" val="568570799"/>
+      </p:ext>
+    </p:extLst>
+  </p:cSld>
+  <p:clrMapOvr>
+    <a:masterClrMapping/>
+  </p:clrMapOvr>
+  <p:timing>
+    <p:tnLst>
+      <p:par>
+        <p:cTn id="1" dur="indefinite" restart="never" nodeType="tmRoot"/>
+      </p:par>
+    </p:tnLst>
+  </p:timing>
+</p:sld>
+</file>
+
+<file path=ppt/slides/slide28.xml><?xml version="1.0" encoding="utf-8"?>
+<p:sld xmlns:a="http://schemas.openxmlformats.org/drawingml/2006/main" xmlns:r="http://schemas.openxmlformats.org/officeDocument/2006/relationships" xmlns:p="http://schemas.openxmlformats.org/presentationml/2006/main">
+  <p:cSld>
+    <p:spTree>
+      <p:nvGrpSpPr>
+        <p:cNvPr id="1" name=""/>
+        <p:cNvGrpSpPr/>
+        <p:nvPr/>
+      </p:nvGrpSpPr>
+      <p:grpSpPr>
+        <a:xfrm>
+          <a:off x="0" y="0"/>
+          <a:ext cx="0" cy="0"/>
+          <a:chOff x="0" y="0"/>
+          <a:chExt cx="0" cy="0"/>
+        </a:xfrm>
+      </p:grpSpPr>
+      <p:sp>
+        <p:nvSpPr>
+          <p:cNvPr id="7" name="[TextBox 6]"/>
+          <p:cNvSpPr txBox="1"/>
+          <p:nvPr/>
+        </p:nvSpPr>
+        <p:spPr>
+          <a:xfrm>
+            <a:off x="457200" y="907022"/>
+            <a:ext cx="3505200" cy="1077218"/>
+          </a:xfrm>
+          <a:prstGeom prst="rect">
+            <a:avLst/>
+          </a:prstGeom>
+          <a:noFill/>
+        </p:spPr>
+        <p:txBody>
+          <a:bodyPr wrap="square" rtlCol="0">
+            <a:spAutoFit/>
+          </a:bodyPr>
+          <a:lstStyle/>
+          <a:p>
+            <a:r>
+              <a:rPr lang="en-US" sz="2800" b="1" dirty="0" smtClean="0">
+                <a:solidFill>
+                  <a:schemeClr val="accent6">
+                    <a:lumMod val="75000"/>
+                  </a:schemeClr>
+                </a:solidFill>
+              </a:rPr>
+              <a:t>1.</a:t>
+            </a:r>
+            <a:r>
+              <a:rPr lang="en-US" dirty="0" smtClean="0">
+                <a:solidFill>
+                  <a:schemeClr val="accent6">
+                    <a:lumMod val="75000"/>
+                  </a:schemeClr>
+                </a:solidFill>
+              </a:rPr>
+              <a:t> Click the                button, it will </a:t>
+            </a:r>
+          </a:p>
+          <a:p>
+            <a:endParaRPr lang="en-US" dirty="0" smtClean="0">
+              <a:solidFill>
+                <a:schemeClr val="accent6">
+                  <a:lumMod val="75000"/>
+                </a:schemeClr>
+              </a:solidFill>
+            </a:endParaRPr>
+          </a:p>
+          <a:p>
+            <a:r>
+              <a:rPr lang="en-US" dirty="0" smtClean="0">
+                <a:solidFill>
+                  <a:schemeClr val="accent6">
+                    <a:lumMod val="75000"/>
+                  </a:schemeClr>
+                </a:solidFill>
+              </a:rPr>
+              <a:t>bring you the Shapes Lab Panel.</a:t>
+            </a:r>
+            <a:endParaRPr lang="en-SG" dirty="0">
+              <a:solidFill>
+                <a:schemeClr val="accent6">
+                  <a:lumMod val="75000"/>
+                </a:schemeClr>
+              </a:solidFill>
+            </a:endParaRPr>
+          </a:p>
+        </p:txBody>
+      </p:sp>
+      <p:pic>
+        <p:nvPicPr>
+          <p:cNvPr id="2" name="Picture 1"/>
+          <p:cNvPicPr>
+            <a:picLocks noChangeAspect="1"/>
+          </p:cNvPicPr>
+          <p:nvPr/>
+        </p:nvPicPr>
+        <p:blipFill>
+          <a:blip r:embed="rId3"/>
+          <a:stretch>
+            <a:fillRect/>
+          </a:stretch>
+        </p:blipFill>
+        <p:spPr>
+          <a:xfrm>
+            <a:off x="1752600" y="732504"/>
+            <a:ext cx="609600" cy="975360"/>
+          </a:xfrm>
+          <a:prstGeom prst="rect">
+            <a:avLst/>
+          </a:prstGeom>
+        </p:spPr>
+      </p:pic>
+      <p:pic>
+        <p:nvPicPr>
+          <p:cNvPr id="3" name="Picture 2"/>
+          <p:cNvPicPr>
+            <a:picLocks noChangeAspect="1"/>
+          </p:cNvPicPr>
+          <p:nvPr/>
+        </p:nvPicPr>
+        <p:blipFill>
+          <a:blip r:embed="rId4"/>
+          <a:stretch>
+            <a:fillRect/>
+          </a:stretch>
+        </p:blipFill>
+        <p:spPr>
+          <a:xfrm>
+            <a:off x="4038600" y="155812"/>
+            <a:ext cx="4907639" cy="6705600"/>
+          </a:xfrm>
+          <a:prstGeom prst="rect">
+            <a:avLst/>
+          </a:prstGeom>
+        </p:spPr>
+      </p:pic>
+      <p:sp>
+        <p:nvSpPr>
+          <p:cNvPr id="9" name="[TextBox 6]"/>
+          <p:cNvSpPr txBox="1"/>
+          <p:nvPr/>
+        </p:nvSpPr>
+        <p:spPr>
+          <a:xfrm>
+            <a:off x="457200" y="2485104"/>
+            <a:ext cx="3505200" cy="1908215"/>
+          </a:xfrm>
+          <a:prstGeom prst="rect">
+            <a:avLst/>
+          </a:prstGeom>
+          <a:noFill/>
+        </p:spPr>
+        <p:txBody>
+          <a:bodyPr wrap="square" rtlCol="0">
+            <a:spAutoFit/>
+          </a:bodyPr>
+          <a:lstStyle/>
+          <a:p>
+            <a:r>
+              <a:rPr lang="en-US" sz="2800" b="1" dirty="0" smtClean="0">
+                <a:solidFill>
+                  <a:schemeClr val="accent6">
+                    <a:lumMod val="75000"/>
+                  </a:schemeClr>
+                </a:solidFill>
+              </a:rPr>
+              <a:t>2.</a:t>
+            </a:r>
+            <a:r>
+              <a:rPr lang="en-US" dirty="0" smtClean="0">
+                <a:solidFill>
+                  <a:schemeClr val="accent6">
+                    <a:lumMod val="75000"/>
+                  </a:schemeClr>
+                </a:solidFill>
+              </a:rPr>
+              <a:t> Right click on the shape you want to add into the Lab, and select “Add to Custom Shapes”. Then you should see your shape in the panel and waiting for name editing.</a:t>
+            </a:r>
+            <a:endParaRPr lang="en-SG" dirty="0">
+              <a:solidFill>
+                <a:schemeClr val="accent6">
+                  <a:lumMod val="75000"/>
+                </a:schemeClr>
+              </a:solidFill>
+            </a:endParaRPr>
+          </a:p>
+        </p:txBody>
+      </p:sp>
+      <p:sp>
+        <p:nvSpPr>
+          <p:cNvPr id="10" name="[TextBox 6]"/>
+          <p:cNvSpPr txBox="1"/>
+          <p:nvPr/>
+        </p:nvSpPr>
+        <p:spPr>
+          <a:xfrm>
+            <a:off x="457200" y="4894183"/>
+            <a:ext cx="3505200" cy="1354217"/>
+          </a:xfrm>
+          <a:prstGeom prst="rect">
+            <a:avLst/>
+          </a:prstGeom>
+          <a:noFill/>
+        </p:spPr>
+        <p:txBody>
+          <a:bodyPr wrap="square" rtlCol="0">
+            <a:spAutoFit/>
+          </a:bodyPr>
+          <a:lstStyle/>
+          <a:p>
+            <a:r>
+              <a:rPr lang="en-US" sz="2800" b="1" dirty="0" smtClean="0">
+                <a:solidFill>
+                  <a:schemeClr val="accent6">
+                    <a:lumMod val="75000"/>
+                  </a:schemeClr>
+                </a:solidFill>
+              </a:rPr>
+              <a:t>3.</a:t>
+            </a:r>
+            <a:r>
+              <a:rPr lang="en-US" dirty="0" smtClean="0">
+                <a:solidFill>
+                  <a:schemeClr val="accent6">
+                    <a:lumMod val="75000"/>
+                  </a:schemeClr>
+                </a:solidFill>
+              </a:rPr>
+              <a:t> After finishing name editing, press enter to confirm. Alternatively, you could click on any where else to confirm the change.</a:t>
+            </a:r>
+          </a:p>
+        </p:txBody>
+      </p:sp>
+    </p:spTree>
+    <p:extLst>
+      <p:ext uri="{BB962C8B-B14F-4D97-AF65-F5344CB8AC3E}">
+        <p14:creationId xmlns:p14="http://schemas.microsoft.com/office/powerpoint/2010/main" val="2356246644"/>
+      </p:ext>
+    </p:extLst>
+  </p:cSld>
+  <p:clrMapOvr>
+    <a:masterClrMapping/>
+  </p:clrMapOvr>
+  <p:timing>
+    <p:tnLst>
+      <p:par>
+        <p:cTn id="1" dur="indefinite" restart="never" nodeType="tmRoot"/>
+      </p:par>
+    </p:tnLst>
+  </p:timing>
+</p:sld>
+</file>
+
+<file path=ppt/slides/slide29.xml><?xml version="1.0" encoding="utf-8"?>
+<p:sld xmlns:a="http://schemas.openxmlformats.org/drawingml/2006/main" xmlns:r="http://schemas.openxmlformats.org/officeDocument/2006/relationships" xmlns:p="http://schemas.openxmlformats.org/presentationml/2006/main">
+  <p:cSld>
+    <p:spTree>
+      <p:nvGrpSpPr>
+        <p:cNvPr id="1" name=""/>
+        <p:cNvGrpSpPr/>
+        <p:nvPr/>
+      </p:nvGrpSpPr>
+      <p:grpSpPr>
+        <a:xfrm>
+          <a:off x="0" y="0"/>
+          <a:ext cx="0" cy="0"/>
+          <a:chOff x="0" y="0"/>
+          <a:chExt cx="0" cy="0"/>
+        </a:xfrm>
+      </p:grpSpPr>
+      <p:sp>
+        <p:nvSpPr>
+          <p:cNvPr id="7" name="[TextBox 6]"/>
+          <p:cNvSpPr txBox="1"/>
+          <p:nvPr/>
+        </p:nvSpPr>
+        <p:spPr>
+          <a:xfrm>
+            <a:off x="457200" y="907022"/>
+            <a:ext cx="3505200" cy="1077218"/>
+          </a:xfrm>
+          <a:prstGeom prst="rect">
+            <a:avLst/>
+          </a:prstGeom>
+          <a:noFill/>
+        </p:spPr>
+        <p:txBody>
+          <a:bodyPr wrap="square" rtlCol="0">
+            <a:spAutoFit/>
+          </a:bodyPr>
+          <a:lstStyle/>
+          <a:p>
+            <a:r>
+              <a:rPr lang="en-US" sz="2800" b="1" dirty="0" smtClean="0">
+                <a:solidFill>
+                  <a:schemeClr val="accent6">
+                    <a:lumMod val="75000"/>
+                  </a:schemeClr>
+                </a:solidFill>
+              </a:rPr>
+              <a:t>1.</a:t>
+            </a:r>
+            <a:r>
+              <a:rPr lang="en-US" dirty="0" smtClean="0">
+                <a:solidFill>
+                  <a:schemeClr val="accent6">
+                    <a:lumMod val="75000"/>
+                  </a:schemeClr>
+                </a:solidFill>
+              </a:rPr>
+              <a:t> Click the                button, it will </a:t>
+            </a:r>
+          </a:p>
+          <a:p>
+            <a:endParaRPr lang="en-US" dirty="0" smtClean="0">
+              <a:solidFill>
+                <a:schemeClr val="accent6">
+                  <a:lumMod val="75000"/>
+                </a:schemeClr>
+              </a:solidFill>
+            </a:endParaRPr>
+          </a:p>
+          <a:p>
+            <a:r>
+              <a:rPr lang="en-US" dirty="0" smtClean="0">
+                <a:solidFill>
+                  <a:schemeClr val="accent6">
+                    <a:lumMod val="75000"/>
+                  </a:schemeClr>
+                </a:solidFill>
+              </a:rPr>
+              <a:t>bring you the Shapes Lab Panel.</a:t>
+            </a:r>
+            <a:endParaRPr lang="en-SG" dirty="0">
+              <a:solidFill>
+                <a:schemeClr val="accent6">
+                  <a:lumMod val="75000"/>
+                </a:schemeClr>
+              </a:solidFill>
+            </a:endParaRPr>
+          </a:p>
+        </p:txBody>
+      </p:sp>
+      <p:pic>
+        <p:nvPicPr>
+          <p:cNvPr id="3" name="Picture 2"/>
+          <p:cNvPicPr>
+            <a:picLocks noChangeAspect="1"/>
+          </p:cNvPicPr>
+          <p:nvPr/>
+        </p:nvPicPr>
+        <p:blipFill>
+          <a:blip r:embed="rId3"/>
+          <a:stretch>
+            <a:fillRect/>
+          </a:stretch>
+        </p:blipFill>
+        <p:spPr>
+          <a:xfrm>
+            <a:off x="4038600" y="155812"/>
+            <a:ext cx="4907639" cy="6705600"/>
+          </a:xfrm>
+          <a:prstGeom prst="rect">
+            <a:avLst/>
+          </a:prstGeom>
+        </p:spPr>
+      </p:pic>
+      <p:sp>
+        <p:nvSpPr>
+          <p:cNvPr id="9" name="[TextBox 6]"/>
+          <p:cNvSpPr txBox="1"/>
+          <p:nvPr/>
+        </p:nvSpPr>
+        <p:spPr>
+          <a:xfrm>
+            <a:off x="457200" y="2485104"/>
+            <a:ext cx="3505200" cy="1908215"/>
+          </a:xfrm>
+          <a:prstGeom prst="rect">
+            <a:avLst/>
+          </a:prstGeom>
+          <a:noFill/>
+        </p:spPr>
+        <p:txBody>
+          <a:bodyPr wrap="square" rtlCol="0">
+            <a:spAutoFit/>
+          </a:bodyPr>
+          <a:lstStyle/>
+          <a:p>
+            <a:r>
+              <a:rPr lang="en-US" sz="2800" b="1" dirty="0" smtClean="0">
+                <a:solidFill>
+                  <a:schemeClr val="accent6">
+                    <a:lumMod val="75000"/>
+                  </a:schemeClr>
+                </a:solidFill>
+              </a:rPr>
+              <a:t>2.</a:t>
+            </a:r>
+            <a:r>
+              <a:rPr lang="en-US" dirty="0" smtClean="0">
+                <a:solidFill>
+                  <a:schemeClr val="accent6">
+                    <a:lumMod val="75000"/>
+                  </a:schemeClr>
+                </a:solidFill>
+              </a:rPr>
+              <a:t> Right click on the shape you want to add into the Lab, and select “Add to Custom Shapes”. Then you should see your shape in the panel and waiting for name editing.</a:t>
+            </a:r>
+            <a:endParaRPr lang="en-SG" dirty="0">
+              <a:solidFill>
+                <a:schemeClr val="accent6">
+                  <a:lumMod val="75000"/>
+                </a:schemeClr>
+              </a:solidFill>
+            </a:endParaRPr>
+          </a:p>
+        </p:txBody>
+      </p:sp>
+      <p:sp>
+        <p:nvSpPr>
+          <p:cNvPr id="10" name="[TextBox 6]"/>
+          <p:cNvSpPr txBox="1"/>
+          <p:nvPr/>
+        </p:nvSpPr>
+        <p:spPr>
+          <a:xfrm>
+            <a:off x="457200" y="4894183"/>
+            <a:ext cx="3505200" cy="1354217"/>
+          </a:xfrm>
+          <a:prstGeom prst="rect">
+            <a:avLst/>
+          </a:prstGeom>
+          <a:noFill/>
+        </p:spPr>
+        <p:txBody>
+          <a:bodyPr wrap="square" rtlCol="0">
+            <a:spAutoFit/>
+          </a:bodyPr>
+          <a:lstStyle/>
+          <a:p>
+            <a:r>
+              <a:rPr lang="en-US" sz="2800" b="1" dirty="0" smtClean="0">
+                <a:solidFill>
+                  <a:schemeClr val="accent6">
+                    <a:lumMod val="75000"/>
+                  </a:schemeClr>
+                </a:solidFill>
+              </a:rPr>
+              <a:t>3.</a:t>
+            </a:r>
+            <a:r>
+              <a:rPr lang="en-US" dirty="0" smtClean="0">
+                <a:solidFill>
+                  <a:schemeClr val="accent6">
+                    <a:lumMod val="75000"/>
+                  </a:schemeClr>
+                </a:solidFill>
+              </a:rPr>
+              <a:t> After finishing name editing, press enter to confirm. Alternatively, you could click on any where else to confirm the change.</a:t>
+            </a:r>
+          </a:p>
+        </p:txBody>
+      </p:sp>
+    </p:spTree>
+    <p:extLst>
+      <p:ext uri="{BB962C8B-B14F-4D97-AF65-F5344CB8AC3E}">
+        <p14:creationId xmlns:p14="http://schemas.microsoft.com/office/powerpoint/2010/main" val="3860146555"/>
+      </p:ext>
+    </p:extLst>
+  </p:cSld>
+  <p:clrMapOvr>
+    <a:masterClrMapping/>
+  </p:clrMapOvr>
+  <p:timing>
+    <p:tnLst>
+      <p:par>
+        <p:cTn id="1" dur="indefinite" restart="never" nodeType="tmRoot"/>
+      </p:par>
+    </p:tnLst>
+  </p:timing>
+</p:sld>
+</file>
+
+<file path=ppt/slides/slide3.xml><?xml version="1.0" encoding="utf-8"?>
+<p:sld xmlns:a="http://schemas.openxmlformats.org/drawingml/2006/main" xmlns:r="http://schemas.openxmlformats.org/officeDocument/2006/relationships" xmlns:p="http://schemas.openxmlformats.org/presentationml/2006/main">
+  <p:cSld>
+    <p:spTree>
+      <p:nvGrpSpPr>
+        <p:cNvPr id="1" name=""/>
+        <p:cNvGrpSpPr/>
+        <p:nvPr/>
+      </p:nvGrpSpPr>
+      <p:grpSpPr>
+        <a:xfrm>
+          <a:off x="0" y="0"/>
+          <a:ext cx="0" cy="0"/>
+          <a:chOff x="0" y="0"/>
+          <a:chExt cx="0" cy="0"/>
+        </a:xfrm>
+      </p:grpSpPr>
+      <p:sp>
+        <p:nvSpPr>
+          <p:cNvPr id="4" name="TextBox 3"/>
+          <p:cNvSpPr txBox="1"/>
+          <p:nvPr/>
+        </p:nvSpPr>
+        <p:spPr>
+          <a:xfrm>
+            <a:off x="762000" y="2362200"/>
+            <a:ext cx="7543800" cy="1754326"/>
+          </a:xfrm>
+          <a:prstGeom prst="rect">
+            <a:avLst/>
+          </a:prstGeom>
+          <a:noFill/>
+        </p:spPr>
+        <p:txBody>
+          <a:bodyPr wrap="square" rtlCol="0">
+            <a:spAutoFit/>
+          </a:bodyPr>
+          <a:lstStyle/>
+          <a:p>
+            <a:r>
+              <a:rPr lang="en-US" dirty="0" smtClean="0">
+                <a:solidFill>
+                  <a:schemeClr val="accent6">
+                    <a:lumMod val="75000"/>
+                  </a:schemeClr>
+                </a:solidFill>
+              </a:rPr>
+              <a:t>This tutorial explains </a:t>
+            </a:r>
+            <a:r>
+              <a:rPr lang="en-US" dirty="0" err="1" smtClean="0">
+                <a:solidFill>
+                  <a:schemeClr val="accent6">
+                    <a:lumMod val="75000"/>
+                  </a:schemeClr>
+                </a:solidFill>
+              </a:rPr>
+              <a:t>PowerPointLabs</a:t>
+            </a:r>
+            <a:r>
+              <a:rPr lang="en-US" dirty="0" smtClean="0">
+                <a:solidFill>
+                  <a:schemeClr val="accent6">
+                    <a:lumMod val="75000"/>
+                  </a:schemeClr>
+                </a:solidFill>
+              </a:rPr>
+              <a:t>’ features at the point you installed the plugin. </a:t>
+            </a:r>
+          </a:p>
+          <a:p>
+            <a:endParaRPr lang="en-US" dirty="0" smtClean="0">
+              <a:solidFill>
+                <a:schemeClr val="accent6">
+                  <a:lumMod val="75000"/>
+                </a:schemeClr>
+              </a:solidFill>
+            </a:endParaRPr>
+          </a:p>
+          <a:p>
+            <a:endParaRPr lang="en-US" dirty="0">
+              <a:solidFill>
+                <a:schemeClr val="accent6">
+                  <a:lumMod val="75000"/>
+                </a:schemeClr>
+              </a:solidFill>
+            </a:endParaRPr>
+          </a:p>
+          <a:p>
+            <a:r>
+              <a:rPr lang="en-US" dirty="0" smtClean="0">
+                <a:solidFill>
+                  <a:schemeClr val="accent6">
+                    <a:lumMod val="75000"/>
+                  </a:schemeClr>
+                </a:solidFill>
+              </a:rPr>
+              <a:t>If you installed the plugin some time back, please refer to the </a:t>
+            </a:r>
+            <a:r>
+              <a:rPr lang="en-US" i="1" dirty="0" smtClean="0">
+                <a:solidFill>
+                  <a:schemeClr val="accent6">
+                    <a:lumMod val="75000"/>
+                  </a:schemeClr>
+                </a:solidFill>
+              </a:rPr>
+              <a:t>Documentation</a:t>
+            </a:r>
+            <a:r>
+              <a:rPr lang="en-US" dirty="0" smtClean="0">
+                <a:solidFill>
+                  <a:schemeClr val="accent6">
+                    <a:lumMod val="75000"/>
+                  </a:schemeClr>
+                </a:solidFill>
+              </a:rPr>
+              <a:t> page of </a:t>
+            </a:r>
+            <a:r>
+              <a:rPr lang="en-US" dirty="0" smtClean="0">
+                <a:solidFill>
+                  <a:schemeClr val="accent6">
+                    <a:lumMod val="75000"/>
+                  </a:schemeClr>
+                </a:solidFill>
+                <a:hlinkClick r:id="rId2"/>
+              </a:rPr>
+              <a:t>our website</a:t>
+            </a:r>
+            <a:r>
+              <a:rPr lang="en-US" dirty="0" smtClean="0">
+                <a:solidFill>
+                  <a:schemeClr val="accent6">
+                    <a:lumMod val="75000"/>
+                  </a:schemeClr>
+                </a:solidFill>
+              </a:rPr>
+              <a:t> for more up-to-date instructions.</a:t>
+            </a:r>
+            <a:endParaRPr lang="en-SG" dirty="0">
+              <a:solidFill>
+                <a:schemeClr val="accent6">
+                  <a:lumMod val="75000"/>
+                </a:schemeClr>
+              </a:solidFill>
+            </a:endParaRPr>
+          </a:p>
+        </p:txBody>
+      </p:sp>
+    </p:spTree>
+    <p:extLst>
+      <p:ext uri="{BB962C8B-B14F-4D97-AF65-F5344CB8AC3E}">
+        <p14:creationId xmlns:p14="http://schemas.microsoft.com/office/powerpoint/2010/main" val="1906505232"/>
+      </p:ext>
+    </p:extLst>
+  </p:cSld>
+  <p:clrMapOvr>
+    <a:masterClrMapping/>
+  </p:clrMapOvr>
+  <p:timing>
+    <p:tnLst>
+      <p:par>
+        <p:cTn id="1" dur="indefinite" restart="never" nodeType="tmRoot"/>
+      </p:par>
+    </p:tnLst>
+  </p:timing>
+</p:sld>
+</file>
+
+<file path=ppt/slides/slide30.xml><?xml version="1.0" encoding="utf-8"?>
+<p:sld xmlns:a="http://schemas.openxmlformats.org/drawingml/2006/main" xmlns:r="http://schemas.openxmlformats.org/officeDocument/2006/relationships" xmlns:p="http://schemas.openxmlformats.org/presentationml/2006/main">
+  <p:cSld>
+    <p:spTree>
+      <p:nvGrpSpPr>
+        <p:cNvPr id="1" name=""/>
+        <p:cNvGrpSpPr/>
+        <p:nvPr/>
+      </p:nvGrpSpPr>
+      <p:grpSpPr>
+        <a:xfrm>
+          <a:off x="0" y="0"/>
+          <a:ext cx="0" cy="0"/>
+          <a:chOff x="0" y="0"/>
+          <a:chExt cx="0" cy="0"/>
+        </a:xfrm>
+      </p:grpSpPr>
+      <p:sp>
+        <p:nvSpPr>
           <p:cNvPr id="16" name="TextBox 15"/>
           <p:cNvSpPr txBox="1"/>
           <p:nvPr/>
@@ -15902,7 +17087,7 @@
 </p:sld>
 </file>
 
-<file path=ppt/slides/slide28.xml><?xml version="1.0" encoding="utf-8"?>
+<file path=ppt/slides/slide31.xml><?xml version="1.0" encoding="utf-8"?>
 <p:sld xmlns:a="http://schemas.openxmlformats.org/drawingml/2006/main" xmlns:r="http://schemas.openxmlformats.org/officeDocument/2006/relationships" xmlns:p="http://schemas.openxmlformats.org/presentationml/2006/main" show="0">
   <p:cSld name="PPAck201401021130490549">
     <p:spTree>
@@ -16028,176 +17213,6 @@
       <p:transition spd="slow"/>
     </mc:Fallback>
   </mc:AlternateContent>
-  <p:timing>
-    <p:tnLst>
-      <p:par>
-        <p:cTn id="1" dur="indefinite" restart="never" nodeType="tmRoot"/>
-      </p:par>
-    </p:tnLst>
-  </p:timing>
-</p:sld>
-</file>
-
-<file path=ppt/slides/slide3.xml><?xml version="1.0" encoding="utf-8"?>
-<p:sld xmlns:a="http://schemas.openxmlformats.org/drawingml/2006/main" xmlns:r="http://schemas.openxmlformats.org/officeDocument/2006/relationships" xmlns:p="http://schemas.openxmlformats.org/presentationml/2006/main">
-  <p:cSld>
-    <p:spTree>
-      <p:nvGrpSpPr>
-        <p:cNvPr id="1" name=""/>
-        <p:cNvGrpSpPr/>
-        <p:nvPr/>
-      </p:nvGrpSpPr>
-      <p:grpSpPr>
-        <a:xfrm>
-          <a:off x="0" y="0"/>
-          <a:ext cx="0" cy="0"/>
-          <a:chOff x="0" y="0"/>
-          <a:chExt cx="0" cy="0"/>
-        </a:xfrm>
-      </p:grpSpPr>
-      <p:sp>
-        <p:nvSpPr>
-          <p:cNvPr id="4" name="TextBox 3"/>
-          <p:cNvSpPr txBox="1"/>
-          <p:nvPr/>
-        </p:nvSpPr>
-        <p:spPr>
-          <a:xfrm>
-            <a:off x="762000" y="2362200"/>
-            <a:ext cx="7543800" cy="1754326"/>
-          </a:xfrm>
-          <a:prstGeom prst="rect">
-            <a:avLst/>
-          </a:prstGeom>
-          <a:noFill/>
-        </p:spPr>
-        <p:txBody>
-          <a:bodyPr wrap="square" rtlCol="0">
-            <a:spAutoFit/>
-          </a:bodyPr>
-          <a:lstStyle/>
-          <a:p>
-            <a:r>
-              <a:rPr lang="en-US" dirty="0" smtClean="0">
-                <a:solidFill>
-                  <a:schemeClr val="accent6">
-                    <a:lumMod val="75000"/>
-                  </a:schemeClr>
-                </a:solidFill>
-              </a:rPr>
-              <a:t>This tutorial explains </a:t>
-            </a:r>
-            <a:r>
-              <a:rPr lang="en-US" dirty="0" err="1" smtClean="0">
-                <a:solidFill>
-                  <a:schemeClr val="accent6">
-                    <a:lumMod val="75000"/>
-                  </a:schemeClr>
-                </a:solidFill>
-              </a:rPr>
-              <a:t>PowerPointLabs</a:t>
-            </a:r>
-            <a:r>
-              <a:rPr lang="en-US" dirty="0" smtClean="0">
-                <a:solidFill>
-                  <a:schemeClr val="accent6">
-                    <a:lumMod val="75000"/>
-                  </a:schemeClr>
-                </a:solidFill>
-              </a:rPr>
-              <a:t>’ features at the point you installed the plugin. </a:t>
-            </a:r>
-          </a:p>
-          <a:p>
-            <a:endParaRPr lang="en-US" dirty="0" smtClean="0">
-              <a:solidFill>
-                <a:schemeClr val="accent6">
-                  <a:lumMod val="75000"/>
-                </a:schemeClr>
-              </a:solidFill>
-            </a:endParaRPr>
-          </a:p>
-          <a:p>
-            <a:endParaRPr lang="en-US" dirty="0">
-              <a:solidFill>
-                <a:schemeClr val="accent6">
-                  <a:lumMod val="75000"/>
-                </a:schemeClr>
-              </a:solidFill>
-            </a:endParaRPr>
-          </a:p>
-          <a:p>
-            <a:r>
-              <a:rPr lang="en-US" dirty="0" smtClean="0">
-                <a:solidFill>
-                  <a:schemeClr val="accent6">
-                    <a:lumMod val="75000"/>
-                  </a:schemeClr>
-                </a:solidFill>
-              </a:rPr>
-              <a:t>If you installed the plugin some time back, please refer to the </a:t>
-            </a:r>
-            <a:r>
-              <a:rPr lang="en-US" i="1" dirty="0" smtClean="0">
-                <a:solidFill>
-                  <a:schemeClr val="accent6">
-                    <a:lumMod val="75000"/>
-                  </a:schemeClr>
-                </a:solidFill>
-              </a:rPr>
-              <a:t>Documentation</a:t>
-            </a:r>
-            <a:r>
-              <a:rPr lang="en-US" dirty="0" smtClean="0">
-                <a:solidFill>
-                  <a:schemeClr val="accent6">
-                    <a:lumMod val="75000"/>
-                  </a:schemeClr>
-                </a:solidFill>
-              </a:rPr>
-              <a:t> page of </a:t>
-            </a:r>
-            <a:r>
-              <a:rPr lang="en-US" dirty="0" smtClean="0">
-                <a:solidFill>
-                  <a:schemeClr val="accent6">
-                    <a:lumMod val="75000"/>
-                  </a:schemeClr>
-                </a:solidFill>
-                <a:hlinkClick r:id="rId2"/>
-              </a:rPr>
-              <a:t>our website</a:t>
-            </a:r>
-            <a:r>
-              <a:rPr lang="en-US" dirty="0" smtClean="0">
-                <a:solidFill>
-                  <a:schemeClr val="accent6">
-                    <a:lumMod val="75000"/>
-                  </a:schemeClr>
-                </a:solidFill>
-              </a:rPr>
-              <a:t> for more up-to-date instructions.</a:t>
-            </a:r>
-            <a:endParaRPr lang="en-SG" dirty="0">
-              <a:solidFill>
-                <a:schemeClr val="accent6">
-                  <a:lumMod val="75000"/>
-                </a:schemeClr>
-              </a:solidFill>
-            </a:endParaRPr>
-          </a:p>
-        </p:txBody>
-      </p:sp>
-    </p:spTree>
-    <p:extLst>
-      <p:ext uri="{BB962C8B-B14F-4D97-AF65-F5344CB8AC3E}">
-        <p14:creationId xmlns:p14="http://schemas.microsoft.com/office/powerpoint/2010/main" val="1906505232"/>
-      </p:ext>
-    </p:extLst>
-  </p:cSld>
-  <p:clrMapOvr>
-    <a:masterClrMapping/>
-  </p:clrMapOvr>
   <p:timing>
     <p:tnLst>
       <p:par>

</xml_diff>

<commit_message>
fixed #498: Tutorial for Colors Lab
</commit_message>
<xml_diff>
--- a/PowerPointLabs/PowerPointLabs/PowerPointLabs Quick Tutorial.pptx
+++ b/PowerPointLabs/PowerPointLabs/PowerPointLabs Quick Tutorial.pptx
@@ -5,7 +5,7 @@
     <p:sldMasterId id="2147483648" r:id="rId1"/>
   </p:sldMasterIdLst>
   <p:notesMasterIdLst>
-    <p:notesMasterId r:id="rId33"/>
+    <p:notesMasterId r:id="rId35"/>
   </p:notesMasterIdLst>
   <p:sldIdLst>
     <p:sldId id="296" r:id="rId2"/>
@@ -37,8 +37,10 @@
     <p:sldId id="332" r:id="rId28"/>
     <p:sldId id="333" r:id="rId29"/>
     <p:sldId id="334" r:id="rId30"/>
-    <p:sldId id="305" r:id="rId31"/>
-    <p:sldId id="299" r:id="rId32"/>
+    <p:sldId id="335" r:id="rId31"/>
+    <p:sldId id="336" r:id="rId32"/>
+    <p:sldId id="305" r:id="rId33"/>
+    <p:sldId id="299" r:id="rId34"/>
   </p:sldIdLst>
   <p:sldSz cx="9144000" cy="6858000" type="screen4x3"/>
   <p:notesSz cx="6858000" cy="9144000"/>
@@ -199,6 +201,12 @@
             <p14:sldId id="332"/>
             <p14:sldId id="333"/>
             <p14:sldId id="334"/>
+          </p14:sldIdLst>
+        </p14:section>
+        <p14:section name="Colors Lab" id="{3DEF2636-1A90-4639-ABFD-29379F8F0940}">
+          <p14:sldIdLst>
+            <p14:sldId id="335"/>
+            <p14:sldId id="336"/>
           </p14:sldIdLst>
         </p14:section>
         <p14:section name="Wrap up" id="{5BBA1A93-B239-4917-BAC7-9CBE7A60C0BF}">
@@ -434,7 +442,7 @@
           <a:p>
             <a:fld id="{3E86CC0F-BBF3-4E07-94E0-0549B7D560A9}" type="datetimeFigureOut">
               <a:rPr lang="en-SG" smtClean="0"/>
-              <a:t>17/7/2014</a:t>
+              <a:t>18/7/2014</a:t>
             </a:fld>
             <a:endParaRPr lang="en-SG"/>
           </a:p>
@@ -1573,7 +1581,7 @@
             <a:fld id="{1D8BD707-D9CF-40AE-B4C6-C98DA3205C09}" type="datetimeFigureOut">
               <a:rPr lang="en-US" smtClean="0"/>
               <a:pPr/>
-              <a:t>7/17/2014</a:t>
+              <a:t>7/18/2014</a:t>
             </a:fld>
             <a:endParaRPr lang="en-US"/>
           </a:p>
@@ -1740,7 +1748,7 @@
             <a:fld id="{1D8BD707-D9CF-40AE-B4C6-C98DA3205C09}" type="datetimeFigureOut">
               <a:rPr lang="en-US" smtClean="0"/>
               <a:pPr/>
-              <a:t>7/17/2014</a:t>
+              <a:t>7/18/2014</a:t>
             </a:fld>
             <a:endParaRPr lang="en-US"/>
           </a:p>
@@ -1917,7 +1925,7 @@
             <a:fld id="{1D8BD707-D9CF-40AE-B4C6-C98DA3205C09}" type="datetimeFigureOut">
               <a:rPr lang="en-US" smtClean="0"/>
               <a:pPr/>
-              <a:t>7/17/2014</a:t>
+              <a:t>7/18/2014</a:t>
             </a:fld>
             <a:endParaRPr lang="en-US"/>
           </a:p>
@@ -2084,7 +2092,7 @@
             <a:fld id="{1D8BD707-D9CF-40AE-B4C6-C98DA3205C09}" type="datetimeFigureOut">
               <a:rPr lang="en-US" smtClean="0"/>
               <a:pPr/>
-              <a:t>7/17/2014</a:t>
+              <a:t>7/18/2014</a:t>
             </a:fld>
             <a:endParaRPr lang="en-US"/>
           </a:p>
@@ -2327,7 +2335,7 @@
             <a:fld id="{1D8BD707-D9CF-40AE-B4C6-C98DA3205C09}" type="datetimeFigureOut">
               <a:rPr lang="en-US" smtClean="0"/>
               <a:pPr/>
-              <a:t>7/17/2014</a:t>
+              <a:t>7/18/2014</a:t>
             </a:fld>
             <a:endParaRPr lang="en-US"/>
           </a:p>
@@ -2612,7 +2620,7 @@
             <a:fld id="{1D8BD707-D9CF-40AE-B4C6-C98DA3205C09}" type="datetimeFigureOut">
               <a:rPr lang="en-US" smtClean="0"/>
               <a:pPr/>
-              <a:t>7/17/2014</a:t>
+              <a:t>7/18/2014</a:t>
             </a:fld>
             <a:endParaRPr lang="en-US"/>
           </a:p>
@@ -3031,7 +3039,7 @@
             <a:fld id="{1D8BD707-D9CF-40AE-B4C6-C98DA3205C09}" type="datetimeFigureOut">
               <a:rPr lang="en-US" smtClean="0"/>
               <a:pPr/>
-              <a:t>7/17/2014</a:t>
+              <a:t>7/18/2014</a:t>
             </a:fld>
             <a:endParaRPr lang="en-US"/>
           </a:p>
@@ -3146,7 +3154,7 @@
             <a:fld id="{1D8BD707-D9CF-40AE-B4C6-C98DA3205C09}" type="datetimeFigureOut">
               <a:rPr lang="en-US" smtClean="0"/>
               <a:pPr/>
-              <a:t>7/17/2014</a:t>
+              <a:t>7/18/2014</a:t>
             </a:fld>
             <a:endParaRPr lang="en-US"/>
           </a:p>
@@ -3238,7 +3246,7 @@
             <a:fld id="{1D8BD707-D9CF-40AE-B4C6-C98DA3205C09}" type="datetimeFigureOut">
               <a:rPr lang="en-US" smtClean="0"/>
               <a:pPr/>
-              <a:t>7/17/2014</a:t>
+              <a:t>7/18/2014</a:t>
             </a:fld>
             <a:endParaRPr lang="en-US"/>
           </a:p>
@@ -3512,7 +3520,7 @@
             <a:fld id="{1D8BD707-D9CF-40AE-B4C6-C98DA3205C09}" type="datetimeFigureOut">
               <a:rPr lang="en-US" smtClean="0"/>
               <a:pPr/>
-              <a:t>7/17/2014</a:t>
+              <a:t>7/18/2014</a:t>
             </a:fld>
             <a:endParaRPr lang="en-US"/>
           </a:p>
@@ -3762,7 +3770,7 @@
             <a:fld id="{1D8BD707-D9CF-40AE-B4C6-C98DA3205C09}" type="datetimeFigureOut">
               <a:rPr lang="en-US" smtClean="0"/>
               <a:pPr/>
-              <a:t>7/17/2014</a:t>
+              <a:t>7/18/2014</a:t>
             </a:fld>
             <a:endParaRPr lang="en-US"/>
           </a:p>
@@ -3972,7 +3980,7 @@
             <a:fld id="{1D8BD707-D9CF-40AE-B4C6-C98DA3205C09}" type="datetimeFigureOut">
               <a:rPr lang="en-US" smtClean="0"/>
               <a:pPr/>
-              <a:t>7/17/2014</a:t>
+              <a:t>7/18/2014</a:t>
             </a:fld>
             <a:endParaRPr lang="en-US"/>
           </a:p>
@@ -16812,6 +16820,1784 @@
       </p:grpSpPr>
       <p:sp>
         <p:nvSpPr>
+          <p:cNvPr id="4" name="[TextBox 3]"/>
+          <p:cNvSpPr txBox="1"/>
+          <p:nvPr/>
+        </p:nvSpPr>
+        <p:spPr>
+          <a:xfrm>
+            <a:off x="3206527" y="3119165"/>
+            <a:ext cx="5928508" cy="369332"/>
+          </a:xfrm>
+          <a:prstGeom prst="rect">
+            <a:avLst/>
+          </a:prstGeom>
+          <a:noFill/>
+        </p:spPr>
+        <p:txBody>
+          <a:bodyPr wrap="square" rtlCol="0">
+            <a:spAutoFit/>
+          </a:bodyPr>
+          <a:lstStyle/>
+          <a:p>
+            <a:r>
+              <a:rPr lang="en-US" dirty="0" smtClean="0">
+                <a:solidFill>
+                  <a:schemeClr val="accent6">
+                    <a:lumMod val="75000"/>
+                  </a:schemeClr>
+                </a:solidFill>
+              </a:rPr>
+              <a:t>Next, let’s try the </a:t>
+            </a:r>
+            <a:r>
+              <a:rPr lang="en-US" b="1" dirty="0" smtClean="0">
+                <a:solidFill>
+                  <a:schemeClr val="accent6">
+                    <a:lumMod val="75000"/>
+                  </a:schemeClr>
+                </a:solidFill>
+              </a:rPr>
+              <a:t>Colors Lab </a:t>
+            </a:r>
+            <a:r>
+              <a:rPr lang="en-US" dirty="0" smtClean="0">
+                <a:solidFill>
+                  <a:schemeClr val="accent6">
+                    <a:lumMod val="75000"/>
+                  </a:schemeClr>
+                </a:solidFill>
+              </a:rPr>
+              <a:t>features</a:t>
+            </a:r>
+            <a:endParaRPr lang="en-SG" dirty="0">
+              <a:solidFill>
+                <a:schemeClr val="accent6">
+                  <a:lumMod val="75000"/>
+                </a:schemeClr>
+              </a:solidFill>
+            </a:endParaRPr>
+          </a:p>
+        </p:txBody>
+      </p:sp>
+      <p:sp>
+        <p:nvSpPr>
+          <p:cNvPr id="15" name="Rectangle 212"/>
+          <p:cNvSpPr/>
+          <p:nvPr/>
+        </p:nvSpPr>
+        <p:spPr>
+          <a:xfrm>
+            <a:off x="2336951" y="2819400"/>
+            <a:ext cx="838200" cy="838200"/>
+          </a:xfrm>
+          <a:prstGeom prst="rect">
+            <a:avLst/>
+          </a:prstGeom>
+          <a:noFill/>
+          <a:ln>
+            <a:noFill/>
+          </a:ln>
+        </p:spPr>
+        <p:style>
+          <a:lnRef idx="2">
+            <a:schemeClr val="accent1">
+              <a:shade val="50000"/>
+            </a:schemeClr>
+          </a:lnRef>
+          <a:fillRef idx="1">
+            <a:schemeClr val="accent1"/>
+          </a:fillRef>
+          <a:effectRef idx="0">
+            <a:schemeClr val="accent1"/>
+          </a:effectRef>
+          <a:fontRef idx="minor">
+            <a:schemeClr val="lt1"/>
+          </a:fontRef>
+        </p:style>
+        <p:txBody>
+          <a:bodyPr rtlCol="0" anchor="ctr"/>
+          <a:lstStyle/>
+          <a:p>
+            <a:pPr algn="ctr"/>
+            <a:endParaRPr lang="en-SG"/>
+          </a:p>
+        </p:txBody>
+      </p:sp>
+      <p:sp>
+        <p:nvSpPr>
+          <p:cNvPr id="17" name="Rectangle 4"/>
+          <p:cNvSpPr/>
+          <p:nvPr/>
+        </p:nvSpPr>
+        <p:spPr>
+          <a:xfrm rot="16200000">
+            <a:off x="2405906" y="2892603"/>
+            <a:ext cx="700291" cy="690781"/>
+          </a:xfrm>
+          <a:custGeom>
+            <a:avLst/>
+            <a:gdLst/>
+            <a:ahLst/>
+            <a:cxnLst/>
+            <a:rect l="l" t="t" r="r" b="b"/>
+            <a:pathLst>
+              <a:path w="1752603" h="1752600">
+                <a:moveTo>
+                  <a:pt x="533400" y="0"/>
+                </a:moveTo>
+                <a:lnTo>
+                  <a:pt x="533403" y="0"/>
+                </a:lnTo>
+                <a:lnTo>
+                  <a:pt x="1066800" y="0"/>
+                </a:lnTo>
+                <a:lnTo>
+                  <a:pt x="1752603" y="0"/>
+                </a:lnTo>
+                <a:lnTo>
+                  <a:pt x="1752603" y="1752600"/>
+                </a:lnTo>
+                <a:lnTo>
+                  <a:pt x="1219203" y="1752600"/>
+                </a:lnTo>
+                <a:lnTo>
+                  <a:pt x="533403" y="1752600"/>
+                </a:lnTo>
+                <a:lnTo>
+                  <a:pt x="3" y="1752600"/>
+                </a:lnTo>
+                <a:lnTo>
+                  <a:pt x="3" y="533430"/>
+                </a:lnTo>
+                <a:cubicBezTo>
+                  <a:pt x="0" y="533420"/>
+                  <a:pt x="0" y="533410"/>
+                  <a:pt x="0" y="533400"/>
+                </a:cubicBezTo>
+                <a:cubicBezTo>
+                  <a:pt x="0" y="238811"/>
+                  <a:pt x="238811" y="0"/>
+                  <a:pt x="533400" y="0"/>
+                </a:cubicBezTo>
+                <a:close/>
+              </a:path>
+            </a:pathLst>
+          </a:custGeom>
+          <a:noFill/>
+          <a:ln w="76200" cmpd="sng">
+            <a:solidFill>
+              <a:srgbClr val="0070C0"/>
+            </a:solidFill>
+            <a:miter lim="800000"/>
+          </a:ln>
+        </p:spPr>
+        <p:style>
+          <a:lnRef idx="2">
+            <a:schemeClr val="accent1">
+              <a:shade val="50000"/>
+            </a:schemeClr>
+          </a:lnRef>
+          <a:fillRef idx="1">
+            <a:schemeClr val="accent1"/>
+          </a:fillRef>
+          <a:effectRef idx="0">
+            <a:schemeClr val="accent1"/>
+          </a:effectRef>
+          <a:fontRef idx="minor">
+            <a:schemeClr val="lt1"/>
+          </a:fontRef>
+        </p:style>
+        <p:txBody>
+          <a:bodyPr rtlCol="0" anchor="ctr"/>
+          <a:lstStyle/>
+          <a:p>
+            <a:pPr algn="ctr"/>
+            <a:endParaRPr lang="en-US"/>
+          </a:p>
+        </p:txBody>
+      </p:sp>
+      <p:sp>
+        <p:nvSpPr>
+          <p:cNvPr id="18" name="Freeform 70"/>
+          <p:cNvSpPr/>
+          <p:nvPr/>
+        </p:nvSpPr>
+        <p:spPr>
+          <a:xfrm>
+            <a:off x="2810529" y="2878437"/>
+            <a:ext cx="282242" cy="315901"/>
+          </a:xfrm>
+          <a:custGeom>
+            <a:avLst/>
+            <a:gdLst>
+              <a:gd name="connsiteX0" fmla="*/ 0 w 266700"/>
+              <a:gd name="connsiteY0" fmla="*/ 23813 h 302419"/>
+              <a:gd name="connsiteX1" fmla="*/ 259556 w 266700"/>
+              <a:gd name="connsiteY1" fmla="*/ 302419 h 302419"/>
+              <a:gd name="connsiteX2" fmla="*/ 266700 w 266700"/>
+              <a:gd name="connsiteY2" fmla="*/ 0 h 302419"/>
+              <a:gd name="connsiteX3" fmla="*/ 0 w 266700"/>
+              <a:gd name="connsiteY3" fmla="*/ 23813 h 302419"/>
+            </a:gdLst>
+            <a:ahLst/>
+            <a:cxnLst>
+              <a:cxn ang="0">
+                <a:pos x="connsiteX0" y="connsiteY0"/>
+              </a:cxn>
+              <a:cxn ang="0">
+                <a:pos x="connsiteX1" y="connsiteY1"/>
+              </a:cxn>
+              <a:cxn ang="0">
+                <a:pos x="connsiteX2" y="connsiteY2"/>
+              </a:cxn>
+              <a:cxn ang="0">
+                <a:pos x="connsiteX3" y="connsiteY3"/>
+              </a:cxn>
+            </a:cxnLst>
+            <a:rect l="l" t="t" r="r" b="b"/>
+            <a:pathLst>
+              <a:path w="266700" h="302419">
+                <a:moveTo>
+                  <a:pt x="0" y="23813"/>
+                </a:moveTo>
+                <a:lnTo>
+                  <a:pt x="259556" y="302419"/>
+                </a:lnTo>
+                <a:lnTo>
+                  <a:pt x="266700" y="0"/>
+                </a:lnTo>
+                <a:lnTo>
+                  <a:pt x="0" y="23813"/>
+                </a:lnTo>
+                <a:close/>
+              </a:path>
+            </a:pathLst>
+          </a:custGeom>
+          <a:solidFill>
+            <a:srgbClr val="0070C0"/>
+          </a:solidFill>
+          <a:ln>
+            <a:noFill/>
+          </a:ln>
+        </p:spPr>
+        <p:style>
+          <a:lnRef idx="2">
+            <a:schemeClr val="accent1">
+              <a:shade val="50000"/>
+            </a:schemeClr>
+          </a:lnRef>
+          <a:fillRef idx="1">
+            <a:schemeClr val="accent1"/>
+          </a:fillRef>
+          <a:effectRef idx="0">
+            <a:schemeClr val="accent1"/>
+          </a:effectRef>
+          <a:fontRef idx="minor">
+            <a:schemeClr val="lt1"/>
+          </a:fontRef>
+        </p:style>
+        <p:txBody>
+          <a:bodyPr rtlCol="0" anchor="ctr"/>
+          <a:lstStyle/>
+          <a:p>
+            <a:pPr algn="ctr"/>
+            <a:endParaRPr lang="en-SG"/>
+          </a:p>
+        </p:txBody>
+      </p:sp>
+      <p:grpSp>
+        <p:nvGrpSpPr>
+          <p:cNvPr id="19" name="Group 69"/>
+          <p:cNvGrpSpPr/>
+          <p:nvPr/>
+        </p:nvGrpSpPr>
+        <p:grpSpPr>
+          <a:xfrm rot="2832674">
+            <a:off x="2559710" y="2958969"/>
+            <a:ext cx="354223" cy="575756"/>
+            <a:chOff x="2833184" y="5597530"/>
+            <a:chExt cx="354106" cy="575566"/>
+          </a:xfrm>
+        </p:grpSpPr>
+        <p:sp>
+          <p:nvSpPr>
+            <p:cNvPr id="20" name="Rounded Rectangle 215"/>
+            <p:cNvSpPr/>
+            <p:nvPr/>
+          </p:nvSpPr>
+          <p:spPr>
+            <a:xfrm>
+              <a:off x="2833184" y="5833301"/>
+              <a:ext cx="354106" cy="339795"/>
+            </a:xfrm>
+            <a:custGeom>
+              <a:avLst/>
+              <a:gdLst>
+                <a:gd name="connsiteX0" fmla="*/ 0 w 277919"/>
+                <a:gd name="connsiteY0" fmla="*/ 0 h 246465"/>
+                <a:gd name="connsiteX1" fmla="*/ 277919 w 277919"/>
+                <a:gd name="connsiteY1" fmla="*/ 0 h 246465"/>
+                <a:gd name="connsiteX2" fmla="*/ 277919 w 277919"/>
+                <a:gd name="connsiteY2" fmla="*/ 29657 h 246465"/>
+                <a:gd name="connsiteX3" fmla="*/ 243947 w 277919"/>
+                <a:gd name="connsiteY3" fmla="*/ 63629 h 246465"/>
+                <a:gd name="connsiteX4" fmla="*/ 168190 w 277919"/>
+                <a:gd name="connsiteY4" fmla="*/ 63629 h 246465"/>
+                <a:gd name="connsiteX5" fmla="*/ 183567 w 277919"/>
+                <a:gd name="connsiteY5" fmla="*/ 246465 h 246465"/>
+                <a:gd name="connsiteX6" fmla="*/ 94350 w 277919"/>
+                <a:gd name="connsiteY6" fmla="*/ 246465 h 246465"/>
+                <a:gd name="connsiteX7" fmla="*/ 109728 w 277919"/>
+                <a:gd name="connsiteY7" fmla="*/ 63629 h 246465"/>
+                <a:gd name="connsiteX8" fmla="*/ 33972 w 277919"/>
+                <a:gd name="connsiteY8" fmla="*/ 63629 h 246465"/>
+                <a:gd name="connsiteX9" fmla="*/ 0 w 277919"/>
+                <a:gd name="connsiteY9" fmla="*/ 29657 h 246465"/>
+                <a:gd name="connsiteX10" fmla="*/ 0 w 277919"/>
+                <a:gd name="connsiteY10" fmla="*/ 0 h 246465"/>
+                <a:gd name="connsiteX0" fmla="*/ 0 w 277919"/>
+                <a:gd name="connsiteY0" fmla="*/ 0 h 246465"/>
+                <a:gd name="connsiteX1" fmla="*/ 277919 w 277919"/>
+                <a:gd name="connsiteY1" fmla="*/ 0 h 246465"/>
+                <a:gd name="connsiteX2" fmla="*/ 277919 w 277919"/>
+                <a:gd name="connsiteY2" fmla="*/ 29657 h 246465"/>
+                <a:gd name="connsiteX3" fmla="*/ 243947 w 277919"/>
+                <a:gd name="connsiteY3" fmla="*/ 63629 h 246465"/>
+                <a:gd name="connsiteX4" fmla="*/ 168190 w 277919"/>
+                <a:gd name="connsiteY4" fmla="*/ 63629 h 246465"/>
+                <a:gd name="connsiteX5" fmla="*/ 183567 w 277919"/>
+                <a:gd name="connsiteY5" fmla="*/ 246465 h 246465"/>
+                <a:gd name="connsiteX6" fmla="*/ 94350 w 277919"/>
+                <a:gd name="connsiteY6" fmla="*/ 246465 h 246465"/>
+                <a:gd name="connsiteX7" fmla="*/ 109728 w 277919"/>
+                <a:gd name="connsiteY7" fmla="*/ 63629 h 246465"/>
+                <a:gd name="connsiteX8" fmla="*/ 33972 w 277919"/>
+                <a:gd name="connsiteY8" fmla="*/ 63629 h 246465"/>
+                <a:gd name="connsiteX9" fmla="*/ 0 w 277919"/>
+                <a:gd name="connsiteY9" fmla="*/ 29657 h 246465"/>
+                <a:gd name="connsiteX10" fmla="*/ 0 w 277919"/>
+                <a:gd name="connsiteY10" fmla="*/ 0 h 246465"/>
+              </a:gdLst>
+              <a:ahLst/>
+              <a:cxnLst>
+                <a:cxn ang="0">
+                  <a:pos x="connsiteX0" y="connsiteY0"/>
+                </a:cxn>
+                <a:cxn ang="0">
+                  <a:pos x="connsiteX1" y="connsiteY1"/>
+                </a:cxn>
+                <a:cxn ang="0">
+                  <a:pos x="connsiteX2" y="connsiteY2"/>
+                </a:cxn>
+                <a:cxn ang="0">
+                  <a:pos x="connsiteX3" y="connsiteY3"/>
+                </a:cxn>
+                <a:cxn ang="0">
+                  <a:pos x="connsiteX4" y="connsiteY4"/>
+                </a:cxn>
+                <a:cxn ang="0">
+                  <a:pos x="connsiteX5" y="connsiteY5"/>
+                </a:cxn>
+                <a:cxn ang="0">
+                  <a:pos x="connsiteX6" y="connsiteY6"/>
+                </a:cxn>
+                <a:cxn ang="0">
+                  <a:pos x="connsiteX7" y="connsiteY7"/>
+                </a:cxn>
+                <a:cxn ang="0">
+                  <a:pos x="connsiteX8" y="connsiteY8"/>
+                </a:cxn>
+                <a:cxn ang="0">
+                  <a:pos x="connsiteX9" y="connsiteY9"/>
+                </a:cxn>
+                <a:cxn ang="0">
+                  <a:pos x="connsiteX10" y="connsiteY10"/>
+                </a:cxn>
+              </a:cxnLst>
+              <a:rect l="l" t="t" r="r" b="b"/>
+              <a:pathLst>
+                <a:path w="277919" h="246465">
+                  <a:moveTo>
+                    <a:pt x="0" y="0"/>
+                  </a:moveTo>
+                  <a:lnTo>
+                    <a:pt x="277919" y="0"/>
+                  </a:lnTo>
+                  <a:lnTo>
+                    <a:pt x="277919" y="29657"/>
+                  </a:lnTo>
+                  <a:cubicBezTo>
+                    <a:pt x="277919" y="48419"/>
+                    <a:pt x="262709" y="63629"/>
+                    <a:pt x="243947" y="63629"/>
+                  </a:cubicBezTo>
+                  <a:lnTo>
+                    <a:pt x="168190" y="63629"/>
+                  </a:lnTo>
+                  <a:cubicBezTo>
+                    <a:pt x="158127" y="94102"/>
+                    <a:pt x="195874" y="215992"/>
+                    <a:pt x="183567" y="246465"/>
+                  </a:cubicBezTo>
+                  <a:cubicBezTo>
+                    <a:pt x="171260" y="276938"/>
+                    <a:pt x="106657" y="276938"/>
+                    <a:pt x="94350" y="246465"/>
+                  </a:cubicBezTo>
+                  <a:cubicBezTo>
+                    <a:pt x="82043" y="215992"/>
+                    <a:pt x="119791" y="94102"/>
+                    <a:pt x="109728" y="63629"/>
+                  </a:cubicBezTo>
+                  <a:lnTo>
+                    <a:pt x="33972" y="63629"/>
+                  </a:lnTo>
+                  <a:cubicBezTo>
+                    <a:pt x="15210" y="63629"/>
+                    <a:pt x="0" y="48419"/>
+                    <a:pt x="0" y="29657"/>
+                  </a:cubicBezTo>
+                  <a:lnTo>
+                    <a:pt x="0" y="0"/>
+                  </a:lnTo>
+                  <a:close/>
+                </a:path>
+              </a:pathLst>
+            </a:custGeom>
+            <a:solidFill>
+              <a:schemeClr val="accent6"/>
+            </a:solidFill>
+            <a:ln w="19050">
+              <a:solidFill>
+                <a:schemeClr val="bg1"/>
+              </a:solidFill>
+            </a:ln>
+            <a:effectLst/>
+          </p:spPr>
+          <p:style>
+            <a:lnRef idx="2">
+              <a:schemeClr val="accent1">
+                <a:shade val="50000"/>
+              </a:schemeClr>
+            </a:lnRef>
+            <a:fillRef idx="1">
+              <a:schemeClr val="accent1"/>
+            </a:fillRef>
+            <a:effectRef idx="0">
+              <a:schemeClr val="accent1"/>
+            </a:effectRef>
+            <a:fontRef idx="minor">
+              <a:schemeClr val="lt1"/>
+            </a:fontRef>
+          </p:style>
+          <p:txBody>
+            <a:bodyPr rtlCol="0" anchor="ctr"/>
+            <a:lstStyle/>
+            <a:p>
+              <a:pPr algn="ctr"/>
+              <a:endParaRPr lang="en-SG"/>
+            </a:p>
+          </p:txBody>
+        </p:sp>
+        <p:sp>
+          <p:nvSpPr>
+            <p:cNvPr id="21" name="Rectangle 67"/>
+            <p:cNvSpPr/>
+            <p:nvPr/>
+          </p:nvSpPr>
+          <p:spPr>
+            <a:xfrm>
+              <a:off x="2833184" y="5597530"/>
+              <a:ext cx="354106" cy="230801"/>
+            </a:xfrm>
+            <a:prstGeom prst="rect">
+              <a:avLst/>
+            </a:prstGeom>
+            <a:solidFill>
+              <a:srgbClr val="0070C0"/>
+            </a:solidFill>
+            <a:ln w="19050">
+              <a:solidFill>
+                <a:schemeClr val="bg1"/>
+              </a:solidFill>
+            </a:ln>
+            <a:effectLst/>
+          </p:spPr>
+          <p:style>
+            <a:lnRef idx="2">
+              <a:schemeClr val="accent1">
+                <a:shade val="50000"/>
+              </a:schemeClr>
+            </a:lnRef>
+            <a:fillRef idx="1">
+              <a:schemeClr val="accent1"/>
+            </a:fillRef>
+            <a:effectRef idx="0">
+              <a:schemeClr val="accent1"/>
+            </a:effectRef>
+            <a:fontRef idx="minor">
+              <a:schemeClr val="lt1"/>
+            </a:fontRef>
+          </p:style>
+          <p:txBody>
+            <a:bodyPr rtlCol="0" anchor="ctr"/>
+            <a:lstStyle/>
+            <a:p>
+              <a:pPr algn="ctr"/>
+              <a:endParaRPr lang="en-SG"/>
+            </a:p>
+          </p:txBody>
+        </p:sp>
+        <p:sp>
+          <p:nvSpPr>
+            <p:cNvPr id="22" name="Flowchart: Manual Input 68"/>
+            <p:cNvSpPr/>
+            <p:nvPr/>
+          </p:nvSpPr>
+          <p:spPr>
+            <a:xfrm>
+              <a:off x="2833184" y="5657689"/>
+              <a:ext cx="354106" cy="175610"/>
+            </a:xfrm>
+            <a:custGeom>
+              <a:avLst/>
+              <a:gdLst>
+                <a:gd name="connsiteX0" fmla="*/ 0 w 10000"/>
+                <a:gd name="connsiteY0" fmla="*/ 2000 h 10000"/>
+                <a:gd name="connsiteX1" fmla="*/ 10000 w 10000"/>
+                <a:gd name="connsiteY1" fmla="*/ 0 h 10000"/>
+                <a:gd name="connsiteX2" fmla="*/ 10000 w 10000"/>
+                <a:gd name="connsiteY2" fmla="*/ 10000 h 10000"/>
+                <a:gd name="connsiteX3" fmla="*/ 0 w 10000"/>
+                <a:gd name="connsiteY3" fmla="*/ 10000 h 10000"/>
+                <a:gd name="connsiteX4" fmla="*/ 0 w 10000"/>
+                <a:gd name="connsiteY4" fmla="*/ 2000 h 10000"/>
+                <a:gd name="connsiteX0" fmla="*/ 0 w 10000"/>
+                <a:gd name="connsiteY0" fmla="*/ 2000 h 10000"/>
+                <a:gd name="connsiteX1" fmla="*/ 2906 w 10000"/>
+                <a:gd name="connsiteY1" fmla="*/ 1528 h 10000"/>
+                <a:gd name="connsiteX2" fmla="*/ 10000 w 10000"/>
+                <a:gd name="connsiteY2" fmla="*/ 0 h 10000"/>
+                <a:gd name="connsiteX3" fmla="*/ 10000 w 10000"/>
+                <a:gd name="connsiteY3" fmla="*/ 10000 h 10000"/>
+                <a:gd name="connsiteX4" fmla="*/ 0 w 10000"/>
+                <a:gd name="connsiteY4" fmla="*/ 10000 h 10000"/>
+                <a:gd name="connsiteX5" fmla="*/ 0 w 10000"/>
+                <a:gd name="connsiteY5" fmla="*/ 2000 h 10000"/>
+                <a:gd name="connsiteX0" fmla="*/ 0 w 10000"/>
+                <a:gd name="connsiteY0" fmla="*/ 2000 h 10000"/>
+                <a:gd name="connsiteX1" fmla="*/ 2906 w 10000"/>
+                <a:gd name="connsiteY1" fmla="*/ 1528 h 10000"/>
+                <a:gd name="connsiteX2" fmla="*/ 6470 w 10000"/>
+                <a:gd name="connsiteY2" fmla="*/ 652 h 10000"/>
+                <a:gd name="connsiteX3" fmla="*/ 10000 w 10000"/>
+                <a:gd name="connsiteY3" fmla="*/ 0 h 10000"/>
+                <a:gd name="connsiteX4" fmla="*/ 10000 w 10000"/>
+                <a:gd name="connsiteY4" fmla="*/ 10000 h 10000"/>
+                <a:gd name="connsiteX5" fmla="*/ 0 w 10000"/>
+                <a:gd name="connsiteY5" fmla="*/ 10000 h 10000"/>
+                <a:gd name="connsiteX6" fmla="*/ 0 w 10000"/>
+                <a:gd name="connsiteY6" fmla="*/ 2000 h 10000"/>
+                <a:gd name="connsiteX0" fmla="*/ 0 w 10000"/>
+                <a:gd name="connsiteY0" fmla="*/ 7262 h 15262"/>
+                <a:gd name="connsiteX1" fmla="*/ 2906 w 10000"/>
+                <a:gd name="connsiteY1" fmla="*/ 6790 h 15262"/>
+                <a:gd name="connsiteX2" fmla="*/ 6470 w 10000"/>
+                <a:gd name="connsiteY2" fmla="*/ 0 h 15262"/>
+                <a:gd name="connsiteX3" fmla="*/ 10000 w 10000"/>
+                <a:gd name="connsiteY3" fmla="*/ 5262 h 15262"/>
+                <a:gd name="connsiteX4" fmla="*/ 10000 w 10000"/>
+                <a:gd name="connsiteY4" fmla="*/ 15262 h 15262"/>
+                <a:gd name="connsiteX5" fmla="*/ 0 w 10000"/>
+                <a:gd name="connsiteY5" fmla="*/ 15262 h 15262"/>
+                <a:gd name="connsiteX6" fmla="*/ 0 w 10000"/>
+                <a:gd name="connsiteY6" fmla="*/ 7262 h 15262"/>
+                <a:gd name="connsiteX0" fmla="*/ 0 w 10000"/>
+                <a:gd name="connsiteY0" fmla="*/ 7262 h 15262"/>
+                <a:gd name="connsiteX1" fmla="*/ 2772 w 10000"/>
+                <a:gd name="connsiteY1" fmla="*/ 3943 h 15262"/>
+                <a:gd name="connsiteX2" fmla="*/ 6470 w 10000"/>
+                <a:gd name="connsiteY2" fmla="*/ 0 h 15262"/>
+                <a:gd name="connsiteX3" fmla="*/ 10000 w 10000"/>
+                <a:gd name="connsiteY3" fmla="*/ 5262 h 15262"/>
+                <a:gd name="connsiteX4" fmla="*/ 10000 w 10000"/>
+                <a:gd name="connsiteY4" fmla="*/ 15262 h 15262"/>
+                <a:gd name="connsiteX5" fmla="*/ 0 w 10000"/>
+                <a:gd name="connsiteY5" fmla="*/ 15262 h 15262"/>
+                <a:gd name="connsiteX6" fmla="*/ 0 w 10000"/>
+                <a:gd name="connsiteY6" fmla="*/ 7262 h 15262"/>
+                <a:gd name="connsiteX0" fmla="*/ 0 w 10000"/>
+                <a:gd name="connsiteY0" fmla="*/ 7262 h 15262"/>
+                <a:gd name="connsiteX1" fmla="*/ 2772 w 10000"/>
+                <a:gd name="connsiteY1" fmla="*/ 3943 h 15262"/>
+                <a:gd name="connsiteX2" fmla="*/ 4453 w 10000"/>
+                <a:gd name="connsiteY2" fmla="*/ 2190 h 15262"/>
+                <a:gd name="connsiteX3" fmla="*/ 6470 w 10000"/>
+                <a:gd name="connsiteY3" fmla="*/ 0 h 15262"/>
+                <a:gd name="connsiteX4" fmla="*/ 10000 w 10000"/>
+                <a:gd name="connsiteY4" fmla="*/ 5262 h 15262"/>
+                <a:gd name="connsiteX5" fmla="*/ 10000 w 10000"/>
+                <a:gd name="connsiteY5" fmla="*/ 15262 h 15262"/>
+                <a:gd name="connsiteX6" fmla="*/ 0 w 10000"/>
+                <a:gd name="connsiteY6" fmla="*/ 15262 h 15262"/>
+                <a:gd name="connsiteX7" fmla="*/ 0 w 10000"/>
+                <a:gd name="connsiteY7" fmla="*/ 7262 h 15262"/>
+                <a:gd name="connsiteX0" fmla="*/ 0 w 10000"/>
+                <a:gd name="connsiteY0" fmla="*/ 7262 h 15262"/>
+                <a:gd name="connsiteX1" fmla="*/ 2772 w 10000"/>
+                <a:gd name="connsiteY1" fmla="*/ 3943 h 15262"/>
+                <a:gd name="connsiteX2" fmla="*/ 4722 w 10000"/>
+                <a:gd name="connsiteY2" fmla="*/ 3942 h 15262"/>
+                <a:gd name="connsiteX3" fmla="*/ 6470 w 10000"/>
+                <a:gd name="connsiteY3" fmla="*/ 0 h 15262"/>
+                <a:gd name="connsiteX4" fmla="*/ 10000 w 10000"/>
+                <a:gd name="connsiteY4" fmla="*/ 5262 h 15262"/>
+                <a:gd name="connsiteX5" fmla="*/ 10000 w 10000"/>
+                <a:gd name="connsiteY5" fmla="*/ 15262 h 15262"/>
+                <a:gd name="connsiteX6" fmla="*/ 0 w 10000"/>
+                <a:gd name="connsiteY6" fmla="*/ 15262 h 15262"/>
+                <a:gd name="connsiteX7" fmla="*/ 0 w 10000"/>
+                <a:gd name="connsiteY7" fmla="*/ 7262 h 15262"/>
+                <a:gd name="connsiteX0" fmla="*/ 0 w 10000"/>
+                <a:gd name="connsiteY0" fmla="*/ 7262 h 15262"/>
+                <a:gd name="connsiteX1" fmla="*/ 2772 w 10000"/>
+                <a:gd name="connsiteY1" fmla="*/ 3943 h 15262"/>
+                <a:gd name="connsiteX2" fmla="*/ 4722 w 10000"/>
+                <a:gd name="connsiteY2" fmla="*/ 3942 h 15262"/>
+                <a:gd name="connsiteX3" fmla="*/ 6470 w 10000"/>
+                <a:gd name="connsiteY3" fmla="*/ 0 h 15262"/>
+                <a:gd name="connsiteX4" fmla="*/ 10000 w 10000"/>
+                <a:gd name="connsiteY4" fmla="*/ 5262 h 15262"/>
+                <a:gd name="connsiteX5" fmla="*/ 10000 w 10000"/>
+                <a:gd name="connsiteY5" fmla="*/ 15262 h 15262"/>
+                <a:gd name="connsiteX6" fmla="*/ 0 w 10000"/>
+                <a:gd name="connsiteY6" fmla="*/ 15262 h 15262"/>
+                <a:gd name="connsiteX7" fmla="*/ 0 w 10000"/>
+                <a:gd name="connsiteY7" fmla="*/ 7262 h 15262"/>
+                <a:gd name="connsiteX0" fmla="*/ 0 w 10000"/>
+                <a:gd name="connsiteY0" fmla="*/ 7262 h 15262"/>
+                <a:gd name="connsiteX1" fmla="*/ 2772 w 10000"/>
+                <a:gd name="connsiteY1" fmla="*/ 3943 h 15262"/>
+                <a:gd name="connsiteX2" fmla="*/ 4722 w 10000"/>
+                <a:gd name="connsiteY2" fmla="*/ 3942 h 15262"/>
+                <a:gd name="connsiteX3" fmla="*/ 6470 w 10000"/>
+                <a:gd name="connsiteY3" fmla="*/ 0 h 15262"/>
+                <a:gd name="connsiteX4" fmla="*/ 10000 w 10000"/>
+                <a:gd name="connsiteY4" fmla="*/ 5262 h 15262"/>
+                <a:gd name="connsiteX5" fmla="*/ 10000 w 10000"/>
+                <a:gd name="connsiteY5" fmla="*/ 15262 h 15262"/>
+                <a:gd name="connsiteX6" fmla="*/ 0 w 10000"/>
+                <a:gd name="connsiteY6" fmla="*/ 15262 h 15262"/>
+                <a:gd name="connsiteX7" fmla="*/ 0 w 10000"/>
+                <a:gd name="connsiteY7" fmla="*/ 7262 h 15262"/>
+                <a:gd name="connsiteX0" fmla="*/ 0 w 10000"/>
+                <a:gd name="connsiteY0" fmla="*/ 7518 h 15518"/>
+                <a:gd name="connsiteX1" fmla="*/ 2772 w 10000"/>
+                <a:gd name="connsiteY1" fmla="*/ 4199 h 15518"/>
+                <a:gd name="connsiteX2" fmla="*/ 4722 w 10000"/>
+                <a:gd name="connsiteY2" fmla="*/ 4198 h 15518"/>
+                <a:gd name="connsiteX3" fmla="*/ 6470 w 10000"/>
+                <a:gd name="connsiteY3" fmla="*/ 256 h 15518"/>
+                <a:gd name="connsiteX4" fmla="*/ 10000 w 10000"/>
+                <a:gd name="connsiteY4" fmla="*/ 5518 h 15518"/>
+                <a:gd name="connsiteX5" fmla="*/ 10000 w 10000"/>
+                <a:gd name="connsiteY5" fmla="*/ 15518 h 15518"/>
+                <a:gd name="connsiteX6" fmla="*/ 0 w 10000"/>
+                <a:gd name="connsiteY6" fmla="*/ 15518 h 15518"/>
+                <a:gd name="connsiteX7" fmla="*/ 0 w 10000"/>
+                <a:gd name="connsiteY7" fmla="*/ 7518 h 15518"/>
+                <a:gd name="connsiteX0" fmla="*/ 0 w 10000"/>
+                <a:gd name="connsiteY0" fmla="*/ 7518 h 15518"/>
+                <a:gd name="connsiteX1" fmla="*/ 2772 w 10000"/>
+                <a:gd name="connsiteY1" fmla="*/ 4199 h 15518"/>
+                <a:gd name="connsiteX2" fmla="*/ 4722 w 10000"/>
+                <a:gd name="connsiteY2" fmla="*/ 4198 h 15518"/>
+                <a:gd name="connsiteX3" fmla="*/ 6470 w 10000"/>
+                <a:gd name="connsiteY3" fmla="*/ 256 h 15518"/>
+                <a:gd name="connsiteX4" fmla="*/ 10000 w 10000"/>
+                <a:gd name="connsiteY4" fmla="*/ 5518 h 15518"/>
+                <a:gd name="connsiteX5" fmla="*/ 10000 w 10000"/>
+                <a:gd name="connsiteY5" fmla="*/ 15518 h 15518"/>
+                <a:gd name="connsiteX6" fmla="*/ 0 w 10000"/>
+                <a:gd name="connsiteY6" fmla="*/ 15518 h 15518"/>
+                <a:gd name="connsiteX7" fmla="*/ 0 w 10000"/>
+                <a:gd name="connsiteY7" fmla="*/ 7518 h 15518"/>
+                <a:gd name="connsiteX0" fmla="*/ 0 w 10000"/>
+                <a:gd name="connsiteY0" fmla="*/ 7282 h 15282"/>
+                <a:gd name="connsiteX1" fmla="*/ 2772 w 10000"/>
+                <a:gd name="connsiteY1" fmla="*/ 3963 h 15282"/>
+                <a:gd name="connsiteX2" fmla="*/ 4722 w 10000"/>
+                <a:gd name="connsiteY2" fmla="*/ 7028 h 15282"/>
+                <a:gd name="connsiteX3" fmla="*/ 6470 w 10000"/>
+                <a:gd name="connsiteY3" fmla="*/ 20 h 15282"/>
+                <a:gd name="connsiteX4" fmla="*/ 10000 w 10000"/>
+                <a:gd name="connsiteY4" fmla="*/ 5282 h 15282"/>
+                <a:gd name="connsiteX5" fmla="*/ 10000 w 10000"/>
+                <a:gd name="connsiteY5" fmla="*/ 15282 h 15282"/>
+                <a:gd name="connsiteX6" fmla="*/ 0 w 10000"/>
+                <a:gd name="connsiteY6" fmla="*/ 15282 h 15282"/>
+                <a:gd name="connsiteX7" fmla="*/ 0 w 10000"/>
+                <a:gd name="connsiteY7" fmla="*/ 7282 h 15282"/>
+                <a:gd name="connsiteX0" fmla="*/ 0 w 10000"/>
+                <a:gd name="connsiteY0" fmla="*/ 7282 h 15282"/>
+                <a:gd name="connsiteX1" fmla="*/ 2772 w 10000"/>
+                <a:gd name="connsiteY1" fmla="*/ 3963 h 15282"/>
+                <a:gd name="connsiteX2" fmla="*/ 4722 w 10000"/>
+                <a:gd name="connsiteY2" fmla="*/ 7028 h 15282"/>
+                <a:gd name="connsiteX3" fmla="*/ 6470 w 10000"/>
+                <a:gd name="connsiteY3" fmla="*/ 20 h 15282"/>
+                <a:gd name="connsiteX4" fmla="*/ 10000 w 10000"/>
+                <a:gd name="connsiteY4" fmla="*/ 5282 h 15282"/>
+                <a:gd name="connsiteX5" fmla="*/ 10000 w 10000"/>
+                <a:gd name="connsiteY5" fmla="*/ 15282 h 15282"/>
+                <a:gd name="connsiteX6" fmla="*/ 0 w 10000"/>
+                <a:gd name="connsiteY6" fmla="*/ 15282 h 15282"/>
+                <a:gd name="connsiteX7" fmla="*/ 0 w 10000"/>
+                <a:gd name="connsiteY7" fmla="*/ 7282 h 15282"/>
+                <a:gd name="connsiteX0" fmla="*/ 0 w 10000"/>
+                <a:gd name="connsiteY0" fmla="*/ 8153 h 16153"/>
+                <a:gd name="connsiteX1" fmla="*/ 2772 w 10000"/>
+                <a:gd name="connsiteY1" fmla="*/ 4834 h 16153"/>
+                <a:gd name="connsiteX2" fmla="*/ 4722 w 10000"/>
+                <a:gd name="connsiteY2" fmla="*/ 7899 h 16153"/>
+                <a:gd name="connsiteX3" fmla="*/ 6941 w 10000"/>
+                <a:gd name="connsiteY3" fmla="*/ 15 h 16153"/>
+                <a:gd name="connsiteX4" fmla="*/ 10000 w 10000"/>
+                <a:gd name="connsiteY4" fmla="*/ 6153 h 16153"/>
+                <a:gd name="connsiteX5" fmla="*/ 10000 w 10000"/>
+                <a:gd name="connsiteY5" fmla="*/ 16153 h 16153"/>
+                <a:gd name="connsiteX6" fmla="*/ 0 w 10000"/>
+                <a:gd name="connsiteY6" fmla="*/ 16153 h 16153"/>
+                <a:gd name="connsiteX7" fmla="*/ 0 w 10000"/>
+                <a:gd name="connsiteY7" fmla="*/ 8153 h 16153"/>
+                <a:gd name="connsiteX0" fmla="*/ 0 w 10000"/>
+                <a:gd name="connsiteY0" fmla="*/ 8153 h 16153"/>
+                <a:gd name="connsiteX1" fmla="*/ 2100 w 10000"/>
+                <a:gd name="connsiteY1" fmla="*/ 3958 h 16153"/>
+                <a:gd name="connsiteX2" fmla="*/ 4722 w 10000"/>
+                <a:gd name="connsiteY2" fmla="*/ 7899 h 16153"/>
+                <a:gd name="connsiteX3" fmla="*/ 6941 w 10000"/>
+                <a:gd name="connsiteY3" fmla="*/ 15 h 16153"/>
+                <a:gd name="connsiteX4" fmla="*/ 10000 w 10000"/>
+                <a:gd name="connsiteY4" fmla="*/ 6153 h 16153"/>
+                <a:gd name="connsiteX5" fmla="*/ 10000 w 10000"/>
+                <a:gd name="connsiteY5" fmla="*/ 16153 h 16153"/>
+                <a:gd name="connsiteX6" fmla="*/ 0 w 10000"/>
+                <a:gd name="connsiteY6" fmla="*/ 16153 h 16153"/>
+                <a:gd name="connsiteX7" fmla="*/ 0 w 10000"/>
+                <a:gd name="connsiteY7" fmla="*/ 8153 h 16153"/>
+              </a:gdLst>
+              <a:ahLst/>
+              <a:cxnLst>
+                <a:cxn ang="0">
+                  <a:pos x="connsiteX0" y="connsiteY0"/>
+                </a:cxn>
+                <a:cxn ang="0">
+                  <a:pos x="connsiteX1" y="connsiteY1"/>
+                </a:cxn>
+                <a:cxn ang="0">
+                  <a:pos x="connsiteX2" y="connsiteY2"/>
+                </a:cxn>
+                <a:cxn ang="0">
+                  <a:pos x="connsiteX3" y="connsiteY3"/>
+                </a:cxn>
+                <a:cxn ang="0">
+                  <a:pos x="connsiteX4" y="connsiteY4"/>
+                </a:cxn>
+                <a:cxn ang="0">
+                  <a:pos x="connsiteX5" y="connsiteY5"/>
+                </a:cxn>
+                <a:cxn ang="0">
+                  <a:pos x="connsiteX6" y="connsiteY6"/>
+                </a:cxn>
+                <a:cxn ang="0">
+                  <a:pos x="connsiteX7" y="connsiteY7"/>
+                </a:cxn>
+              </a:cxnLst>
+              <a:rect l="l" t="t" r="r" b="b"/>
+              <a:pathLst>
+                <a:path w="10000" h="16153">
+                  <a:moveTo>
+                    <a:pt x="0" y="8153"/>
+                  </a:moveTo>
+                  <a:cubicBezTo>
+                    <a:pt x="462" y="6267"/>
+                    <a:pt x="1313" y="4000"/>
+                    <a:pt x="2100" y="3958"/>
+                  </a:cubicBezTo>
+                  <a:cubicBezTo>
+                    <a:pt x="2887" y="3916"/>
+                    <a:pt x="3915" y="8556"/>
+                    <a:pt x="4722" y="7899"/>
+                  </a:cubicBezTo>
+                  <a:cubicBezTo>
+                    <a:pt x="5529" y="7242"/>
+                    <a:pt x="6061" y="306"/>
+                    <a:pt x="6941" y="15"/>
+                  </a:cubicBezTo>
+                  <a:cubicBezTo>
+                    <a:pt x="7821" y="-276"/>
+                    <a:pt x="9412" y="3609"/>
+                    <a:pt x="10000" y="6153"/>
+                  </a:cubicBezTo>
+                  <a:lnTo>
+                    <a:pt x="10000" y="16153"/>
+                  </a:lnTo>
+                  <a:lnTo>
+                    <a:pt x="0" y="16153"/>
+                  </a:lnTo>
+                  <a:lnTo>
+                    <a:pt x="0" y="8153"/>
+                  </a:lnTo>
+                  <a:close/>
+                </a:path>
+              </a:pathLst>
+            </a:custGeom>
+            <a:solidFill>
+              <a:schemeClr val="accent6"/>
+            </a:solidFill>
+            <a:ln w="19050">
+              <a:solidFill>
+                <a:schemeClr val="bg1"/>
+              </a:solidFill>
+            </a:ln>
+            <a:effectLst/>
+          </p:spPr>
+          <p:style>
+            <a:lnRef idx="2">
+              <a:schemeClr val="accent1">
+                <a:shade val="50000"/>
+              </a:schemeClr>
+            </a:lnRef>
+            <a:fillRef idx="1">
+              <a:schemeClr val="accent1"/>
+            </a:fillRef>
+            <a:effectRef idx="0">
+              <a:schemeClr val="accent1"/>
+            </a:effectRef>
+            <a:fontRef idx="minor">
+              <a:schemeClr val="lt1"/>
+            </a:fontRef>
+          </p:style>
+          <p:txBody>
+            <a:bodyPr rtlCol="0" anchor="ctr"/>
+            <a:lstStyle/>
+            <a:p>
+              <a:pPr algn="ctr"/>
+              <a:endParaRPr lang="en-SG"/>
+            </a:p>
+          </p:txBody>
+        </p:sp>
+      </p:grpSp>
+    </p:spTree>
+    <p:extLst>
+      <p:ext uri="{BB962C8B-B14F-4D97-AF65-F5344CB8AC3E}">
+        <p14:creationId xmlns:p14="http://schemas.microsoft.com/office/powerpoint/2010/main" val="3929389005"/>
+      </p:ext>
+    </p:extLst>
+  </p:cSld>
+  <p:clrMapOvr>
+    <a:masterClrMapping/>
+  </p:clrMapOvr>
+</p:sld>
+</file>
+
+<file path=ppt/slides/slide31.xml><?xml version="1.0" encoding="utf-8"?>
+<p:sld xmlns:a="http://schemas.openxmlformats.org/drawingml/2006/main" xmlns:r="http://schemas.openxmlformats.org/officeDocument/2006/relationships" xmlns:p="http://schemas.openxmlformats.org/presentationml/2006/main">
+  <p:cSld>
+    <p:spTree>
+      <p:nvGrpSpPr>
+        <p:cNvPr id="1" name=""/>
+        <p:cNvGrpSpPr/>
+        <p:nvPr/>
+      </p:nvGrpSpPr>
+      <p:grpSpPr>
+        <a:xfrm>
+          <a:off x="0" y="0"/>
+          <a:ext cx="0" cy="0"/>
+          <a:chOff x="0" y="0"/>
+          <a:chExt cx="0" cy="0"/>
+        </a:xfrm>
+      </p:grpSpPr>
+      <p:pic>
+        <p:nvPicPr>
+          <p:cNvPr id="6" name="图片 5"/>
+          <p:cNvPicPr>
+            <a:picLocks noChangeAspect="1"/>
+          </p:cNvPicPr>
+          <p:nvPr/>
+        </p:nvPicPr>
+        <p:blipFill>
+          <a:blip r:embed="rId2">
+            <a:extLst>
+              <a:ext uri="{28A0092B-C50C-407E-A947-70E740481C1C}">
+                <a14:useLocalDpi xmlns:a14="http://schemas.microsoft.com/office/drawing/2010/main" val="0"/>
+              </a:ext>
+            </a:extLst>
+          </a:blip>
+          <a:stretch>
+            <a:fillRect/>
+          </a:stretch>
+        </p:blipFill>
+        <p:spPr>
+          <a:xfrm>
+            <a:off x="5715000" y="457200"/>
+            <a:ext cx="3208953" cy="5952409"/>
+          </a:xfrm>
+          <a:prstGeom prst="rect">
+            <a:avLst/>
+          </a:prstGeom>
+        </p:spPr>
+      </p:pic>
+      <p:sp>
+        <p:nvSpPr>
+          <p:cNvPr id="7" name="[TextBox 6]"/>
+          <p:cNvSpPr txBox="1"/>
+          <p:nvPr/>
+        </p:nvSpPr>
+        <p:spPr>
+          <a:xfrm>
+            <a:off x="685800" y="1044410"/>
+            <a:ext cx="5105400" cy="1354217"/>
+          </a:xfrm>
+          <a:prstGeom prst="rect">
+            <a:avLst/>
+          </a:prstGeom>
+          <a:noFill/>
+        </p:spPr>
+        <p:txBody>
+          <a:bodyPr wrap="square" rtlCol="0">
+            <a:spAutoFit/>
+          </a:bodyPr>
+          <a:lstStyle/>
+          <a:p>
+            <a:r>
+              <a:rPr lang="en-US" sz="2800" b="1" dirty="0" smtClean="0">
+                <a:solidFill>
+                  <a:schemeClr val="accent6">
+                    <a:lumMod val="75000"/>
+                  </a:schemeClr>
+                </a:solidFill>
+              </a:rPr>
+              <a:t>1.</a:t>
+            </a:r>
+            <a:r>
+              <a:rPr lang="en-US" dirty="0" smtClean="0">
+                <a:solidFill>
+                  <a:schemeClr val="accent6">
+                    <a:lumMod val="75000"/>
+                  </a:schemeClr>
+                </a:solidFill>
+              </a:rPr>
+              <a:t> Click the               button.</a:t>
+            </a:r>
+          </a:p>
+          <a:p>
+            <a:r>
+              <a:rPr lang="en-US" dirty="0" smtClean="0">
+                <a:solidFill>
+                  <a:schemeClr val="accent6">
+                    <a:lumMod val="75000"/>
+                  </a:schemeClr>
+                </a:solidFill>
+              </a:rPr>
+              <a:t/>
+            </a:r>
+            <a:br>
+              <a:rPr lang="en-US" dirty="0" smtClean="0">
+                <a:solidFill>
+                  <a:schemeClr val="accent6">
+                    <a:lumMod val="75000"/>
+                  </a:schemeClr>
+                </a:solidFill>
+              </a:rPr>
+            </a:br>
+            <a:r>
+              <a:rPr lang="en-US" dirty="0" smtClean="0">
+                <a:solidFill>
+                  <a:schemeClr val="accent6">
+                    <a:lumMod val="75000"/>
+                  </a:schemeClr>
+                </a:solidFill>
+              </a:rPr>
+              <a:t>It will show  the </a:t>
+            </a:r>
+            <a:r>
+              <a:rPr lang="en-US" b="1" dirty="0" smtClean="0">
+                <a:solidFill>
+                  <a:schemeClr val="accent6">
+                    <a:lumMod val="75000"/>
+                  </a:schemeClr>
+                </a:solidFill>
+              </a:rPr>
+              <a:t>Colors Lab Panel</a:t>
+            </a:r>
+            <a:r>
+              <a:rPr lang="en-US" dirty="0" smtClean="0">
+                <a:solidFill>
+                  <a:schemeClr val="accent6">
+                    <a:lumMod val="75000"/>
+                  </a:schemeClr>
+                </a:solidFill>
+              </a:rPr>
+              <a:t> at the right side of </a:t>
+            </a:r>
+          </a:p>
+          <a:p>
+            <a:r>
+              <a:rPr lang="en-US" dirty="0" smtClean="0">
+                <a:solidFill>
+                  <a:schemeClr val="accent6">
+                    <a:lumMod val="75000"/>
+                  </a:schemeClr>
+                </a:solidFill>
+              </a:rPr>
+              <a:t>your screen.</a:t>
+            </a:r>
+            <a:endParaRPr lang="en-SG" dirty="0">
+              <a:solidFill>
+                <a:schemeClr val="accent6">
+                  <a:lumMod val="75000"/>
+                </a:schemeClr>
+              </a:solidFill>
+            </a:endParaRPr>
+          </a:p>
+        </p:txBody>
+      </p:sp>
+      <p:pic>
+        <p:nvPicPr>
+          <p:cNvPr id="8" name="图片 7"/>
+          <p:cNvPicPr>
+            <a:picLocks noChangeAspect="1"/>
+          </p:cNvPicPr>
+          <p:nvPr/>
+        </p:nvPicPr>
+        <p:blipFill>
+          <a:blip r:embed="rId3">
+            <a:extLst>
+              <a:ext uri="{28A0092B-C50C-407E-A947-70E740481C1C}">
+                <a14:useLocalDpi xmlns:a14="http://schemas.microsoft.com/office/drawing/2010/main" val="0"/>
+              </a:ext>
+            </a:extLst>
+          </a:blip>
+          <a:stretch>
+            <a:fillRect/>
+          </a:stretch>
+        </p:blipFill>
+        <p:spPr>
+          <a:xfrm>
+            <a:off x="1959395" y="838200"/>
+            <a:ext cx="622852" cy="914400"/>
+          </a:xfrm>
+          <a:prstGeom prst="rect">
+            <a:avLst/>
+          </a:prstGeom>
+        </p:spPr>
+      </p:pic>
+      <p:sp>
+        <p:nvSpPr>
+          <p:cNvPr id="9" name="[Picture 3]"/>
+          <p:cNvSpPr txBox="1"/>
+          <p:nvPr/>
+        </p:nvSpPr>
+        <p:spPr>
+          <a:xfrm>
+            <a:off x="685800" y="2435733"/>
+            <a:ext cx="4800600" cy="523220"/>
+          </a:xfrm>
+          <a:prstGeom prst="rect">
+            <a:avLst/>
+          </a:prstGeom>
+          <a:noFill/>
+        </p:spPr>
+        <p:txBody>
+          <a:bodyPr wrap="square" rtlCol="0">
+            <a:spAutoFit/>
+          </a:bodyPr>
+          <a:lstStyle/>
+          <a:p>
+            <a:r>
+              <a:rPr lang="en-US" sz="2800" b="1" dirty="0" smtClean="0">
+                <a:solidFill>
+                  <a:schemeClr val="accent6">
+                    <a:lumMod val="75000"/>
+                  </a:schemeClr>
+                </a:solidFill>
+              </a:rPr>
+              <a:t>2.</a:t>
+            </a:r>
+            <a:r>
+              <a:rPr lang="en-US" dirty="0" smtClean="0">
+                <a:solidFill>
+                  <a:schemeClr val="accent6">
+                    <a:lumMod val="75000"/>
+                  </a:schemeClr>
+                </a:solidFill>
+              </a:rPr>
+              <a:t> Select the following shape:</a:t>
+            </a:r>
+            <a:endParaRPr lang="en-SG" dirty="0">
+              <a:solidFill>
+                <a:schemeClr val="accent6">
+                  <a:lumMod val="75000"/>
+                </a:schemeClr>
+              </a:solidFill>
+            </a:endParaRPr>
+          </a:p>
+        </p:txBody>
+      </p:sp>
+      <p:sp>
+        <p:nvSpPr>
+          <p:cNvPr id="11" name="[Picture 3]"/>
+          <p:cNvSpPr txBox="1"/>
+          <p:nvPr/>
+        </p:nvSpPr>
+        <p:spPr>
+          <a:xfrm>
+            <a:off x="685800" y="4059294"/>
+            <a:ext cx="4953000" cy="2185214"/>
+          </a:xfrm>
+          <a:prstGeom prst="rect">
+            <a:avLst/>
+          </a:prstGeom>
+          <a:noFill/>
+        </p:spPr>
+        <p:txBody>
+          <a:bodyPr wrap="square" rtlCol="0">
+            <a:spAutoFit/>
+          </a:bodyPr>
+          <a:lstStyle/>
+          <a:p>
+            <a:r>
+              <a:rPr lang="en-US" sz="2800" b="1" dirty="0" smtClean="0">
+                <a:solidFill>
+                  <a:schemeClr val="accent6">
+                    <a:lumMod val="75000"/>
+                  </a:schemeClr>
+                </a:solidFill>
+              </a:rPr>
+              <a:t>3.</a:t>
+            </a:r>
+            <a:r>
+              <a:rPr lang="en-US" dirty="0" smtClean="0">
+                <a:solidFill>
+                  <a:schemeClr val="accent6">
+                    <a:lumMod val="75000"/>
+                  </a:schemeClr>
+                </a:solidFill>
+              </a:rPr>
+              <a:t> Then you can </a:t>
+            </a:r>
+            <a:r>
+              <a:rPr lang="en-US" b="1" dirty="0" smtClean="0">
+                <a:solidFill>
+                  <a:schemeClr val="accent6">
+                    <a:lumMod val="75000"/>
+                  </a:schemeClr>
+                </a:solidFill>
+              </a:rPr>
+              <a:t>drag</a:t>
+            </a:r>
+            <a:r>
+              <a:rPr lang="en-US" dirty="0" smtClean="0">
+                <a:solidFill>
+                  <a:schemeClr val="accent6">
+                    <a:lumMod val="75000"/>
+                  </a:schemeClr>
+                </a:solidFill>
+              </a:rPr>
+              <a:t> or </a:t>
+            </a:r>
+            <a:r>
+              <a:rPr lang="en-US" b="1" dirty="0" smtClean="0">
+                <a:solidFill>
+                  <a:schemeClr val="accent6">
+                    <a:lumMod val="75000"/>
+                  </a:schemeClr>
+                </a:solidFill>
+              </a:rPr>
+              <a:t>click</a:t>
+            </a:r>
+            <a:r>
+              <a:rPr lang="en-US" dirty="0" smtClean="0">
+                <a:solidFill>
+                  <a:schemeClr val="accent6">
+                    <a:lumMod val="75000"/>
+                  </a:schemeClr>
+                </a:solidFill>
+              </a:rPr>
+              <a:t> this            button in </a:t>
+            </a:r>
+          </a:p>
+          <a:p>
+            <a:endParaRPr lang="en-US" dirty="0">
+              <a:solidFill>
+                <a:schemeClr val="accent6">
+                  <a:lumMod val="75000"/>
+                </a:schemeClr>
+              </a:solidFill>
+            </a:endParaRPr>
+          </a:p>
+          <a:p>
+            <a:r>
+              <a:rPr lang="en-US" dirty="0" smtClean="0">
+                <a:solidFill>
+                  <a:schemeClr val="accent6">
+                    <a:lumMod val="75000"/>
+                  </a:schemeClr>
+                </a:solidFill>
+              </a:rPr>
+              <a:t>the panel to change the selected shape’s </a:t>
+            </a:r>
+            <a:r>
+              <a:rPr lang="en-US" b="1" dirty="0" smtClean="0">
+                <a:solidFill>
+                  <a:schemeClr val="accent6">
+                    <a:lumMod val="75000"/>
+                  </a:schemeClr>
+                </a:solidFill>
+              </a:rPr>
+              <a:t>FONT</a:t>
+            </a:r>
+            <a:r>
+              <a:rPr lang="en-US" dirty="0">
+                <a:solidFill>
+                  <a:schemeClr val="accent6">
+                    <a:lumMod val="75000"/>
+                  </a:schemeClr>
+                </a:solidFill>
+              </a:rPr>
+              <a:t> </a:t>
+            </a:r>
+            <a:endParaRPr lang="en-US" dirty="0" smtClean="0">
+              <a:solidFill>
+                <a:schemeClr val="accent6">
+                  <a:lumMod val="75000"/>
+                </a:schemeClr>
+              </a:solidFill>
+            </a:endParaRPr>
+          </a:p>
+          <a:p>
+            <a:endParaRPr lang="en-US" dirty="0">
+              <a:solidFill>
+                <a:schemeClr val="accent6">
+                  <a:lumMod val="75000"/>
+                </a:schemeClr>
+              </a:solidFill>
+            </a:endParaRPr>
+          </a:p>
+          <a:p>
+            <a:r>
+              <a:rPr lang="en-US" dirty="0" smtClean="0">
+                <a:solidFill>
+                  <a:schemeClr val="accent6">
+                    <a:lumMod val="75000"/>
+                  </a:schemeClr>
+                </a:solidFill>
+              </a:rPr>
+              <a:t>color, or this</a:t>
+            </a:r>
+            <a:r>
+              <a:rPr lang="en-SG" dirty="0" smtClean="0">
+                <a:solidFill>
+                  <a:schemeClr val="accent6">
+                    <a:lumMod val="75000"/>
+                  </a:schemeClr>
+                </a:solidFill>
+              </a:rPr>
+              <a:t>             button to change its </a:t>
+            </a:r>
+            <a:r>
+              <a:rPr lang="en-SG" b="1" dirty="0" smtClean="0">
+                <a:solidFill>
+                  <a:schemeClr val="accent6">
+                    <a:lumMod val="75000"/>
+                  </a:schemeClr>
+                </a:solidFill>
+              </a:rPr>
+              <a:t>LINE</a:t>
+            </a:r>
+            <a:r>
+              <a:rPr lang="en-SG" dirty="0">
+                <a:solidFill>
+                  <a:schemeClr val="accent6">
+                    <a:lumMod val="75000"/>
+                  </a:schemeClr>
+                </a:solidFill>
+              </a:rPr>
+              <a:t> </a:t>
+            </a:r>
+            <a:r>
+              <a:rPr lang="en-SG" dirty="0" err="1" smtClean="0">
+                <a:solidFill>
+                  <a:schemeClr val="accent6">
+                    <a:lumMod val="75000"/>
+                  </a:schemeClr>
+                </a:solidFill>
+              </a:rPr>
+              <a:t>color</a:t>
+            </a:r>
+            <a:r>
+              <a:rPr lang="en-SG" dirty="0" smtClean="0">
+                <a:solidFill>
+                  <a:schemeClr val="accent6">
+                    <a:lumMod val="75000"/>
+                  </a:schemeClr>
+                </a:solidFill>
+              </a:rPr>
+              <a:t>, </a:t>
+            </a:r>
+          </a:p>
+          <a:p>
+            <a:endParaRPr lang="en-SG" dirty="0">
+              <a:solidFill>
+                <a:schemeClr val="accent6">
+                  <a:lumMod val="75000"/>
+                </a:schemeClr>
+              </a:solidFill>
+            </a:endParaRPr>
+          </a:p>
+          <a:p>
+            <a:r>
+              <a:rPr lang="en-SG" dirty="0" smtClean="0">
+                <a:solidFill>
+                  <a:schemeClr val="accent6">
+                    <a:lumMod val="75000"/>
+                  </a:schemeClr>
+                </a:solidFill>
+              </a:rPr>
+              <a:t>or this            button to change its </a:t>
+            </a:r>
+            <a:r>
+              <a:rPr lang="en-SG" b="1" dirty="0" smtClean="0">
+                <a:solidFill>
+                  <a:schemeClr val="accent6">
+                    <a:lumMod val="75000"/>
+                  </a:schemeClr>
+                </a:solidFill>
+              </a:rPr>
+              <a:t>FILL</a:t>
+            </a:r>
+            <a:r>
+              <a:rPr lang="en-SG" dirty="0" smtClean="0">
+                <a:solidFill>
+                  <a:schemeClr val="accent6">
+                    <a:lumMod val="75000"/>
+                  </a:schemeClr>
+                </a:solidFill>
+              </a:rPr>
+              <a:t> </a:t>
+            </a:r>
+            <a:r>
+              <a:rPr lang="en-SG" dirty="0" err="1" smtClean="0">
+                <a:solidFill>
+                  <a:schemeClr val="accent6">
+                    <a:lumMod val="75000"/>
+                  </a:schemeClr>
+                </a:solidFill>
+              </a:rPr>
+              <a:t>color</a:t>
+            </a:r>
+            <a:r>
+              <a:rPr lang="en-SG" dirty="0" smtClean="0">
+                <a:solidFill>
+                  <a:schemeClr val="accent6">
+                    <a:lumMod val="75000"/>
+                  </a:schemeClr>
+                </a:solidFill>
+              </a:rPr>
+              <a:t>.</a:t>
+            </a:r>
+            <a:endParaRPr lang="en-SG" dirty="0">
+              <a:solidFill>
+                <a:schemeClr val="accent6">
+                  <a:lumMod val="75000"/>
+                </a:schemeClr>
+              </a:solidFill>
+            </a:endParaRPr>
+          </a:p>
+        </p:txBody>
+      </p:sp>
+      <p:sp>
+        <p:nvSpPr>
+          <p:cNvPr id="12" name="圆角矩形 11"/>
+          <p:cNvSpPr/>
+          <p:nvPr/>
+        </p:nvSpPr>
+        <p:spPr>
+          <a:xfrm>
+            <a:off x="1314450" y="3053602"/>
+            <a:ext cx="3516134" cy="803374"/>
+          </a:xfrm>
+          <a:prstGeom prst="roundRect">
+            <a:avLst/>
+          </a:prstGeom>
+          <a:solidFill>
+            <a:srgbClr val="4D74B9"/>
+          </a:solidFill>
+          <a:ln>
+            <a:solidFill>
+              <a:srgbClr val="4D74B9"/>
+            </a:solidFill>
+          </a:ln>
+        </p:spPr>
+        <p:style>
+          <a:lnRef idx="2">
+            <a:schemeClr val="accent1">
+              <a:shade val="50000"/>
+            </a:schemeClr>
+          </a:lnRef>
+          <a:fillRef idx="1">
+            <a:schemeClr val="accent1"/>
+          </a:fillRef>
+          <a:effectRef idx="0">
+            <a:schemeClr val="accent1"/>
+          </a:effectRef>
+          <a:fontRef idx="minor">
+            <a:schemeClr val="lt1"/>
+          </a:fontRef>
+        </p:style>
+        <p:txBody>
+          <a:bodyPr rtlCol="0" anchor="ctr"/>
+          <a:lstStyle/>
+          <a:p>
+            <a:pPr algn="ctr"/>
+            <a:r>
+              <a:rPr lang="en-US" altLang="zh-CN" sz="4000" dirty="0" smtClean="0">
+                <a:solidFill>
+                  <a:srgbClr val="FFFFFF"/>
+                </a:solidFill>
+              </a:rPr>
+              <a:t>Select me!</a:t>
+            </a:r>
+            <a:endParaRPr lang="zh-CN" altLang="en-US" sz="4000" dirty="0">
+              <a:solidFill>
+                <a:srgbClr val="FFFFFF"/>
+              </a:solidFill>
+            </a:endParaRPr>
+          </a:p>
+        </p:txBody>
+      </p:sp>
+      <p:pic>
+        <p:nvPicPr>
+          <p:cNvPr id="2" name="图片 1"/>
+          <p:cNvPicPr>
+            <a:picLocks noChangeAspect="1"/>
+          </p:cNvPicPr>
+          <p:nvPr/>
+        </p:nvPicPr>
+        <p:blipFill>
+          <a:blip r:embed="rId4">
+            <a:extLst>
+              <a:ext uri="{28A0092B-C50C-407E-A947-70E740481C1C}">
+                <a14:useLocalDpi xmlns:a14="http://schemas.microsoft.com/office/drawing/2010/main" val="0"/>
+              </a:ext>
+            </a:extLst>
+          </a:blip>
+          <a:stretch>
+            <a:fillRect/>
+          </a:stretch>
+        </p:blipFill>
+        <p:spPr>
+          <a:xfrm>
+            <a:off x="4000552" y="4153943"/>
+            <a:ext cx="419048" cy="428571"/>
+          </a:xfrm>
+          <a:prstGeom prst="rect">
+            <a:avLst/>
+          </a:prstGeom>
+        </p:spPr>
+      </p:pic>
+      <p:pic>
+        <p:nvPicPr>
+          <p:cNvPr id="3" name="图片 2"/>
+          <p:cNvPicPr>
+            <a:picLocks noChangeAspect="1"/>
+          </p:cNvPicPr>
+          <p:nvPr/>
+        </p:nvPicPr>
+        <p:blipFill>
+          <a:blip r:embed="rId5">
+            <a:extLst>
+              <a:ext uri="{28A0092B-C50C-407E-A947-70E740481C1C}">
+                <a14:useLocalDpi xmlns:a14="http://schemas.microsoft.com/office/drawing/2010/main" val="0"/>
+              </a:ext>
+            </a:extLst>
+          </a:blip>
+          <a:stretch>
+            <a:fillRect/>
+          </a:stretch>
+        </p:blipFill>
+        <p:spPr>
+          <a:xfrm>
+            <a:off x="2040077" y="5272315"/>
+            <a:ext cx="419048" cy="428571"/>
+          </a:xfrm>
+          <a:prstGeom prst="rect">
+            <a:avLst/>
+          </a:prstGeom>
+        </p:spPr>
+      </p:pic>
+      <p:pic>
+        <p:nvPicPr>
+          <p:cNvPr id="4" name="图片 3"/>
+          <p:cNvPicPr>
+            <a:picLocks noChangeAspect="1"/>
+          </p:cNvPicPr>
+          <p:nvPr/>
+        </p:nvPicPr>
+        <p:blipFill>
+          <a:blip r:embed="rId6">
+            <a:extLst>
+              <a:ext uri="{28A0092B-C50C-407E-A947-70E740481C1C}">
+                <a14:useLocalDpi xmlns:a14="http://schemas.microsoft.com/office/drawing/2010/main" val="0"/>
+              </a:ext>
+            </a:extLst>
+          </a:blip>
+          <a:stretch>
+            <a:fillRect/>
+          </a:stretch>
+        </p:blipFill>
+        <p:spPr>
+          <a:xfrm>
+            <a:off x="1447800" y="5815937"/>
+            <a:ext cx="419048" cy="428571"/>
+          </a:xfrm>
+          <a:prstGeom prst="rect">
+            <a:avLst/>
+          </a:prstGeom>
+        </p:spPr>
+      </p:pic>
+    </p:spTree>
+    <p:extLst>
+      <p:ext uri="{BB962C8B-B14F-4D97-AF65-F5344CB8AC3E}">
+        <p14:creationId xmlns:p14="http://schemas.microsoft.com/office/powerpoint/2010/main" val="681251285"/>
+      </p:ext>
+    </p:extLst>
+  </p:cSld>
+  <p:clrMapOvr>
+    <a:masterClrMapping/>
+  </p:clrMapOvr>
+  <p:timing>
+    <p:tnLst>
+      <p:par>
+        <p:cTn id="1" dur="indefinite" restart="never" nodeType="tmRoot">
+          <p:childTnLst>
+            <p:seq concurrent="1" nextAc="seek">
+              <p:cTn id="2" dur="indefinite" nodeType="mainSeq">
+                <p:childTnLst>
+                  <p:par>
+                    <p:cTn id="3" fill="hold">
+                      <p:stCondLst>
+                        <p:cond delay="indefinite"/>
+                        <p:cond evt="onBegin" delay="0">
+                          <p:tn val="2"/>
+                        </p:cond>
+                      </p:stCondLst>
+                      <p:childTnLst>
+                        <p:par>
+                          <p:cTn id="4" fill="hold">
+                            <p:stCondLst>
+                              <p:cond delay="0"/>
+                            </p:stCondLst>
+                            <p:childTnLst>
+                              <p:par>
+                                <p:cTn id="5" presetID="10" presetClass="entr" presetSubtype="0" fill="hold" grpId="0" nodeType="withEffect">
+                                  <p:stCondLst>
+                                    <p:cond delay="0"/>
+                                  </p:stCondLst>
+                                  <p:childTnLst>
+                                    <p:set>
+                                      <p:cBhvr>
+                                        <p:cTn id="6" dur="1" fill="hold">
+                                          <p:stCondLst>
+                                            <p:cond delay="0"/>
+                                          </p:stCondLst>
+                                        </p:cTn>
+                                        <p:tgtEl>
+                                          <p:spTgt spid="7"/>
+                                        </p:tgtEl>
+                                        <p:attrNameLst>
+                                          <p:attrName>style.visibility</p:attrName>
+                                        </p:attrNameLst>
+                                      </p:cBhvr>
+                                      <p:to>
+                                        <p:strVal val="visible"/>
+                                      </p:to>
+                                    </p:set>
+                                    <p:animEffect transition="in" filter="fade">
+                                      <p:cBhvr>
+                                        <p:cTn id="7" dur="500"/>
+                                        <p:tgtEl>
+                                          <p:spTgt spid="7"/>
+                                        </p:tgtEl>
+                                      </p:cBhvr>
+                                    </p:animEffect>
+                                  </p:childTnLst>
+                                </p:cTn>
+                              </p:par>
+                            </p:childTnLst>
+                          </p:cTn>
+                        </p:par>
+                      </p:childTnLst>
+                    </p:cTn>
+                  </p:par>
+                  <p:par>
+                    <p:cTn id="8" fill="hold">
+                      <p:stCondLst>
+                        <p:cond delay="indefinite"/>
+                      </p:stCondLst>
+                      <p:childTnLst>
+                        <p:par>
+                          <p:cTn id="9" fill="hold">
+                            <p:stCondLst>
+                              <p:cond delay="0"/>
+                            </p:stCondLst>
+                            <p:childTnLst>
+                              <p:par>
+                                <p:cTn id="10" presetID="10" presetClass="entr" presetSubtype="0" fill="hold" grpId="0" nodeType="clickEffect">
+                                  <p:stCondLst>
+                                    <p:cond delay="0"/>
+                                  </p:stCondLst>
+                                  <p:childTnLst>
+                                    <p:set>
+                                      <p:cBhvr>
+                                        <p:cTn id="11" dur="1" fill="hold">
+                                          <p:stCondLst>
+                                            <p:cond delay="0"/>
+                                          </p:stCondLst>
+                                        </p:cTn>
+                                        <p:tgtEl>
+                                          <p:spTgt spid="9"/>
+                                        </p:tgtEl>
+                                        <p:attrNameLst>
+                                          <p:attrName>style.visibility</p:attrName>
+                                        </p:attrNameLst>
+                                      </p:cBhvr>
+                                      <p:to>
+                                        <p:strVal val="visible"/>
+                                      </p:to>
+                                    </p:set>
+                                    <p:animEffect transition="in" filter="fade">
+                                      <p:cBhvr>
+                                        <p:cTn id="12" dur="500"/>
+                                        <p:tgtEl>
+                                          <p:spTgt spid="9"/>
+                                        </p:tgtEl>
+                                      </p:cBhvr>
+                                    </p:animEffect>
+                                  </p:childTnLst>
+                                </p:cTn>
+                              </p:par>
+                            </p:childTnLst>
+                          </p:cTn>
+                        </p:par>
+                      </p:childTnLst>
+                    </p:cTn>
+                  </p:par>
+                  <p:par>
+                    <p:cTn id="13" fill="hold">
+                      <p:stCondLst>
+                        <p:cond delay="indefinite"/>
+                      </p:stCondLst>
+                      <p:childTnLst>
+                        <p:par>
+                          <p:cTn id="14" fill="hold">
+                            <p:stCondLst>
+                              <p:cond delay="0"/>
+                            </p:stCondLst>
+                            <p:childTnLst>
+                              <p:par>
+                                <p:cTn id="15" presetID="10" presetClass="entr" presetSubtype="0" fill="hold" grpId="0" nodeType="clickEffect">
+                                  <p:stCondLst>
+                                    <p:cond delay="0"/>
+                                  </p:stCondLst>
+                                  <p:childTnLst>
+                                    <p:set>
+                                      <p:cBhvr>
+                                        <p:cTn id="16" dur="1" fill="hold">
+                                          <p:stCondLst>
+                                            <p:cond delay="0"/>
+                                          </p:stCondLst>
+                                        </p:cTn>
+                                        <p:tgtEl>
+                                          <p:spTgt spid="11"/>
+                                        </p:tgtEl>
+                                        <p:attrNameLst>
+                                          <p:attrName>style.visibility</p:attrName>
+                                        </p:attrNameLst>
+                                      </p:cBhvr>
+                                      <p:to>
+                                        <p:strVal val="visible"/>
+                                      </p:to>
+                                    </p:set>
+                                    <p:animEffect transition="in" filter="fade">
+                                      <p:cBhvr>
+                                        <p:cTn id="17" dur="500"/>
+                                        <p:tgtEl>
+                                          <p:spTgt spid="11"/>
+                                        </p:tgtEl>
+                                      </p:cBhvr>
+                                    </p:animEffect>
+                                  </p:childTnLst>
+                                </p:cTn>
+                              </p:par>
+                            </p:childTnLst>
+                          </p:cTn>
+                        </p:par>
+                      </p:childTnLst>
+                    </p:cTn>
+                  </p:par>
+                </p:childTnLst>
+              </p:cTn>
+              <p:prevCondLst>
+                <p:cond evt="onPrev" delay="0">
+                  <p:tgtEl>
+                    <p:sldTgt/>
+                  </p:tgtEl>
+                </p:cond>
+              </p:prevCondLst>
+              <p:nextCondLst>
+                <p:cond evt="onNext" delay="0">
+                  <p:tgtEl>
+                    <p:sldTgt/>
+                  </p:tgtEl>
+                </p:cond>
+              </p:nextCondLst>
+            </p:seq>
+          </p:childTnLst>
+        </p:cTn>
+      </p:par>
+    </p:tnLst>
+    <p:bldLst>
+      <p:bldP spid="7" grpId="0"/>
+      <p:bldP spid="9" grpId="0"/>
+      <p:bldP spid="11" grpId="0"/>
+    </p:bldLst>
+  </p:timing>
+</p:sld>
+</file>
+
+<file path=ppt/slides/slide32.xml><?xml version="1.0" encoding="utf-8"?>
+<p:sld xmlns:a="http://schemas.openxmlformats.org/drawingml/2006/main" xmlns:r="http://schemas.openxmlformats.org/officeDocument/2006/relationships" xmlns:p="http://schemas.openxmlformats.org/presentationml/2006/main">
+  <p:cSld>
+    <p:spTree>
+      <p:nvGrpSpPr>
+        <p:cNvPr id="1" name=""/>
+        <p:cNvGrpSpPr/>
+        <p:nvPr/>
+      </p:nvGrpSpPr>
+      <p:grpSpPr>
+        <a:xfrm>
+          <a:off x="0" y="0"/>
+          <a:ext cx="0" cy="0"/>
+          <a:chOff x="0" y="0"/>
+          <a:chExt cx="0" cy="0"/>
+        </a:xfrm>
+      </p:grpSpPr>
+      <p:sp>
+        <p:nvSpPr>
           <p:cNvPr id="16" name="TextBox 15"/>
           <p:cNvSpPr txBox="1"/>
           <p:nvPr/>
@@ -17087,7 +18873,7 @@
 </p:sld>
 </file>
 
-<file path=ppt/slides/slide31.xml><?xml version="1.0" encoding="utf-8"?>
+<file path=ppt/slides/slide33.xml><?xml version="1.0" encoding="utf-8"?>
 <p:sld xmlns:a="http://schemas.openxmlformats.org/drawingml/2006/main" xmlns:r="http://schemas.openxmlformats.org/officeDocument/2006/relationships" xmlns:p="http://schemas.openxmlformats.org/presentationml/2006/main" show="0">
   <p:cSld name="PPAck201401021130490549">
     <p:spTree>

</xml_diff>

<commit_message>
fixes a bug related to #491; resolves #499
</commit_message>
<xml_diff>
--- a/PowerPointLabs/PowerPointLabs/PowerPointLabs Quick Tutorial.pptx
+++ b/PowerPointLabs/PowerPointLabs/PowerPointLabs Quick Tutorial.pptx
@@ -434,7 +434,7 @@
           <a:p>
             <a:fld id="{3E86CC0F-BBF3-4E07-94E0-0549B7D560A9}" type="datetimeFigureOut">
               <a:rPr lang="en-SG" smtClean="0"/>
-              <a:t>17/7/2014</a:t>
+              <a:t>18/7/2014</a:t>
             </a:fld>
             <a:endParaRPr lang="en-SG"/>
           </a:p>
@@ -1573,7 +1573,7 @@
             <a:fld id="{1D8BD707-D9CF-40AE-B4C6-C98DA3205C09}" type="datetimeFigureOut">
               <a:rPr lang="en-US" smtClean="0"/>
               <a:pPr/>
-              <a:t>7/17/2014</a:t>
+              <a:t>7/18/2014</a:t>
             </a:fld>
             <a:endParaRPr lang="en-US"/>
           </a:p>
@@ -1740,7 +1740,7 @@
             <a:fld id="{1D8BD707-D9CF-40AE-B4C6-C98DA3205C09}" type="datetimeFigureOut">
               <a:rPr lang="en-US" smtClean="0"/>
               <a:pPr/>
-              <a:t>7/17/2014</a:t>
+              <a:t>7/18/2014</a:t>
             </a:fld>
             <a:endParaRPr lang="en-US"/>
           </a:p>
@@ -1917,7 +1917,7 @@
             <a:fld id="{1D8BD707-D9CF-40AE-B4C6-C98DA3205C09}" type="datetimeFigureOut">
               <a:rPr lang="en-US" smtClean="0"/>
               <a:pPr/>
-              <a:t>7/17/2014</a:t>
+              <a:t>7/18/2014</a:t>
             </a:fld>
             <a:endParaRPr lang="en-US"/>
           </a:p>
@@ -2084,7 +2084,7 @@
             <a:fld id="{1D8BD707-D9CF-40AE-B4C6-C98DA3205C09}" type="datetimeFigureOut">
               <a:rPr lang="en-US" smtClean="0"/>
               <a:pPr/>
-              <a:t>7/17/2014</a:t>
+              <a:t>7/18/2014</a:t>
             </a:fld>
             <a:endParaRPr lang="en-US"/>
           </a:p>
@@ -2327,7 +2327,7 @@
             <a:fld id="{1D8BD707-D9CF-40AE-B4C6-C98DA3205C09}" type="datetimeFigureOut">
               <a:rPr lang="en-US" smtClean="0"/>
               <a:pPr/>
-              <a:t>7/17/2014</a:t>
+              <a:t>7/18/2014</a:t>
             </a:fld>
             <a:endParaRPr lang="en-US"/>
           </a:p>
@@ -2612,7 +2612,7 @@
             <a:fld id="{1D8BD707-D9CF-40AE-B4C6-C98DA3205C09}" type="datetimeFigureOut">
               <a:rPr lang="en-US" smtClean="0"/>
               <a:pPr/>
-              <a:t>7/17/2014</a:t>
+              <a:t>7/18/2014</a:t>
             </a:fld>
             <a:endParaRPr lang="en-US"/>
           </a:p>
@@ -3031,7 +3031,7 @@
             <a:fld id="{1D8BD707-D9CF-40AE-B4C6-C98DA3205C09}" type="datetimeFigureOut">
               <a:rPr lang="en-US" smtClean="0"/>
               <a:pPr/>
-              <a:t>7/17/2014</a:t>
+              <a:t>7/18/2014</a:t>
             </a:fld>
             <a:endParaRPr lang="en-US"/>
           </a:p>
@@ -3146,7 +3146,7 @@
             <a:fld id="{1D8BD707-D9CF-40AE-B4C6-C98DA3205C09}" type="datetimeFigureOut">
               <a:rPr lang="en-US" smtClean="0"/>
               <a:pPr/>
-              <a:t>7/17/2014</a:t>
+              <a:t>7/18/2014</a:t>
             </a:fld>
             <a:endParaRPr lang="en-US"/>
           </a:p>
@@ -3238,7 +3238,7 @@
             <a:fld id="{1D8BD707-D9CF-40AE-B4C6-C98DA3205C09}" type="datetimeFigureOut">
               <a:rPr lang="en-US" smtClean="0"/>
               <a:pPr/>
-              <a:t>7/17/2014</a:t>
+              <a:t>7/18/2014</a:t>
             </a:fld>
             <a:endParaRPr lang="en-US"/>
           </a:p>
@@ -3512,7 +3512,7 @@
             <a:fld id="{1D8BD707-D9CF-40AE-B4C6-C98DA3205C09}" type="datetimeFigureOut">
               <a:rPr lang="en-US" smtClean="0"/>
               <a:pPr/>
-              <a:t>7/17/2014</a:t>
+              <a:t>7/18/2014</a:t>
             </a:fld>
             <a:endParaRPr lang="en-US"/>
           </a:p>
@@ -3762,7 +3762,7 @@
             <a:fld id="{1D8BD707-D9CF-40AE-B4C6-C98DA3205C09}" type="datetimeFigureOut">
               <a:rPr lang="en-US" smtClean="0"/>
               <a:pPr/>
-              <a:t>7/17/2014</a:t>
+              <a:t>7/18/2014</a:t>
             </a:fld>
             <a:endParaRPr lang="en-US"/>
           </a:p>
@@ -3972,7 +3972,7 @@
             <a:fld id="{1D8BD707-D9CF-40AE-B4C6-C98DA3205C09}" type="datetimeFigureOut">
               <a:rPr lang="en-US" smtClean="0"/>
               <a:pPr/>
-              <a:t>7/17/2014</a:t>
+              <a:t>7/18/2014</a:t>
             </a:fld>
             <a:endParaRPr lang="en-US"/>
           </a:p>
@@ -16259,20 +16259,25 @@
           </p:cNvPicPr>
           <p:nvPr/>
         </p:nvPicPr>
-        <p:blipFill>
+        <p:blipFill rotWithShape="1">
           <a:blip r:embed="rId4"/>
-          <a:stretch>
-            <a:fillRect/>
-          </a:stretch>
+          <a:srcRect b="70506"/>
+          <a:stretch/>
         </p:blipFill>
         <p:spPr>
           <a:xfrm>
-            <a:off x="4038600" y="155812"/>
-            <a:ext cx="4907639" cy="6705600"/>
+            <a:off x="3962399" y="363363"/>
+            <a:ext cx="4907639" cy="1977788"/>
           </a:xfrm>
           <a:prstGeom prst="rect">
             <a:avLst/>
           </a:prstGeom>
+          <a:ln>
+            <a:noFill/>
+          </a:ln>
+          <a:effectLst>
+            <a:softEdge rad="112500"/>
+          </a:effectLst>
         </p:spPr>
       </p:pic>
       <p:sp>
@@ -16283,7 +16288,7 @@
         </p:nvSpPr>
         <p:spPr>
           <a:xfrm>
-            <a:off x="457200" y="2485104"/>
+            <a:off x="457199" y="2968585"/>
             <a:ext cx="3505200" cy="1908215"/>
           </a:xfrm>
           <a:prstGeom prst="rect">
@@ -16327,51 +16332,260 @@
           </a:p>
         </p:txBody>
       </p:sp>
-      <p:sp>
-        <p:nvSpPr>
-          <p:cNvPr id="10" name="[TextBox 6]"/>
-          <p:cNvSpPr txBox="1"/>
+      <p:grpSp>
+        <p:nvGrpSpPr>
+          <p:cNvPr id="22" name="Group 21"/>
+          <p:cNvGrpSpPr/>
           <p:nvPr/>
-        </p:nvSpPr>
+        </p:nvGrpSpPr>
+        <p:grpSpPr>
+          <a:xfrm>
+            <a:off x="2382672" y="5373574"/>
+            <a:ext cx="3810000" cy="897017"/>
+            <a:chOff x="228600" y="4817982"/>
+            <a:chExt cx="3810000" cy="897017"/>
+          </a:xfrm>
+        </p:grpSpPr>
+        <p:sp>
+          <p:nvSpPr>
+            <p:cNvPr id="23" name="Rounded Rectangle 22"/>
+            <p:cNvSpPr/>
+            <p:nvPr/>
+          </p:nvSpPr>
+          <p:spPr>
+            <a:xfrm>
+              <a:off x="228600" y="4894183"/>
+              <a:ext cx="1219200" cy="762000"/>
+            </a:xfrm>
+            <a:prstGeom prst="roundRect">
+              <a:avLst/>
+            </a:prstGeom>
+            <a:solidFill>
+              <a:srgbClr val="00B050"/>
+            </a:solidFill>
+          </p:spPr>
+          <p:style>
+            <a:lnRef idx="2">
+              <a:schemeClr val="accent1">
+                <a:shade val="50000"/>
+              </a:schemeClr>
+            </a:lnRef>
+            <a:fillRef idx="1">
+              <a:schemeClr val="accent1"/>
+            </a:fillRef>
+            <a:effectRef idx="0">
+              <a:schemeClr val="accent1"/>
+            </a:effectRef>
+            <a:fontRef idx="minor">
+              <a:schemeClr val="lt1"/>
+            </a:fontRef>
+          </p:style>
+          <p:txBody>
+            <a:bodyPr rtlCol="0" anchor="ctr"/>
+            <a:lstStyle/>
+            <a:p>
+              <a:pPr algn="ctr"/>
+              <a:r>
+                <a:rPr lang="en-US" altLang="zh-CN" sz="3200" b="1" dirty="0" smtClean="0">
+                  <a:ln w="10160">
+                    <a:solidFill>
+                      <a:schemeClr val="accent5"/>
+                    </a:solidFill>
+                    <a:prstDash val="solid"/>
+                  </a:ln>
+                  <a:solidFill>
+                    <a:srgbClr val="FFFFFF"/>
+                  </a:solidFill>
+                  <a:effectLst>
+                    <a:outerShdw blurRad="38100" dist="22860" dir="5400000" algn="tl" rotWithShape="0">
+                      <a:srgbClr val="000000">
+                        <a:alpha val="30000"/>
+                      </a:srgbClr>
+                    </a:outerShdw>
+                  </a:effectLst>
+                </a:rPr>
+                <a:t>Right</a:t>
+              </a:r>
+              <a:endParaRPr lang="zh-CN" altLang="en-US" sz="3200" b="1" dirty="0">
+                <a:ln w="10160">
+                  <a:solidFill>
+                    <a:schemeClr val="accent5"/>
+                  </a:solidFill>
+                  <a:prstDash val="solid"/>
+                </a:ln>
+                <a:solidFill>
+                  <a:srgbClr val="FFFFFF"/>
+                </a:solidFill>
+                <a:effectLst>
+                  <a:outerShdw blurRad="38100" dist="22860" dir="5400000" algn="tl" rotWithShape="0">
+                    <a:srgbClr val="000000">
+                      <a:alpha val="30000"/>
+                    </a:srgbClr>
+                  </a:outerShdw>
+                </a:effectLst>
+              </a:endParaRPr>
+            </a:p>
+          </p:txBody>
+        </p:sp>
+        <p:sp>
+          <p:nvSpPr>
+            <p:cNvPr id="24" name="Rectangle 23"/>
+            <p:cNvSpPr/>
+            <p:nvPr/>
+          </p:nvSpPr>
+          <p:spPr>
+            <a:xfrm>
+              <a:off x="1600200" y="4894183"/>
+              <a:ext cx="1219200" cy="744617"/>
+            </a:xfrm>
+            <a:prstGeom prst="rect">
+              <a:avLst/>
+            </a:prstGeom>
+            <a:solidFill>
+              <a:srgbClr val="00B0F0"/>
+            </a:solidFill>
+          </p:spPr>
+          <p:style>
+            <a:lnRef idx="2">
+              <a:schemeClr val="accent1">
+                <a:shade val="50000"/>
+              </a:schemeClr>
+            </a:lnRef>
+            <a:fillRef idx="1">
+              <a:schemeClr val="accent1"/>
+            </a:fillRef>
+            <a:effectRef idx="0">
+              <a:schemeClr val="accent1"/>
+            </a:effectRef>
+            <a:fontRef idx="minor">
+              <a:schemeClr val="lt1"/>
+            </a:fontRef>
+          </p:style>
+          <p:txBody>
+            <a:bodyPr rtlCol="0" anchor="ctr"/>
+            <a:lstStyle/>
+            <a:p>
+              <a:pPr algn="ctr"/>
+              <a:r>
+                <a:rPr lang="en-US" altLang="zh-CN" sz="3200" b="1" dirty="0" smtClean="0">
+                  <a:ln w="10160">
+                    <a:solidFill>
+                      <a:schemeClr val="accent5"/>
+                    </a:solidFill>
+                    <a:prstDash val="solid"/>
+                  </a:ln>
+                  <a:solidFill>
+                    <a:srgbClr val="FFFFFF"/>
+                  </a:solidFill>
+                  <a:effectLst>
+                    <a:outerShdw blurRad="38100" dist="22860" dir="5400000" algn="tl" rotWithShape="0">
+                      <a:srgbClr val="000000">
+                        <a:alpha val="30000"/>
+                      </a:srgbClr>
+                    </a:outerShdw>
+                  </a:effectLst>
+                </a:rPr>
+                <a:t>Click</a:t>
+              </a:r>
+              <a:endParaRPr lang="zh-CN" altLang="en-US" sz="3200" dirty="0"/>
+            </a:p>
+          </p:txBody>
+        </p:sp>
+        <p:sp>
+          <p:nvSpPr>
+            <p:cNvPr id="25" name="Oval 24"/>
+            <p:cNvSpPr/>
+            <p:nvPr/>
+          </p:nvSpPr>
+          <p:spPr>
+            <a:xfrm>
+              <a:off x="2971800" y="4817982"/>
+              <a:ext cx="1066800" cy="897017"/>
+            </a:xfrm>
+            <a:prstGeom prst="ellipse">
+              <a:avLst/>
+            </a:prstGeom>
+            <a:solidFill>
+              <a:srgbClr val="FFC000"/>
+            </a:solidFill>
+          </p:spPr>
+          <p:style>
+            <a:lnRef idx="2">
+              <a:schemeClr val="accent1">
+                <a:shade val="50000"/>
+              </a:schemeClr>
+            </a:lnRef>
+            <a:fillRef idx="1">
+              <a:schemeClr val="accent1"/>
+            </a:fillRef>
+            <a:effectRef idx="0">
+              <a:schemeClr val="accent1"/>
+            </a:effectRef>
+            <a:fontRef idx="minor">
+              <a:schemeClr val="lt1"/>
+            </a:fontRef>
+          </p:style>
+          <p:txBody>
+            <a:bodyPr rtlCol="0" anchor="ctr"/>
+            <a:lstStyle/>
+            <a:p>
+              <a:pPr algn="ctr"/>
+              <a:r>
+                <a:rPr lang="en-US" altLang="zh-CN" sz="3200" b="1" dirty="0">
+                  <a:ln w="10160">
+                    <a:solidFill>
+                      <a:schemeClr val="accent5"/>
+                    </a:solidFill>
+                    <a:prstDash val="solid"/>
+                  </a:ln>
+                  <a:solidFill>
+                    <a:srgbClr val="FFFFFF"/>
+                  </a:solidFill>
+                  <a:effectLst>
+                    <a:outerShdw blurRad="38100" dist="22860" dir="5400000" algn="tl" rotWithShape="0">
+                      <a:srgbClr val="000000">
+                        <a:alpha val="30000"/>
+                      </a:srgbClr>
+                    </a:outerShdw>
+                  </a:effectLst>
+                </a:rPr>
+                <a:t>Me!</a:t>
+              </a:r>
+              <a:endParaRPr lang="zh-CN" altLang="en-US" sz="3200" dirty="0"/>
+            </a:p>
+          </p:txBody>
+        </p:sp>
+      </p:grpSp>
+      <p:pic>
+        <p:nvPicPr>
+          <p:cNvPr id="26" name="[Picture 25]"/>
+          <p:cNvPicPr>
+            <a:picLocks noChangeAspect="1"/>
+          </p:cNvPicPr>
+          <p:nvPr/>
+        </p:nvPicPr>
+        <p:blipFill>
+          <a:blip r:embed="rId5"/>
+          <a:stretch>
+            <a:fillRect/>
+          </a:stretch>
+        </p:blipFill>
         <p:spPr>
           <a:xfrm>
-            <a:off x="457200" y="4894183"/>
-            <a:ext cx="3505200" cy="1354217"/>
+            <a:off x="3962399" y="2891380"/>
+            <a:ext cx="4907639" cy="1766910"/>
           </a:xfrm>
           <a:prstGeom prst="rect">
             <a:avLst/>
           </a:prstGeom>
-          <a:noFill/>
+          <a:ln>
+            <a:noFill/>
+          </a:ln>
+          <a:effectLst>
+            <a:softEdge rad="112500"/>
+          </a:effectLst>
         </p:spPr>
-        <p:txBody>
-          <a:bodyPr wrap="square" rtlCol="0">
-            <a:spAutoFit/>
-          </a:bodyPr>
-          <a:lstStyle/>
-          <a:p>
-            <a:r>
-              <a:rPr lang="en-US" sz="2800" b="1" dirty="0" smtClean="0">
-                <a:solidFill>
-                  <a:schemeClr val="accent6">
-                    <a:lumMod val="75000"/>
-                  </a:schemeClr>
-                </a:solidFill>
-              </a:rPr>
-              <a:t>3.</a:t>
-            </a:r>
-            <a:r>
-              <a:rPr lang="en-US" dirty="0" smtClean="0">
-                <a:solidFill>
-                  <a:schemeClr val="accent6">
-                    <a:lumMod val="75000"/>
-                  </a:schemeClr>
-                </a:solidFill>
-              </a:rPr>
-              <a:t> After finishing name editing, press enter to confirm. Alternatively, you could click on any where else to confirm the change.</a:t>
-            </a:r>
-          </a:p>
-        </p:txBody>
-      </p:sp>
+      </p:pic>
     </p:spTree>
     <p:extLst>
       <p:ext uri="{BB962C8B-B14F-4D97-AF65-F5344CB8AC3E}">
@@ -16411,14 +16625,14 @@
       </p:grpSpPr>
       <p:sp>
         <p:nvSpPr>
-          <p:cNvPr id="7" name="[TextBox 6]"/>
+          <p:cNvPr id="10" name="[TextBox 6]"/>
           <p:cNvSpPr txBox="1"/>
           <p:nvPr/>
         </p:nvSpPr>
         <p:spPr>
           <a:xfrm>
-            <a:off x="457200" y="907022"/>
-            <a:ext cx="3505200" cy="1077218"/>
+            <a:off x="457200" y="838200"/>
+            <a:ext cx="3505200" cy="1354217"/>
           </a:xfrm>
           <a:prstGeom prst="rect">
             <a:avLst/>
@@ -16439,7 +16653,7 @@
                   </a:schemeClr>
                 </a:solidFill>
               </a:rPr>
-              <a:t>1.</a:t>
+              <a:t>3.</a:t>
             </a:r>
             <a:r>
               <a:rPr lang="en-US" dirty="0" smtClean="0">
@@ -16449,42 +16663,14 @@
                   </a:schemeClr>
                 </a:solidFill>
               </a:rPr>
-              <a:t> Click the                button, it will </a:t>
-            </a:r>
-          </a:p>
-          <a:p>
-            <a:endParaRPr lang="en-US" dirty="0" smtClean="0">
-              <a:solidFill>
-                <a:schemeClr val="accent6">
-                  <a:lumMod val="75000"/>
-                </a:schemeClr>
-              </a:solidFill>
-            </a:endParaRPr>
-          </a:p>
-          <a:p>
-            <a:r>
-              <a:rPr lang="en-US" dirty="0" smtClean="0">
-                <a:solidFill>
-                  <a:schemeClr val="accent6">
-                    <a:lumMod val="75000"/>
-                  </a:schemeClr>
-                </a:solidFill>
-              </a:rPr>
-              <a:t>bring you the Shapes Lab Panel.</a:t>
-            </a:r>
-            <a:endParaRPr lang="en-SG" dirty="0">
-              <a:solidFill>
-                <a:schemeClr val="accent6">
-                  <a:lumMod val="75000"/>
-                </a:schemeClr>
-              </a:solidFill>
-            </a:endParaRPr>
+              <a:t> After finishing name editing, press enter to confirm. Alternatively, you could click on any where else to confirm the change.</a:t>
+            </a:r>
           </a:p>
         </p:txBody>
       </p:sp>
       <p:pic>
         <p:nvPicPr>
-          <p:cNvPr id="3" name="Picture 2"/>
+          <p:cNvPr id="2" name="Picture 1"/>
           <p:cNvPicPr>
             <a:picLocks noChangeAspect="1"/>
           </p:cNvPicPr>
@@ -16498,24 +16684,30 @@
         </p:blipFill>
         <p:spPr>
           <a:xfrm>
-            <a:off x="4038600" y="155812"/>
-            <a:ext cx="4907639" cy="6705600"/>
+            <a:off x="3962399" y="762000"/>
+            <a:ext cx="4907639" cy="1447800"/>
           </a:xfrm>
           <a:prstGeom prst="rect">
             <a:avLst/>
           </a:prstGeom>
+          <a:ln>
+            <a:noFill/>
+          </a:ln>
+          <a:effectLst>
+            <a:softEdge rad="112500"/>
+          </a:effectLst>
         </p:spPr>
       </p:pic>
       <p:sp>
         <p:nvSpPr>
-          <p:cNvPr id="9" name="[TextBox 6]"/>
+          <p:cNvPr id="12" name="[TextBox 6]"/>
           <p:cNvSpPr txBox="1"/>
           <p:nvPr/>
         </p:nvSpPr>
         <p:spPr>
           <a:xfrm>
-            <a:off x="457200" y="2485104"/>
-            <a:ext cx="3505200" cy="1908215"/>
+            <a:off x="449237" y="3128090"/>
+            <a:ext cx="3505201" cy="1631216"/>
           </a:xfrm>
           <a:prstGeom prst="rect">
             <a:avLst/>
@@ -16536,7 +16728,7 @@
                   </a:schemeClr>
                 </a:solidFill>
               </a:rPr>
-              <a:t>2.</a:t>
+              <a:t>4.</a:t>
             </a:r>
             <a:r>
               <a:rPr lang="en-US" dirty="0" smtClean="0">
@@ -16546,9 +16738,79 @@
                   </a:schemeClr>
                 </a:solidFill>
               </a:rPr>
-              <a:t> Right click on the shape you want to add into the Lab, and select “Add to Custom Shapes”. Then you should see your shape in the panel and waiting for name editing.</a:t>
-            </a:r>
-            <a:endParaRPr lang="en-SG" dirty="0">
+              <a:t> B</a:t>
+            </a:r>
+            <a:r>
+              <a:rPr lang="en-US" altLang="zh-CN" dirty="0" smtClean="0">
+                <a:solidFill>
+                  <a:schemeClr val="accent6">
+                    <a:lumMod val="75000"/>
+                  </a:schemeClr>
+                </a:solidFill>
+              </a:rPr>
+              <a:t>y </a:t>
+            </a:r>
+            <a:r>
+              <a:rPr lang="en-US" altLang="zh-CN" dirty="0">
+                <a:solidFill>
+                  <a:schemeClr val="accent6">
+                    <a:lumMod val="75000"/>
+                  </a:schemeClr>
+                </a:solidFill>
+              </a:rPr>
+              <a:t>right clicking on the </a:t>
+            </a:r>
+            <a:r>
+              <a:rPr lang="en-US" altLang="zh-CN" dirty="0" smtClean="0">
+                <a:solidFill>
+                  <a:schemeClr val="accent6">
+                    <a:lumMod val="75000"/>
+                  </a:schemeClr>
+                </a:solidFill>
+              </a:rPr>
+              <a:t>shape,</a:t>
+            </a:r>
+            <a:r>
+              <a:rPr lang="en-US" dirty="0" smtClean="0">
+                <a:solidFill>
+                  <a:schemeClr val="accent6">
+                    <a:lumMod val="75000"/>
+                  </a:schemeClr>
+                </a:solidFill>
+              </a:rPr>
+              <a:t> you can Add, Remove or Rename the shape. As a short cut to </a:t>
+            </a:r>
+            <a:r>
+              <a:rPr lang="en-US" altLang="zh-CN" dirty="0" smtClean="0">
+                <a:solidFill>
+                  <a:schemeClr val="accent6">
+                    <a:lumMod val="75000"/>
+                  </a:schemeClr>
+                </a:solidFill>
+              </a:rPr>
+              <a:t>add a shape </a:t>
+            </a:r>
+            <a:r>
+              <a:rPr lang="en-US" altLang="zh-CN" dirty="0">
+                <a:solidFill>
+                  <a:schemeClr val="accent6">
+                    <a:lumMod val="75000"/>
+                  </a:schemeClr>
+                </a:solidFill>
+              </a:rPr>
+              <a:t>into the </a:t>
+            </a:r>
+            <a:r>
+              <a:rPr lang="en-US" altLang="zh-CN" dirty="0" smtClean="0">
+                <a:solidFill>
+                  <a:schemeClr val="accent6">
+                    <a:lumMod val="75000"/>
+                  </a:schemeClr>
+                </a:solidFill>
+              </a:rPr>
+              <a:t>slide, simply double click on the shape.</a:t>
+            </a:r>
+            <a:endParaRPr lang="en-US" dirty="0" smtClean="0">
               <a:solidFill>
                 <a:schemeClr val="accent6">
                   <a:lumMod val="75000"/>
@@ -16558,51 +16820,36 @@
           </a:p>
         </p:txBody>
       </p:sp>
-      <p:sp>
-        <p:nvSpPr>
-          <p:cNvPr id="10" name="[TextBox 6]"/>
-          <p:cNvSpPr txBox="1"/>
+      <p:pic>
+        <p:nvPicPr>
+          <p:cNvPr id="6" name="Picture 5"/>
+          <p:cNvPicPr>
+            <a:picLocks noChangeAspect="1"/>
+          </p:cNvPicPr>
           <p:nvPr/>
-        </p:nvSpPr>
+        </p:nvPicPr>
+        <p:blipFill>
+          <a:blip r:embed="rId4"/>
+          <a:stretch>
+            <a:fillRect/>
+          </a:stretch>
+        </p:blipFill>
         <p:spPr>
           <a:xfrm>
-            <a:off x="457200" y="4894183"/>
-            <a:ext cx="3505200" cy="1354217"/>
+            <a:off x="3962398" y="2930506"/>
+            <a:ext cx="4907639" cy="2174894"/>
           </a:xfrm>
           <a:prstGeom prst="rect">
             <a:avLst/>
           </a:prstGeom>
-          <a:noFill/>
+          <a:ln>
+            <a:noFill/>
+          </a:ln>
+          <a:effectLst>
+            <a:softEdge rad="112500"/>
+          </a:effectLst>
         </p:spPr>
-        <p:txBody>
-          <a:bodyPr wrap="square" rtlCol="0">
-            <a:spAutoFit/>
-          </a:bodyPr>
-          <a:lstStyle/>
-          <a:p>
-            <a:r>
-              <a:rPr lang="en-US" sz="2800" b="1" dirty="0" smtClean="0">
-                <a:solidFill>
-                  <a:schemeClr val="accent6">
-                    <a:lumMod val="75000"/>
-                  </a:schemeClr>
-                </a:solidFill>
-              </a:rPr>
-              <a:t>3.</a:t>
-            </a:r>
-            <a:r>
-              <a:rPr lang="en-US" dirty="0" smtClean="0">
-                <a:solidFill>
-                  <a:schemeClr val="accent6">
-                    <a:lumMod val="75000"/>
-                  </a:schemeClr>
-                </a:solidFill>
-              </a:rPr>
-              <a:t> After finishing name editing, press enter to confirm. Alternatively, you could click on any where else to confirm the change.</a:t>
-            </a:r>
-          </a:p>
-        </p:txBody>
-      </p:sp>
+      </p:pic>
     </p:spTree>
     <p:extLst>
       <p:ext uri="{BB962C8B-B14F-4D97-AF65-F5344CB8AC3E}">

</xml_diff>